<commit_message>
Better presentation with template
</commit_message>
<xml_diff>
--- a/01-Quarto/slides_draft.pptx
+++ b/01-Quarto/slides_draft.pptx
@@ -10,6 +10,20 @@
     <p:sldId id="258" r:id="rId4"/>
     <p:sldId id="259" r:id="rId5"/>
     <p:sldId id="260" r:id="rId6"/>
+    <p:sldId id="261" r:id="rId7"/>
+    <p:sldId id="262" r:id="rId8"/>
+    <p:sldId id="263" r:id="rId9"/>
+    <p:sldId id="264" r:id="rId10"/>
+    <p:sldId id="265" r:id="rId11"/>
+    <p:sldId id="266" r:id="rId12"/>
+    <p:sldId id="267" r:id="rId13"/>
+    <p:sldId id="268" r:id="rId14"/>
+    <p:sldId id="269" r:id="rId15"/>
+    <p:sldId id="270" r:id="rId16"/>
+    <p:sldId id="271" r:id="rId17"/>
+    <p:sldId id="272" r:id="rId18"/>
+    <p:sldId id="273" r:id="rId19"/>
+    <p:sldId id="274" r:id="rId20"/>
   </p:sldIdLst>
   <p:sldSz cx="9144000" cy="5143500" type="screen16x9"/>
   <p:notesSz cx="6858000" cy="9144000"/>
@@ -170,8 +184,8 @@
         </p:nvSpPr>
         <p:spPr>
           <a:xfrm>
-            <a:off x="648000" y="1597819"/>
-            <a:ext cx="7772400" cy="1102519"/>
+            <a:off x="647999" y="2920778"/>
+            <a:ext cx="8405209" cy="1102519"/>
           </a:xfrm>
         </p:spPr>
         <p:txBody>
@@ -180,9 +194,9 @@
           </a:bodyPr>
           <a:lstStyle>
             <a:lvl1pPr algn="l">
-              <a:defRPr sz="4400">
-                <a:solidFill>
-                  <a:schemeClr val="bg1"/>
+              <a:defRPr sz="3200">
+                <a:solidFill>
+                  <a:srgbClr val="FD6435"/>
                 </a:solidFill>
               </a:defRPr>
             </a:lvl1pPr>
@@ -207,105 +221,30 @@
         </p:nvSpPr>
         <p:spPr>
           <a:xfrm>
-            <a:off x="648000" y="2914650"/>
-            <a:ext cx="6400800" cy="1314450"/>
+            <a:off x="647999" y="1597819"/>
+            <a:ext cx="8405210" cy="973931"/>
           </a:xfrm>
         </p:spPr>
         <p:txBody>
-          <a:bodyPr>
+          <a:bodyPr vert="horz" lIns="91440" tIns="45720" rIns="91440" bIns="45720" rtlCol="0" anchor="ctr">
             <a:normAutofit/>
           </a:bodyPr>
           <a:lstStyle>
-            <a:lvl1pPr marL="0" indent="0" algn="l">
-              <a:buNone/>
-              <a:defRPr sz="3200">
-                <a:solidFill>
-                  <a:srgbClr val="FD6435"/>
-                </a:solidFill>
+            <a:lvl1pPr>
+              <a:defRPr lang="en-US" sz="4000" dirty="0">
+                <a:latin typeface="+mj-lt"/>
+                <a:ea typeface="+mj-ea"/>
+                <a:cs typeface="+mj-cs"/>
               </a:defRPr>
             </a:lvl1pPr>
-            <a:lvl2pPr marL="342900" indent="0" algn="ctr">
-              <a:buNone/>
-              <a:defRPr>
-                <a:solidFill>
-                  <a:schemeClr val="tx1">
-                    <a:tint val="75000"/>
-                  </a:schemeClr>
-                </a:solidFill>
-              </a:defRPr>
-            </a:lvl2pPr>
-            <a:lvl3pPr marL="685800" indent="0" algn="ctr">
-              <a:buNone/>
-              <a:defRPr>
-                <a:solidFill>
-                  <a:schemeClr val="tx1">
-                    <a:tint val="75000"/>
-                  </a:schemeClr>
-                </a:solidFill>
-              </a:defRPr>
-            </a:lvl3pPr>
-            <a:lvl4pPr marL="1028700" indent="0" algn="ctr">
-              <a:buNone/>
-              <a:defRPr>
-                <a:solidFill>
-                  <a:schemeClr val="tx1">
-                    <a:tint val="75000"/>
-                  </a:schemeClr>
-                </a:solidFill>
-              </a:defRPr>
-            </a:lvl4pPr>
-            <a:lvl5pPr marL="1371600" indent="0" algn="ctr">
-              <a:buNone/>
-              <a:defRPr>
-                <a:solidFill>
-                  <a:schemeClr val="tx1">
-                    <a:tint val="75000"/>
-                  </a:schemeClr>
-                </a:solidFill>
-              </a:defRPr>
-            </a:lvl5pPr>
-            <a:lvl6pPr marL="1714500" indent="0" algn="ctr">
-              <a:buNone/>
-              <a:defRPr>
-                <a:solidFill>
-                  <a:schemeClr val="tx1">
-                    <a:tint val="75000"/>
-                  </a:schemeClr>
-                </a:solidFill>
-              </a:defRPr>
-            </a:lvl6pPr>
-            <a:lvl7pPr marL="2057400" indent="0" algn="ctr">
-              <a:buNone/>
-              <a:defRPr>
-                <a:solidFill>
-                  <a:schemeClr val="tx1">
-                    <a:tint val="75000"/>
-                  </a:schemeClr>
-                </a:solidFill>
-              </a:defRPr>
-            </a:lvl7pPr>
-            <a:lvl8pPr marL="2400300" indent="0" algn="ctr">
-              <a:buNone/>
-              <a:defRPr>
-                <a:solidFill>
-                  <a:schemeClr val="tx1">
-                    <a:tint val="75000"/>
-                  </a:schemeClr>
-                </a:solidFill>
-              </a:defRPr>
-            </a:lvl8pPr>
-            <a:lvl9pPr marL="2743200" indent="0" algn="ctr">
-              <a:buNone/>
-              <a:defRPr>
-                <a:solidFill>
-                  <a:schemeClr val="tx1">
-                    <a:tint val="75000"/>
-                  </a:schemeClr>
-                </a:solidFill>
-              </a:defRPr>
-            </a:lvl9pPr>
           </a:lstStyle>
           <a:p>
+            <a:pPr lvl="0">
+              <a:spcBef>
+                <a:spcPct val="0"/>
+              </a:spcBef>
+              <a:buNone/>
+            </a:pPr>
             <a:r>
               <a:rPr lang="en-US" dirty="0"/>
               <a:t>Click to edit Master subtitle style</a:t>
@@ -326,12 +265,17 @@
   <p:extLst>
     <p:ext uri="{DCECCB84-F9BA-43D5-87BE-67443E8EF086}">
       <p15:sldGuideLst xmlns:p15="http://schemas.microsoft.com/office/powerpoint/2012/main">
-        <p15:guide id="1" orient="horz" pos="1620" userDrawn="1">
+        <p15:guide id="1" orient="horz" pos="1008" userDrawn="1">
           <p15:clr>
             <a:srgbClr val="FBAE40"/>
           </p15:clr>
         </p15:guide>
         <p15:guide id="2" pos="2880" userDrawn="1">
+          <p15:clr>
+            <a:srgbClr val="FBAE40"/>
+          </p15:clr>
+        </p15:guide>
+        <p15:guide id="3" orient="horz" pos="1824" userDrawn="1">
           <p15:clr>
             <a:srgbClr val="FBAE40"/>
           </p15:clr>
@@ -1037,40 +981,48 @@
             <p:ph idx="1"/>
           </p:nvPr>
         </p:nvSpPr>
-        <p:spPr/>
+        <p:spPr>
+          <a:xfrm>
+            <a:off x="457200" y="1200151"/>
+            <a:ext cx="8229600" cy="3394472"/>
+          </a:xfrm>
+        </p:spPr>
         <p:txBody>
           <a:bodyPr/>
           <a:lstStyle>
             <a:lvl1pPr>
-              <a:defRPr>
+              <a:buClr>
+                <a:srgbClr val="FD6435"/>
+              </a:buClr>
+              <a:defRPr sz="1800">
                 <a:solidFill>
                   <a:schemeClr val="bg1"/>
                 </a:solidFill>
               </a:defRPr>
             </a:lvl1pPr>
             <a:lvl2pPr>
-              <a:defRPr>
+              <a:defRPr sz="1800">
                 <a:solidFill>
                   <a:schemeClr val="bg1"/>
                 </a:solidFill>
               </a:defRPr>
             </a:lvl2pPr>
             <a:lvl3pPr>
-              <a:defRPr>
+              <a:defRPr sz="1400">
                 <a:solidFill>
                   <a:schemeClr val="bg1"/>
                 </a:solidFill>
               </a:defRPr>
             </a:lvl3pPr>
             <a:lvl4pPr>
-              <a:defRPr>
+              <a:defRPr sz="1200">
                 <a:solidFill>
                   <a:schemeClr val="bg1"/>
                 </a:solidFill>
               </a:defRPr>
             </a:lvl4pPr>
             <a:lvl5pPr>
-              <a:defRPr>
+              <a:defRPr sz="1200">
                 <a:solidFill>
                   <a:schemeClr val="bg1"/>
                 </a:solidFill>
@@ -1482,35 +1434,41 @@
           <a:bodyPr/>
           <a:lstStyle>
             <a:lvl1pPr>
-              <a:defRPr sz="2100">
+              <a:buClr>
+                <a:srgbClr val="FD6435"/>
+              </a:buClr>
+              <a:defRPr sz="2000">
                 <a:solidFill>
                   <a:schemeClr val="bg1"/>
                 </a:solidFill>
               </a:defRPr>
             </a:lvl1pPr>
             <a:lvl2pPr>
-              <a:defRPr sz="1800">
+              <a:buClr>
+                <a:srgbClr val="FD6435"/>
+              </a:buClr>
+              <a:defRPr sz="1600">
                 <a:solidFill>
                   <a:schemeClr val="bg1"/>
                 </a:solidFill>
               </a:defRPr>
             </a:lvl2pPr>
             <a:lvl3pPr>
-              <a:defRPr sz="1500">
+              <a:defRPr sz="1400">
                 <a:solidFill>
                   <a:schemeClr val="bg1"/>
                 </a:solidFill>
               </a:defRPr>
             </a:lvl3pPr>
             <a:lvl4pPr>
-              <a:defRPr sz="1350">
+              <a:defRPr sz="1200">
                 <a:solidFill>
                   <a:schemeClr val="bg1"/>
                 </a:solidFill>
               </a:defRPr>
             </a:lvl4pPr>
             <a:lvl5pPr>
-              <a:defRPr sz="1350">
+              <a:defRPr sz="1200">
                 <a:solidFill>
                   <a:schemeClr val="bg1"/>
                 </a:solidFill>
@@ -1586,35 +1544,41 @@
           <a:bodyPr/>
           <a:lstStyle>
             <a:lvl1pPr>
-              <a:defRPr sz="2100">
+              <a:buClr>
+                <a:srgbClr val="FD6435"/>
+              </a:buClr>
+              <a:defRPr sz="2000">
                 <a:solidFill>
                   <a:schemeClr val="bg1"/>
                 </a:solidFill>
               </a:defRPr>
             </a:lvl1pPr>
             <a:lvl2pPr>
-              <a:defRPr sz="1800">
+              <a:buClr>
+                <a:srgbClr val="FD6435"/>
+              </a:buClr>
+              <a:defRPr sz="1600">
                 <a:solidFill>
                   <a:schemeClr val="bg1"/>
                 </a:solidFill>
               </a:defRPr>
             </a:lvl2pPr>
             <a:lvl3pPr>
-              <a:defRPr sz="1500">
+              <a:defRPr sz="1400">
                 <a:solidFill>
                   <a:schemeClr val="bg1"/>
                 </a:solidFill>
               </a:defRPr>
             </a:lvl3pPr>
             <a:lvl4pPr>
-              <a:defRPr sz="1350">
+              <a:defRPr sz="1200">
                 <a:solidFill>
                   <a:schemeClr val="bg1"/>
                 </a:solidFill>
               </a:defRPr>
             </a:lvl4pPr>
             <a:lvl5pPr>
-              <a:defRPr sz="1350">
+              <a:defRPr sz="1200">
                 <a:solidFill>
                   <a:schemeClr val="bg1"/>
                 </a:solidFill>
@@ -1895,35 +1859,38 @@
           <a:bodyPr/>
           <a:lstStyle>
             <a:lvl1pPr>
-              <a:defRPr sz="1800">
+              <a:buClr>
+                <a:srgbClr val="FD6435"/>
+              </a:buClr>
+              <a:defRPr sz="1600">
                 <a:solidFill>
                   <a:schemeClr val="bg1"/>
                 </a:solidFill>
               </a:defRPr>
             </a:lvl1pPr>
             <a:lvl2pPr>
-              <a:defRPr sz="1500">
+              <a:defRPr sz="1400">
                 <a:solidFill>
                   <a:schemeClr val="bg1"/>
                 </a:solidFill>
               </a:defRPr>
             </a:lvl2pPr>
             <a:lvl3pPr>
-              <a:defRPr sz="1350">
+              <a:defRPr sz="1200">
                 <a:solidFill>
                   <a:schemeClr val="bg1"/>
                 </a:solidFill>
               </a:defRPr>
             </a:lvl3pPr>
             <a:lvl4pPr>
-              <a:defRPr sz="1200">
+              <a:defRPr sz="1100">
                 <a:solidFill>
                   <a:schemeClr val="bg1"/>
                 </a:solidFill>
               </a:defRPr>
             </a:lvl4pPr>
             <a:lvl5pPr>
-              <a:defRPr sz="1200">
+              <a:defRPr sz="1100">
                 <a:solidFill>
                   <a:schemeClr val="bg1"/>
                 </a:solidFill>
@@ -2065,38 +2032,40 @@
           </a:xfrm>
         </p:spPr>
         <p:txBody>
-          <a:bodyPr/>
+          <a:bodyPr>
+            <a:normAutofit/>
+          </a:bodyPr>
           <a:lstStyle>
             <a:lvl1pPr>
-              <a:defRPr sz="1800">
+              <a:defRPr sz="1600">
                 <a:solidFill>
                   <a:schemeClr val="bg1"/>
                 </a:solidFill>
               </a:defRPr>
             </a:lvl1pPr>
             <a:lvl2pPr>
-              <a:defRPr sz="1500">
+              <a:defRPr sz="1400">
                 <a:solidFill>
                   <a:schemeClr val="bg1"/>
                 </a:solidFill>
               </a:defRPr>
             </a:lvl2pPr>
             <a:lvl3pPr>
-              <a:defRPr sz="1350">
+              <a:defRPr sz="1200">
                 <a:solidFill>
                   <a:schemeClr val="bg1"/>
                 </a:solidFill>
               </a:defRPr>
             </a:lvl3pPr>
             <a:lvl4pPr>
-              <a:defRPr sz="1200">
+              <a:defRPr sz="1100">
                 <a:solidFill>
                   <a:schemeClr val="bg1"/>
                 </a:solidFill>
               </a:defRPr>
             </a:lvl4pPr>
             <a:lvl5pPr>
-              <a:defRPr sz="1200">
+              <a:defRPr sz="1100">
                 <a:solidFill>
                   <a:schemeClr val="bg1"/>
                 </a:solidFill>
@@ -2394,6 +2363,122 @@
           <a:chExt cx="0" cy="0"/>
         </a:xfrm>
       </p:grpSpPr>
+      <p:sp>
+        <p:nvSpPr>
+          <p:cNvPr id="2" name="Google Shape;529;p55">
+            <a:extLst>
+              <a:ext uri="{FF2B5EF4-FFF2-40B4-BE49-F238E27FC236}">
+                <a16:creationId xmlns:a16="http://schemas.microsoft.com/office/drawing/2014/main" id="{FF96C498-06A6-DDA7-3909-844DE7EFFD2C}"/>
+              </a:ext>
+            </a:extLst>
+          </p:cNvPr>
+          <p:cNvSpPr/>
+          <p:nvPr userDrawn="1"/>
+        </p:nvSpPr>
+        <p:spPr>
+          <a:xfrm>
+            <a:off x="664800" y="183565"/>
+            <a:ext cx="2840100" cy="847800"/>
+          </a:xfrm>
+          <a:prstGeom prst="wedgeRectCallout">
+            <a:avLst>
+              <a:gd name="adj1" fmla="val 43935"/>
+              <a:gd name="adj2" fmla="val 86342"/>
+            </a:avLst>
+          </a:prstGeom>
+          <a:noFill/>
+          <a:ln w="28575" cap="flat" cmpd="sng">
+            <a:solidFill>
+              <a:srgbClr val="F19102"/>
+            </a:solidFill>
+            <a:prstDash val="solid"/>
+            <a:round/>
+            <a:headEnd type="none" w="sm" len="sm"/>
+            <a:tailEnd type="none" w="sm" len="sm"/>
+          </a:ln>
+        </p:spPr>
+        <p:txBody>
+          <a:bodyPr spcFirstLastPara="1" wrap="square" lIns="198000" tIns="126000" rIns="198000" bIns="126000" anchor="ctr" anchorCtr="0">
+            <a:noAutofit/>
+          </a:bodyPr>
+          <a:lstStyle/>
+          <a:p>
+            <a:pPr marL="0" lvl="0" indent="0" algn="l" rtl="0">
+              <a:spcBef>
+                <a:spcPts val="0"/>
+              </a:spcBef>
+              <a:spcAft>
+                <a:spcPts val="0"/>
+              </a:spcAft>
+              <a:buNone/>
+            </a:pPr>
+            <a:r>
+              <a:rPr lang="ru-RU" dirty="0">
+                <a:solidFill>
+                  <a:srgbClr val="212121"/>
+                </a:solidFill>
+                <a:latin typeface="Roboto"/>
+                <a:ea typeface="Roboto"/>
+                <a:cs typeface="Roboto"/>
+                <a:sym typeface="Roboto"/>
+              </a:rPr>
+              <a:t>Спасибо за внимание!</a:t>
+            </a:r>
+          </a:p>
+          <a:p>
+            <a:pPr marL="0" lvl="0" indent="0" algn="l" rtl="0">
+              <a:spcBef>
+                <a:spcPts val="0"/>
+              </a:spcBef>
+              <a:spcAft>
+                <a:spcPts val="0"/>
+              </a:spcAft>
+              <a:buNone/>
+            </a:pPr>
+            <a:endParaRPr lang="ru-RU" dirty="0">
+              <a:solidFill>
+                <a:srgbClr val="212121"/>
+              </a:solidFill>
+              <a:latin typeface="Roboto"/>
+              <a:ea typeface="Roboto"/>
+              <a:cs typeface="Roboto"/>
+              <a:sym typeface="Roboto"/>
+            </a:endParaRPr>
+          </a:p>
+          <a:p>
+            <a:pPr marL="0" lvl="0" indent="0" algn="l" rtl="0">
+              <a:spcBef>
+                <a:spcPts val="0"/>
+              </a:spcBef>
+              <a:spcAft>
+                <a:spcPts val="0"/>
+              </a:spcAft>
+              <a:buNone/>
+            </a:pPr>
+            <a:r>
+              <a:rPr lang="ru-RU" dirty="0">
+                <a:solidFill>
+                  <a:srgbClr val="212121"/>
+                </a:solidFill>
+                <a:latin typeface="Roboto"/>
+                <a:ea typeface="Roboto"/>
+                <a:cs typeface="Roboto"/>
+                <a:sym typeface="Roboto"/>
+              </a:rPr>
+              <a:t>До встречи ;)</a:t>
+            </a:r>
+            <a:endParaRPr dirty="0">
+              <a:solidFill>
+                <a:srgbClr val="212121"/>
+              </a:solidFill>
+              <a:latin typeface="Roboto"/>
+              <a:ea typeface="Roboto"/>
+              <a:cs typeface="Roboto"/>
+              <a:sym typeface="Roboto"/>
+            </a:endParaRPr>
+          </a:p>
+        </p:txBody>
+      </p:sp>
     </p:spTree>
     <p:extLst>
       <p:ext uri="{BB962C8B-B14F-4D97-AF65-F5344CB8AC3E}">
@@ -2424,7 +2509,7 @@
 </file>
 
 <file path=ppt/slideLayouts/slideLayout8.xml><?xml version="1.0" encoding="utf-8"?>
-<p:sldLayout xmlns:a="http://schemas.openxmlformats.org/drawingml/2006/main" xmlns:r="http://schemas.openxmlformats.org/officeDocument/2006/relationships" xmlns:p="http://schemas.openxmlformats.org/presentationml/2006/main" type="objTx" preserve="1">
+<p:sldLayout xmlns:a="http://schemas.openxmlformats.org/drawingml/2006/main" xmlns:r="http://schemas.openxmlformats.org/officeDocument/2006/relationships" xmlns:p="http://schemas.openxmlformats.org/presentationml/2006/main" preserve="1" userDrawn="1">
   <p:cSld name="Content with Caption">
     <p:bg>
       <p:bgPr>
@@ -2456,41 +2541,6 @@
       </p:grpSpPr>
       <p:sp>
         <p:nvSpPr>
-          <p:cNvPr id="2" name="Title 1"/>
-          <p:cNvSpPr>
-            <a:spLocks noGrp="1"/>
-          </p:cNvSpPr>
-          <p:nvPr>
-            <p:ph type="title"/>
-          </p:nvPr>
-        </p:nvSpPr>
-        <p:spPr>
-          <a:xfrm>
-            <a:off x="457201" y="204787"/>
-            <a:ext cx="3008313" cy="871538"/>
-          </a:xfrm>
-        </p:spPr>
-        <p:txBody>
-          <a:bodyPr anchor="b"/>
-          <a:lstStyle>
-            <a:lvl1pPr algn="l">
-              <a:defRPr sz="1500" b="1">
-                <a:solidFill>
-                  <a:srgbClr val="FD6435"/>
-                </a:solidFill>
-              </a:defRPr>
-            </a:lvl1pPr>
-          </a:lstStyle>
-          <a:p>
-            <a:r>
-              <a:rPr lang="en-US" dirty="0"/>
-              <a:t>Click to edit Master title style</a:t>
-            </a:r>
-          </a:p>
-        </p:txBody>
-      </p:sp>
-      <p:sp>
-        <p:nvSpPr>
           <p:cNvPr id="3" name="Content Placeholder 2"/>
           <p:cNvSpPr>
             <a:spLocks noGrp="1"/>
@@ -2501,8 +2551,8 @@
         </p:nvSpPr>
         <p:spPr>
           <a:xfrm>
-            <a:off x="3575050" y="204788"/>
-            <a:ext cx="5111750" cy="4389835"/>
+            <a:off x="4572000" y="1151335"/>
+            <a:ext cx="4114800" cy="3443288"/>
           </a:xfrm>
         </p:spPr>
         <p:txBody>
@@ -2589,75 +2639,6 @@
             <a:r>
               <a:rPr lang="en-US" dirty="0"/>
               <a:t>Fifth level</a:t>
-            </a:r>
-          </a:p>
-        </p:txBody>
-      </p:sp>
-      <p:sp>
-        <p:nvSpPr>
-          <p:cNvPr id="4" name="Text Placeholder 3"/>
-          <p:cNvSpPr>
-            <a:spLocks noGrp="1"/>
-          </p:cNvSpPr>
-          <p:nvPr>
-            <p:ph type="body" sz="half" idx="2"/>
-          </p:nvPr>
-        </p:nvSpPr>
-        <p:spPr>
-          <a:xfrm>
-            <a:off x="457201" y="1076326"/>
-            <a:ext cx="3008313" cy="3518297"/>
-          </a:xfrm>
-        </p:spPr>
-        <p:txBody>
-          <a:bodyPr/>
-          <a:lstStyle>
-            <a:lvl1pPr marL="0" indent="0">
-              <a:buNone/>
-              <a:defRPr sz="1050">
-                <a:solidFill>
-                  <a:schemeClr val="bg1"/>
-                </a:solidFill>
-              </a:defRPr>
-            </a:lvl1pPr>
-            <a:lvl2pPr marL="342900" indent="0">
-              <a:buNone/>
-              <a:defRPr sz="900"/>
-            </a:lvl2pPr>
-            <a:lvl3pPr marL="685800" indent="0">
-              <a:buNone/>
-              <a:defRPr sz="750"/>
-            </a:lvl3pPr>
-            <a:lvl4pPr marL="1028700" indent="0">
-              <a:buNone/>
-              <a:defRPr sz="675"/>
-            </a:lvl4pPr>
-            <a:lvl5pPr marL="1371600" indent="0">
-              <a:buNone/>
-              <a:defRPr sz="675"/>
-            </a:lvl5pPr>
-            <a:lvl6pPr marL="1714500" indent="0">
-              <a:buNone/>
-              <a:defRPr sz="675"/>
-            </a:lvl6pPr>
-            <a:lvl7pPr marL="2057400" indent="0">
-              <a:buNone/>
-              <a:defRPr sz="675"/>
-            </a:lvl7pPr>
-            <a:lvl8pPr marL="2400300" indent="0">
-              <a:buNone/>
-              <a:defRPr sz="675"/>
-            </a:lvl8pPr>
-            <a:lvl9pPr marL="2743200" indent="0">
-              <a:buNone/>
-              <a:defRPr sz="675"/>
-            </a:lvl9pPr>
-          </a:lstStyle>
-          <a:p>
-            <a:pPr lvl="0"/>
-            <a:r>
-              <a:rPr lang="en-US" dirty="0"/>
-              <a:t>Click to edit Master text styles</a:t>
             </a:r>
           </a:p>
         </p:txBody>
@@ -2792,6 +2773,228 @@
           </a:p>
         </p:txBody>
       </p:sp>
+      <p:sp>
+        <p:nvSpPr>
+          <p:cNvPr id="6" name="Text Placeholder 2">
+            <a:extLst>
+              <a:ext uri="{FF2B5EF4-FFF2-40B4-BE49-F238E27FC236}">
+                <a16:creationId xmlns:a16="http://schemas.microsoft.com/office/drawing/2014/main" id="{D4BCB0AA-6968-3B8A-7F32-11A39C0E23A3}"/>
+              </a:ext>
+            </a:extLst>
+          </p:cNvPr>
+          <p:cNvSpPr>
+            <a:spLocks noGrp="1"/>
+          </p:cNvSpPr>
+          <p:nvPr>
+            <p:ph type="body" idx="10"/>
+          </p:nvPr>
+        </p:nvSpPr>
+        <p:spPr>
+          <a:xfrm>
+            <a:off x="457200" y="1151335"/>
+            <a:ext cx="4040188" cy="479822"/>
+          </a:xfrm>
+        </p:spPr>
+        <p:txBody>
+          <a:bodyPr anchor="b"/>
+          <a:lstStyle>
+            <a:lvl1pPr marL="0" indent="0">
+              <a:buNone/>
+              <a:defRPr sz="1800" b="1" baseline="0">
+                <a:solidFill>
+                  <a:srgbClr val="FD6435"/>
+                </a:solidFill>
+                <a:latin typeface="+Заголовок 2"/>
+              </a:defRPr>
+            </a:lvl1pPr>
+            <a:lvl2pPr marL="342900" indent="0">
+              <a:buNone/>
+              <a:defRPr sz="1500" b="1"/>
+            </a:lvl2pPr>
+            <a:lvl3pPr marL="685800" indent="0">
+              <a:buNone/>
+              <a:defRPr sz="1350" b="1"/>
+            </a:lvl3pPr>
+            <a:lvl4pPr marL="1028700" indent="0">
+              <a:buNone/>
+              <a:defRPr sz="1200" b="1"/>
+            </a:lvl4pPr>
+            <a:lvl5pPr marL="1371600" indent="0">
+              <a:buNone/>
+              <a:defRPr sz="1200" b="1"/>
+            </a:lvl5pPr>
+            <a:lvl6pPr marL="1714500" indent="0">
+              <a:buNone/>
+              <a:defRPr sz="1200" b="1"/>
+            </a:lvl6pPr>
+            <a:lvl7pPr marL="2057400" indent="0">
+              <a:buNone/>
+              <a:defRPr sz="1200" b="1"/>
+            </a:lvl7pPr>
+            <a:lvl8pPr marL="2400300" indent="0">
+              <a:buNone/>
+              <a:defRPr sz="1200" b="1"/>
+            </a:lvl8pPr>
+            <a:lvl9pPr marL="2743200" indent="0">
+              <a:buNone/>
+              <a:defRPr sz="1200" b="1"/>
+            </a:lvl9pPr>
+          </a:lstStyle>
+          <a:p>
+            <a:pPr lvl="0"/>
+            <a:r>
+              <a:rPr lang="en-US" dirty="0"/>
+              <a:t>Click to edit Master text styles</a:t>
+            </a:r>
+          </a:p>
+        </p:txBody>
+      </p:sp>
+      <p:sp>
+        <p:nvSpPr>
+          <p:cNvPr id="7" name="Content Placeholder 3">
+            <a:extLst>
+              <a:ext uri="{FF2B5EF4-FFF2-40B4-BE49-F238E27FC236}">
+                <a16:creationId xmlns:a16="http://schemas.microsoft.com/office/drawing/2014/main" id="{95CFA527-AF59-94AE-9BAC-8EE3F5FB1FDC}"/>
+              </a:ext>
+            </a:extLst>
+          </p:cNvPr>
+          <p:cNvSpPr>
+            <a:spLocks noGrp="1"/>
+          </p:cNvSpPr>
+          <p:nvPr>
+            <p:ph sz="half" idx="2"/>
+          </p:nvPr>
+        </p:nvSpPr>
+        <p:spPr>
+          <a:xfrm>
+            <a:off x="457200" y="1631156"/>
+            <a:ext cx="4040188" cy="2963466"/>
+          </a:xfrm>
+        </p:spPr>
+        <p:txBody>
+          <a:bodyPr/>
+          <a:lstStyle>
+            <a:lvl1pPr>
+              <a:buClr>
+                <a:srgbClr val="FD6435"/>
+              </a:buClr>
+              <a:defRPr sz="1800">
+                <a:solidFill>
+                  <a:schemeClr val="bg1"/>
+                </a:solidFill>
+              </a:defRPr>
+            </a:lvl1pPr>
+            <a:lvl2pPr>
+              <a:defRPr sz="1500">
+                <a:solidFill>
+                  <a:schemeClr val="bg1"/>
+                </a:solidFill>
+              </a:defRPr>
+            </a:lvl2pPr>
+            <a:lvl3pPr>
+              <a:defRPr sz="1350">
+                <a:solidFill>
+                  <a:schemeClr val="bg1"/>
+                </a:solidFill>
+              </a:defRPr>
+            </a:lvl3pPr>
+            <a:lvl4pPr>
+              <a:defRPr sz="1200">
+                <a:solidFill>
+                  <a:schemeClr val="bg1"/>
+                </a:solidFill>
+              </a:defRPr>
+            </a:lvl4pPr>
+            <a:lvl5pPr>
+              <a:defRPr sz="1200">
+                <a:solidFill>
+                  <a:schemeClr val="bg1"/>
+                </a:solidFill>
+              </a:defRPr>
+            </a:lvl5pPr>
+            <a:lvl6pPr>
+              <a:defRPr sz="1200"/>
+            </a:lvl6pPr>
+            <a:lvl7pPr>
+              <a:defRPr sz="1200"/>
+            </a:lvl7pPr>
+            <a:lvl8pPr>
+              <a:defRPr sz="1200"/>
+            </a:lvl8pPr>
+            <a:lvl9pPr>
+              <a:defRPr sz="1200"/>
+            </a:lvl9pPr>
+          </a:lstStyle>
+          <a:p>
+            <a:pPr lvl="0"/>
+            <a:r>
+              <a:rPr lang="en-US" dirty="0"/>
+              <a:t>Click to edit Master text styles</a:t>
+            </a:r>
+          </a:p>
+          <a:p>
+            <a:pPr lvl="1"/>
+            <a:r>
+              <a:rPr lang="en-US" dirty="0"/>
+              <a:t>Second level</a:t>
+            </a:r>
+          </a:p>
+          <a:p>
+            <a:pPr lvl="2"/>
+            <a:r>
+              <a:rPr lang="en-US" dirty="0"/>
+              <a:t>Third level</a:t>
+            </a:r>
+          </a:p>
+          <a:p>
+            <a:pPr lvl="3"/>
+            <a:r>
+              <a:rPr lang="en-US" dirty="0"/>
+              <a:t>Fourth level</a:t>
+            </a:r>
+          </a:p>
+          <a:p>
+            <a:pPr lvl="4"/>
+            <a:r>
+              <a:rPr lang="en-US" dirty="0"/>
+              <a:t>Fifth level</a:t>
+            </a:r>
+          </a:p>
+        </p:txBody>
+      </p:sp>
+      <p:sp>
+        <p:nvSpPr>
+          <p:cNvPr id="9" name="Заголовок 8">
+            <a:extLst>
+              <a:ext uri="{FF2B5EF4-FFF2-40B4-BE49-F238E27FC236}">
+                <a16:creationId xmlns:a16="http://schemas.microsoft.com/office/drawing/2014/main" id="{FB47BD9B-F2D0-6358-9482-569589771537}"/>
+              </a:ext>
+            </a:extLst>
+          </p:cNvPr>
+          <p:cNvSpPr>
+            <a:spLocks noGrp="1"/>
+          </p:cNvSpPr>
+          <p:nvPr>
+            <p:ph type="title" hasCustomPrompt="1"/>
+          </p:nvPr>
+        </p:nvSpPr>
+        <p:spPr/>
+        <p:txBody>
+          <a:bodyPr/>
+          <a:lstStyle>
+            <a:lvl1pPr>
+              <a:defRPr/>
+            </a:lvl1pPr>
+          </a:lstStyle>
+          <a:p>
+            <a:r>
+              <a:rPr lang="en-US" dirty="0"/>
+              <a:t>Slide Title</a:t>
+            </a:r>
+            <a:endParaRPr lang="ru-RU" dirty="0"/>
+          </a:p>
+        </p:txBody>
+      </p:sp>
     </p:spTree>
     <p:extLst>
       <p:ext uri="{BB962C8B-B14F-4D97-AF65-F5344CB8AC3E}">
@@ -2822,7 +3025,7 @@
 </file>
 
 <file path=ppt/slideLayouts/slideLayout9.xml><?xml version="1.0" encoding="utf-8"?>
-<p:sldLayout xmlns:a="http://schemas.openxmlformats.org/drawingml/2006/main" xmlns:r="http://schemas.openxmlformats.org/officeDocument/2006/relationships" xmlns:p="http://schemas.openxmlformats.org/presentationml/2006/main" type="picTx" preserve="1">
+<p:sldLayout xmlns:a="http://schemas.openxmlformats.org/drawingml/2006/main" xmlns:r="http://schemas.openxmlformats.org/officeDocument/2006/relationships" xmlns:p="http://schemas.openxmlformats.org/presentationml/2006/main" preserve="1" userDrawn="1">
   <p:cSld name="Picture with Caption">
     <p:bg>
       <p:bgPr>
@@ -2854,41 +3057,6 @@
       </p:grpSpPr>
       <p:sp>
         <p:nvSpPr>
-          <p:cNvPr id="2" name="Title 1"/>
-          <p:cNvSpPr>
-            <a:spLocks noGrp="1"/>
-          </p:cNvSpPr>
-          <p:nvPr>
-            <p:ph type="title"/>
-          </p:nvPr>
-        </p:nvSpPr>
-        <p:spPr>
-          <a:xfrm>
-            <a:off x="1792288" y="3600450"/>
-            <a:ext cx="5486400" cy="425054"/>
-          </a:xfrm>
-        </p:spPr>
-        <p:txBody>
-          <a:bodyPr anchor="b"/>
-          <a:lstStyle>
-            <a:lvl1pPr algn="l">
-              <a:defRPr sz="1500" b="1">
-                <a:solidFill>
-                  <a:srgbClr val="FD6435"/>
-                </a:solidFill>
-              </a:defRPr>
-            </a:lvl1pPr>
-          </a:lstStyle>
-          <a:p>
-            <a:r>
-              <a:rPr lang="en-US" dirty="0"/>
-              <a:t>Click to edit Master title style</a:t>
-            </a:r>
-          </a:p>
-        </p:txBody>
-      </p:sp>
-      <p:sp>
-        <p:nvSpPr>
           <p:cNvPr id="3" name="Picture Placeholder 2"/>
           <p:cNvSpPr>
             <a:spLocks noGrp="1"/>
@@ -2899,8 +3067,8 @@
         </p:nvSpPr>
         <p:spPr>
           <a:xfrm>
-            <a:off x="1792288" y="459581"/>
-            <a:ext cx="5486400" cy="3086100"/>
+            <a:off x="1792288" y="1063229"/>
+            <a:ext cx="5486400" cy="2482452"/>
           </a:xfrm>
         </p:spPr>
         <p:txBody>
@@ -3144,6 +3312,114 @@
               <a:t>‹#›</a:t>
             </a:fld>
             <a:endParaRPr lang="en-US" dirty="0"/>
+          </a:p>
+        </p:txBody>
+      </p:sp>
+      <p:sp>
+        <p:nvSpPr>
+          <p:cNvPr id="7" name="Заголовок 6">
+            <a:extLst>
+              <a:ext uri="{FF2B5EF4-FFF2-40B4-BE49-F238E27FC236}">
+                <a16:creationId xmlns:a16="http://schemas.microsoft.com/office/drawing/2014/main" id="{C2FD4F05-44DA-BBE9-4C27-A35473799FD2}"/>
+              </a:ext>
+            </a:extLst>
+          </p:cNvPr>
+          <p:cNvSpPr>
+            <a:spLocks noGrp="1"/>
+          </p:cNvSpPr>
+          <p:nvPr>
+            <p:ph type="title" hasCustomPrompt="1"/>
+          </p:nvPr>
+        </p:nvSpPr>
+        <p:spPr/>
+        <p:txBody>
+          <a:bodyPr/>
+          <a:lstStyle>
+            <a:lvl1pPr>
+              <a:defRPr/>
+            </a:lvl1pPr>
+          </a:lstStyle>
+          <a:p>
+            <a:r>
+              <a:rPr lang="en-US" dirty="0"/>
+              <a:t>Click to edit master title style</a:t>
+            </a:r>
+            <a:endParaRPr lang="ru-RU" dirty="0"/>
+          </a:p>
+        </p:txBody>
+      </p:sp>
+      <p:sp>
+        <p:nvSpPr>
+          <p:cNvPr id="9" name="Text Placeholder 2">
+            <a:extLst>
+              <a:ext uri="{FF2B5EF4-FFF2-40B4-BE49-F238E27FC236}">
+                <a16:creationId xmlns:a16="http://schemas.microsoft.com/office/drawing/2014/main" id="{249FD09A-269D-C436-522D-763BFB40563A}"/>
+              </a:ext>
+            </a:extLst>
+          </p:cNvPr>
+          <p:cNvSpPr>
+            <a:spLocks noGrp="1"/>
+          </p:cNvSpPr>
+          <p:nvPr>
+            <p:ph type="body" idx="10"/>
+          </p:nvPr>
+        </p:nvSpPr>
+        <p:spPr>
+          <a:xfrm>
+            <a:off x="1792288" y="3545681"/>
+            <a:ext cx="4040188" cy="479822"/>
+          </a:xfrm>
+        </p:spPr>
+        <p:txBody>
+          <a:bodyPr anchor="b"/>
+          <a:lstStyle>
+            <a:lvl1pPr marL="0" indent="0">
+              <a:buNone/>
+              <a:defRPr sz="1800" b="1">
+                <a:solidFill>
+                  <a:srgbClr val="FD6435"/>
+                </a:solidFill>
+              </a:defRPr>
+            </a:lvl1pPr>
+            <a:lvl2pPr marL="342900" indent="0">
+              <a:buNone/>
+              <a:defRPr sz="1500" b="1"/>
+            </a:lvl2pPr>
+            <a:lvl3pPr marL="685800" indent="0">
+              <a:buNone/>
+              <a:defRPr sz="1350" b="1"/>
+            </a:lvl3pPr>
+            <a:lvl4pPr marL="1028700" indent="0">
+              <a:buNone/>
+              <a:defRPr sz="1200" b="1"/>
+            </a:lvl4pPr>
+            <a:lvl5pPr marL="1371600" indent="0">
+              <a:buNone/>
+              <a:defRPr sz="1200" b="1"/>
+            </a:lvl5pPr>
+            <a:lvl6pPr marL="1714500" indent="0">
+              <a:buNone/>
+              <a:defRPr sz="1200" b="1"/>
+            </a:lvl6pPr>
+            <a:lvl7pPr marL="2057400" indent="0">
+              <a:buNone/>
+              <a:defRPr sz="1200" b="1"/>
+            </a:lvl7pPr>
+            <a:lvl8pPr marL="2400300" indent="0">
+              <a:buNone/>
+              <a:defRPr sz="1200" b="1"/>
+            </a:lvl8pPr>
+            <a:lvl9pPr marL="2743200" indent="0">
+              <a:buNone/>
+              <a:defRPr sz="1200" b="1"/>
+            </a:lvl9pPr>
+          </a:lstStyle>
+          <a:p>
+            <a:pPr lvl="0"/>
+            <a:r>
+              <a:rPr lang="en-US" dirty="0"/>
+              <a:t>Click to edit Master text styles</a:t>
+            </a:r>
           </a:p>
         </p:txBody>
       </p:sp>
@@ -3389,6 +3665,9 @@
         <a:spcBef>
           <a:spcPct val="20000"/>
         </a:spcBef>
+        <a:buClr>
+          <a:srgbClr val="FD6435"/>
+        </a:buClr>
         <a:buFont typeface="Arial"/>
         <a:buChar char="•"/>
         <a:defRPr kern="1200" sz="2400">
@@ -3404,6 +3683,9 @@
         <a:spcBef>
           <a:spcPct val="20000"/>
         </a:spcBef>
+        <a:buClr>
+          <a:srgbClr val="FD6435"/>
+        </a:buClr>
         <a:buFont typeface="Arial"/>
         <a:buChar char="–"/>
         <a:defRPr kern="1200" sz="2100">
@@ -3665,8 +3947,8 @@
         </p:nvSpPr>
         <p:spPr>
           <a:xfrm>
-            <a:off x="648000" y="1597819"/>
-            <a:ext cx="7772400" cy="1102519"/>
+            <a:off x="647999" y="2920778"/>
+            <a:ext cx="8405209" cy="1102519"/>
           </a:xfrm>
         </p:spPr>
         <p:txBody>
@@ -3695,8 +3977,8 @@
         </p:nvSpPr>
         <p:spPr>
           <a:xfrm>
-            <a:off x="648000" y="2914650"/>
-            <a:ext cx="6400800" cy="1314450"/>
+            <a:off x="647999" y="1597819"/>
+            <a:ext cx="8405210" cy="973931"/>
           </a:xfrm>
         </p:spPr>
         <p:txBody>
@@ -3706,21 +3988,442 @@
             <a:pPr lvl="0" indent="0" marL="0">
               <a:buNone/>
             </a:pPr>
+            <a:r>
+              <a:rPr/>
+              <a:t>Язык R для анализа данных</a:t>
+            </a:r>
             <a:br/>
             <a:br/>
-            <a:r>
-              <a:rPr/>
-              <a:t>otus.ru</a:t>
-            </a:r>
           </a:p>
         </p:txBody>
       </p:sp>
+      <p:sp/>
     </p:spTree>
   </p:cSld>
 </p:sld>
 </file>
 
-<file path=ppt/slides/slide2.xml><?xml version="1.0" encoding="utf-8"?>
+<file path=ppt/slides/slide10.xml><?xml version="1.0" encoding="utf-8"?>
+<p:sld xmlns:a="http://schemas.openxmlformats.org/drawingml/2006/main" xmlns:r="http://schemas.openxmlformats.org/officeDocument/2006/relationships" xmlns:p="http://schemas.openxmlformats.org/presentationml/2006/main">
+  <p:cSld>
+    <p:spTree>
+      <p:nvGrpSpPr>
+        <p:cNvPr id="1" name=""/>
+        <p:cNvGrpSpPr/>
+        <p:nvPr/>
+      </p:nvGrpSpPr>
+      <p:grpSpPr>
+        <a:xfrm>
+          <a:off x="0" y="0"/>
+          <a:ext cx="0" cy="0"/>
+          <a:chOff x="0" y="0"/>
+          <a:chExt cx="0" cy="0"/>
+        </a:xfrm>
+      </p:grpSpPr>
+      <p:sp>
+        <p:nvSpPr>
+          <p:cNvPr id="9" name="Заголовок 8">
+            <a:extLst>
+              <a:ext uri="{FF2B5EF4-FFF2-40B4-BE49-F238E27FC236}">
+                <a16:creationId xmlns:a16="http://schemas.microsoft.com/office/drawing/2014/main" id="{FB47BD9B-F2D0-6358-9482-569589771537}"/>
+              </a:ext>
+            </a:extLst>
+          </p:cNvPr>
+          <p:cNvSpPr>
+            <a:spLocks noGrp="1"/>
+          </p:cNvSpPr>
+          <p:nvPr>
+            <p:ph hasCustomPrompt="1" type="title"/>
+          </p:nvPr>
+        </p:nvSpPr>
+        <p:spPr/>
+        <p:txBody>
+          <a:bodyPr/>
+          <a:lstStyle/>
+          <a:p>
+            <a:pPr lvl="0" indent="0" marL="0">
+              <a:buNone/>
+            </a:pPr>
+            <a:r>
+              <a:rPr/>
+              <a:t>Что нового: все в одном</a:t>
+            </a:r>
+          </a:p>
+        </p:txBody>
+      </p:sp>
+      <p:sp>
+        <p:nvSpPr>
+          <p:cNvPr id="6" name="Text Placeholder 2">
+            <a:extLst>
+              <a:ext uri="{FF2B5EF4-FFF2-40B4-BE49-F238E27FC236}">
+                <a16:creationId xmlns:a16="http://schemas.microsoft.com/office/drawing/2014/main" id="{D4BCB0AA-6968-3B8A-7F32-11A39C0E23A3}"/>
+              </a:ext>
+            </a:extLst>
+          </p:cNvPr>
+          <p:cNvSpPr>
+            <a:spLocks noGrp="1"/>
+          </p:cNvSpPr>
+          <p:nvPr>
+            <p:ph idx="10" type="body"/>
+          </p:nvPr>
+        </p:nvSpPr>
+        <p:spPr/>
+        <p:txBody>
+          <a:bodyPr/>
+          <a:lstStyle/>
+          <a:p>
+            <a:pPr lvl="0" indent="0" marL="0">
+              <a:buNone/>
+            </a:pPr>
+            <a:r>
+              <a:rPr/>
+              <a:t>Quarto поддерживает множество форматов вывода, включая HTML, PDF, EPUB и другие. В Rmarkdown для большинства этих форматов необходимы дополнительные библиотеки:</a:t>
+            </a:r>
+          </a:p>
+        </p:txBody>
+      </p:sp>
+      <p:graphicFrame>
+        <p:nvGraphicFramePr>
+          <p:cNvPr id="6" name="Content Placeholder 5"/>
+          <p:cNvGraphicFramePr>
+            <a:graphicFrameLocks noGrp="1"/>
+          </p:cNvGraphicFramePr>
+          <p:nvPr>
+            <p:ph idx="1"/>
+          </p:nvPr>
+        </p:nvGraphicFramePr>
+        <p:xfrm>
+          <a:off x="4572000" y="1143000"/>
+          <a:ext cx="4114800" cy="3441700"/>
+        </p:xfrm>
+        <a:graphic>
+          <a:graphicData uri="http://schemas.openxmlformats.org/drawingml/2006/table">
+            <a:tbl>
+              <a:tblPr firstRow="1" bandRow="1">
+                <a:tableStyleId>{5C22544A-7EE6-4342-B048-85BDC9FD1C3A}</a:tableStyleId>
+              </a:tblPr>
+              <a:tblGrid>
+                <a:gridCol w="2057400"/>
+                <a:gridCol w="2057400"/>
+              </a:tblGrid>
+              <a:tr h="0">
+                <a:tc>
+                  <a:txBody>
+                    <a:bodyPr/>
+                    <a:lstStyle/>
+                    <a:p>
+                      <a:pPr lvl="0" indent="0" marL="0">
+                        <a:buNone/>
+                      </a:pPr>
+                      <a:r>
+                        <a:rPr b="1"/>
+                        <a:t>Возможности Quarto</a:t>
+                      </a:r>
+                    </a:p>
+                  </a:txBody>
+                  <a:tcPr/>
+                </a:tc>
+                <a:tc>
+                  <a:txBody>
+                    <a:bodyPr/>
+                    <a:lstStyle/>
+                    <a:p>
+                      <a:pPr lvl="0" indent="0" marL="0">
+                        <a:buNone/>
+                      </a:pPr>
+                      <a:r>
+                        <a:rPr b="1"/>
+                        <a:t>Реализация в Rmarkdown</a:t>
+                      </a:r>
+                    </a:p>
+                  </a:txBody>
+                  <a:tcPr/>
+                </a:tc>
+              </a:tr>
+              <a:tr h="0">
+                <a:tc>
+                  <a:txBody>
+                    <a:bodyPr/>
+                    <a:lstStyle/>
+                    <a:p>
+                      <a:pPr lvl="0" indent="0" marL="0">
+                        <a:buNone/>
+                      </a:pPr>
+                      <a:r>
+                        <a:rPr/>
+                        <a:t>HTML</a:t>
+                      </a:r>
+                    </a:p>
+                  </a:txBody>
+                </a:tc>
+                <a:tc>
+                  <a:txBody>
+                    <a:bodyPr/>
+                    <a:lstStyle/>
+                    <a:p>
+                      <a:pPr lvl="0" indent="0" marL="0">
+                        <a:buNone/>
+                      </a:pPr>
+                      <a:r>
+                        <a:rPr/>
+                        <a:t>✓</a:t>
+                      </a:r>
+                    </a:p>
+                  </a:txBody>
+                </a:tc>
+              </a:tr>
+              <a:tr h="0">
+                <a:tc>
+                  <a:txBody>
+                    <a:bodyPr/>
+                    <a:lstStyle/>
+                    <a:p>
+                      <a:pPr lvl="0" indent="0" marL="0">
+                        <a:buNone/>
+                      </a:pPr>
+                      <a:r>
+                        <a:rPr/>
+                        <a:t>PDF</a:t>
+                      </a:r>
+                    </a:p>
+                  </a:txBody>
+                </a:tc>
+                <a:tc>
+                  <a:txBody>
+                    <a:bodyPr/>
+                    <a:lstStyle/>
+                    <a:p>
+                      <a:pPr lvl="0" indent="0" marL="0">
+                        <a:buNone/>
+                      </a:pPr>
+                      <a:r>
+                        <a:rPr/>
+                        <a:t>✓</a:t>
+                      </a:r>
+                    </a:p>
+                  </a:txBody>
+                </a:tc>
+              </a:tr>
+              <a:tr h="0">
+                <a:tc>
+                  <a:txBody>
+                    <a:bodyPr/>
+                    <a:lstStyle/>
+                    <a:p>
+                      <a:pPr lvl="0" indent="0" marL="0">
+                        <a:buNone/>
+                      </a:pPr>
+                      <a:r>
+                        <a:rPr/>
+                        <a:t>DOCX/ODT</a:t>
+                      </a:r>
+                    </a:p>
+                  </a:txBody>
+                </a:tc>
+                <a:tc>
+                  <a:txBody>
+                    <a:bodyPr/>
+                    <a:lstStyle/>
+                    <a:p>
+                      <a:pPr lvl="0" indent="0" marL="0">
+                        <a:buNone/>
+                      </a:pPr>
+                      <a:r>
+                        <a:rPr/>
+                        <a:t>✓</a:t>
+                      </a:r>
+                    </a:p>
+                  </a:txBody>
+                </a:tc>
+              </a:tr>
+              <a:tr h="0">
+                <a:tc>
+                  <a:txBody>
+                    <a:bodyPr/>
+                    <a:lstStyle/>
+                    <a:p>
+                      <a:pPr lvl="0" indent="0" marL="0">
+                        <a:buNone/>
+                      </a:pPr>
+                      <a:r>
+                        <a:rPr/>
+                        <a:t>PowerPoint</a:t>
+                      </a:r>
+                    </a:p>
+                  </a:txBody>
+                </a:tc>
+                <a:tc>
+                  <a:txBody>
+                    <a:bodyPr/>
+                    <a:lstStyle/>
+                    <a:p>
+                      <a:pPr lvl="0" indent="0" marL="0">
+                        <a:buNone/>
+                      </a:pPr>
+                      <a:r>
+                        <a:rPr/>
+                        <a:t>✓</a:t>
+                      </a:r>
+                    </a:p>
+                  </a:txBody>
+                </a:tc>
+              </a:tr>
+              <a:tr h="0">
+                <a:tc>
+                  <a:txBody>
+                    <a:bodyPr/>
+                    <a:lstStyle/>
+                    <a:p>
+                      <a:pPr lvl="0" indent="0" marL="0">
+                        <a:buNone/>
+                      </a:pPr>
+                      <a:r>
+                        <a:rPr/>
+                        <a:t>сайт/блог</a:t>
+                      </a:r>
+                    </a:p>
+                  </a:txBody>
+                </a:tc>
+                <a:tc>
+                  <a:txBody>
+                    <a:bodyPr/>
+                    <a:lstStyle/>
+                    <a:p>
+                      <a:pPr lvl="0" indent="0" marL="0">
+                        <a:buNone/>
+                      </a:pPr>
+                      <a:r>
+                        <a:rPr>
+                          <a:latin typeface="Courier"/>
+                        </a:rPr>
+                        <a:t>distill</a:t>
+                      </a:r>
+                      <a:r>
+                        <a:rPr/>
+                        <a:t>, </a:t>
+                      </a:r>
+                      <a:r>
+                        <a:rPr>
+                          <a:latin typeface="Courier"/>
+                        </a:rPr>
+                        <a:t>blogdown</a:t>
+                      </a:r>
+                    </a:p>
+                  </a:txBody>
+                </a:tc>
+              </a:tr>
+              <a:tr h="0">
+                <a:tc>
+                  <a:txBody>
+                    <a:bodyPr/>
+                    <a:lstStyle/>
+                    <a:p>
+                      <a:pPr lvl="0" indent="0" marL="0">
+                        <a:buNone/>
+                      </a:pPr>
+                      <a:r>
+                        <a:rPr/>
+                        <a:t>HTML-презентация</a:t>
+                      </a:r>
+                    </a:p>
+                  </a:txBody>
+                </a:tc>
+                <a:tc>
+                  <a:txBody>
+                    <a:bodyPr/>
+                    <a:lstStyle/>
+                    <a:p>
+                      <a:pPr lvl="0" indent="0" marL="0">
+                        <a:buNone/>
+                      </a:pPr>
+                      <a:r>
+                        <a:rPr>
+                          <a:latin typeface="Courier"/>
+                        </a:rPr>
+                        <a:t>revealjs</a:t>
+                      </a:r>
+                    </a:p>
+                  </a:txBody>
+                </a:tc>
+              </a:tr>
+              <a:tr h="0">
+                <a:tc>
+                  <a:txBody>
+                    <a:bodyPr/>
+                    <a:lstStyle/>
+                    <a:p>
+                      <a:pPr lvl="0" indent="0" marL="0">
+                        <a:buNone/>
+                      </a:pPr>
+                      <a:r>
+                        <a:rPr/>
+                        <a:t>книга</a:t>
+                      </a:r>
+                    </a:p>
+                  </a:txBody>
+                </a:tc>
+                <a:tc>
+                  <a:txBody>
+                    <a:bodyPr/>
+                    <a:lstStyle/>
+                    <a:p>
+                      <a:pPr lvl="0" indent="0" marL="0">
+                        <a:buNone/>
+                      </a:pPr>
+                      <a:r>
+                        <a:rPr>
+                          <a:latin typeface="Courier"/>
+                        </a:rPr>
+                        <a:t>bookdown</a:t>
+                      </a:r>
+                    </a:p>
+                  </a:txBody>
+                </a:tc>
+              </a:tr>
+              <a:tr h="0">
+                <a:tc>
+                  <a:txBody>
+                    <a:bodyPr/>
+                    <a:lstStyle/>
+                    <a:p>
+                      <a:pPr lvl="0" indent="0" marL="0">
+                        <a:buNone/>
+                      </a:pPr>
+                      <a:r>
+                        <a:rPr/>
+                        <a:t>интерактивная презентация</a:t>
+                      </a:r>
+                    </a:p>
+                  </a:txBody>
+                </a:tc>
+                <a:tc>
+                  <a:txBody>
+                    <a:bodyPr/>
+                    <a:lstStyle/>
+                    <a:p>
+                      <a:pPr lvl="0" indent="0" marL="0">
+                        <a:buNone/>
+                      </a:pPr>
+                      <a:r>
+                        <a:rPr>
+                          <a:latin typeface="Courier"/>
+                        </a:rPr>
+                        <a:t>flexdashboard</a:t>
+                      </a:r>
+                    </a:p>
+                  </a:txBody>
+                </a:tc>
+              </a:tr>
+            </a:tbl>
+          </a:graphicData>
+        </a:graphic>
+      </p:graphicFrame>
+    </p:spTree>
+  </p:cSld>
+</p:sld>
+</file>
+
+<file path=ppt/slides/slide11.xml><?xml version="1.0" encoding="utf-8"?>
 <p:sld xmlns:a="http://schemas.openxmlformats.org/drawingml/2006/main" xmlns:r="http://schemas.openxmlformats.org/officeDocument/2006/relationships" xmlns:p="http://schemas.openxmlformats.org/presentationml/2006/main">
   <p:cSld>
     <p:spTree>
@@ -3757,7 +4460,7 @@
             </a:pPr>
             <a:r>
               <a:rPr/>
-              <a:t>Quarto</a:t>
+              <a:t>Что нового: модульный дизайн (1 из 3)</a:t>
             </a:r>
           </a:p>
         </p:txBody>
@@ -3782,17 +4485,26 @@
             </a:pPr>
             <a:r>
               <a:rPr/>
-              <a:t>Quarto enables you to weave together content and executable code into a finished presentation. To learn more about Quarto presentations see </a:t>
+              <a:t>Quarto позволяет разбивать анализ на маленькие, повторно используемые компоненты, которые можно собирать в сложные документы. Это делает повторное использование и комбинирование частей вашего анализа легким.</a:t>
+            </a:r>
+          </a:p>
+          <a:p>
+            <a:pPr lvl="0" indent="0" marL="0">
+              <a:buNone/>
+            </a:pPr>
+            <a:r>
+              <a:rPr/>
+              <a:t>Сложный проект на R может состоять из нескольких скриптов, содержащих загрузку и предобработку данных, специальные функции, моделирование и визуализацию. Quarto позволяет точно так же использовать файлы </a:t>
             </a:r>
             <a:r>
               <a:rPr>
-                <a:hlinkClick r:id="rId2"/>
+                <a:latin typeface="Courier"/>
               </a:rPr>
-              <a:t>https://quarto.org/docs/presentations/</a:t>
+              <a:t>.qmd</a:t>
             </a:r>
             <a:r>
               <a:rPr/>
-              <a:t>.</a:t>
+              <a:t>: собирать их в большие проекты, использовать вывод одной ячейки кода много раз.</a:t>
             </a:r>
           </a:p>
         </p:txBody>
@@ -3802,7 +4514,7 @@
 </p:sld>
 </file>
 
-<file path=ppt/slides/slide3.xml><?xml version="1.0" encoding="utf-8"?>
+<file path=ppt/slides/slide12.xml><?xml version="1.0" encoding="utf-8"?>
 <p:sld xmlns:a="http://schemas.openxmlformats.org/drawingml/2006/main" xmlns:r="http://schemas.openxmlformats.org/officeDocument/2006/relationships" xmlns:p="http://schemas.openxmlformats.org/presentationml/2006/main">
   <p:cSld>
     <p:spTree>
@@ -3839,7 +4551,7 @@
             </a:pPr>
             <a:r>
               <a:rPr/>
-              <a:t>Bullets</a:t>
+              <a:t>Что нового: модульный дизайн (2 из 3)</a:t>
             </a:r>
           </a:p>
         </p:txBody>
@@ -3864,29 +4576,87 @@
             </a:pPr>
             <a:r>
               <a:rPr/>
-              <a:t>When you click the </a:t>
-            </a:r>
-            <a:r>
-              <a:rPr b="1"/>
-              <a:t>Render</a:t>
-            </a:r>
+              <a:t>Пример: включить все объекты из файла </a:t>
+            </a:r>
+            <a:r>
+              <a:rPr>
+                <a:latin typeface="Courier"/>
+              </a:rPr>
+              <a:t>_data.qmd</a:t>
+            </a:r>
+          </a:p>
+          <a:p>
+            <a:pPr lvl="0" indent="0">
+              <a:buNone/>
+            </a:pPr>
+            <a:r>
+              <a:rPr>
+                <a:solidFill>
+                  <a:srgbClr val="003B4F"/>
+                </a:solidFill>
+                <a:latin typeface="Courier"/>
+              </a:rPr>
+              <a:t>{{&lt; include _data.qmd &gt;}}</a:t>
+            </a:r>
+          </a:p>
+          <a:p>
+            <a:pPr lvl="0" indent="0" marL="0">
+              <a:buNone/>
+            </a:pPr>
             <a:r>
               <a:rPr/>
-              <a:t> button a document will be generated that includes:</a:t>
+              <a:t>Некоторые примеры того, что можно заимствовать из других документов:</a:t>
             </a:r>
           </a:p>
           <a:p>
             <a:pPr lvl="0"/>
             <a:r>
               <a:rPr/>
-              <a:t>Content authored with markdown</a:t>
+              <a:t>Код загрузки и очистки данных</a:t>
             </a:r>
           </a:p>
           <a:p>
             <a:pPr lvl="0"/>
             <a:r>
               <a:rPr/>
-              <a:t>Output from executable code</a:t>
+              <a:t>Статистические анализы или модели</a:t>
+            </a:r>
+          </a:p>
+          <a:p>
+            <a:pPr lvl="0"/>
+            <a:r>
+              <a:rPr/>
+              <a:t>Визуализации (диаграммы, графики, карты и т. д.)</a:t>
+            </a:r>
+          </a:p>
+          <a:p>
+            <a:pPr lvl="0"/>
+            <a:r>
+              <a:rPr/>
+              <a:t>Объяснительный текст с уравнениями, изображениями и т. д.</a:t>
+            </a:r>
+          </a:p>
+          <a:p>
+            <a:pPr lvl="0"/>
+            <a:r>
+              <a:rPr/>
+              <a:t>Интерактивные выводы (бегунки, списки и т. д.)</a:t>
+            </a:r>
+          </a:p>
+          <a:p>
+            <a:pPr lvl="0"/>
+            <a:r>
+              <a:rPr/>
+              <a:t>Библиографическая информация</a:t>
+            </a:r>
+          </a:p>
+          <a:p>
+            <a:pPr lvl="0" indent="0" marL="0">
+              <a:buNone/>
+            </a:pPr>
+            <a:r>
+              <a:rPr/>
+              <a:t>https://quarto.org/docs/authoring/includes.html</a:t>
             </a:r>
           </a:p>
         </p:txBody>
@@ -3929,7 +4699,7 @@
                                         <p:tgtEl>
                                           <p:spTgt spid="3">
                                             <p:txEl>
-                                              <p:pRg st="1" end="1"/>
+                                              <p:pRg st="3" end="3"/>
                                             </p:txEl>
                                           </p:spTgt>
                                         </p:tgtEl>
@@ -3971,6 +4741,1002 @@
                                     <p:set>
                                       <p:cBhvr>
                                         <p:cTn id="10" dur="1" fill="hold">
+                                          <p:stCondLst>
+                                            <p:cond delay="0"/>
+                                          </p:stCondLst>
+                                        </p:cTn>
+                                        <p:tgtEl>
+                                          <p:spTgt spid="3">
+                                            <p:txEl>
+                                              <p:pRg st="4" end="4"/>
+                                            </p:txEl>
+                                          </p:spTgt>
+                                        </p:tgtEl>
+                                        <p:attrNameLst>
+                                          <p:attrName>style.visibility</p:attrName>
+                                        </p:attrNameLst>
+                                      </p:cBhvr>
+                                      <p:to>
+                                        <p:strVal val="visible"/>
+                                      </p:to>
+                                    </p:set>
+                                  </p:childTnLst>
+                                </p:cTn>
+                              </p:par>
+                            </p:childTnLst>
+                          </p:cTn>
+                        </p:par>
+                      </p:childTnLst>
+                    </p:cTn>
+                  </p:par>
+                  <p:par>
+                    <p:cTn id="11" fill="hold">
+                      <p:stCondLst>
+                        <p:cond delay="indefinite"/>
+                      </p:stCondLst>
+                      <p:childTnLst>
+                        <p:par>
+                          <p:cTn id="12" fill="hold">
+                            <p:stCondLst>
+                              <p:cond delay="0"/>
+                            </p:stCondLst>
+                            <p:childTnLst>
+                              <p:par>
+                                <p:cTn id="13" presetID="1" presetClass="entr" presetSubtype="0" fill="hold" grpId="0" nodeType="clickEffect">
+                                  <p:stCondLst>
+                                    <p:cond delay="0"/>
+                                  </p:stCondLst>
+                                  <p:childTnLst>
+                                    <p:set>
+                                      <p:cBhvr>
+                                        <p:cTn id="14" dur="1" fill="hold">
+                                          <p:stCondLst>
+                                            <p:cond delay="0"/>
+                                          </p:stCondLst>
+                                        </p:cTn>
+                                        <p:tgtEl>
+                                          <p:spTgt spid="3">
+                                            <p:txEl>
+                                              <p:pRg st="5" end="5"/>
+                                            </p:txEl>
+                                          </p:spTgt>
+                                        </p:tgtEl>
+                                        <p:attrNameLst>
+                                          <p:attrName>style.visibility</p:attrName>
+                                        </p:attrNameLst>
+                                      </p:cBhvr>
+                                      <p:to>
+                                        <p:strVal val="visible"/>
+                                      </p:to>
+                                    </p:set>
+                                  </p:childTnLst>
+                                </p:cTn>
+                              </p:par>
+                            </p:childTnLst>
+                          </p:cTn>
+                        </p:par>
+                      </p:childTnLst>
+                    </p:cTn>
+                  </p:par>
+                  <p:par>
+                    <p:cTn id="15" fill="hold">
+                      <p:stCondLst>
+                        <p:cond delay="indefinite"/>
+                      </p:stCondLst>
+                      <p:childTnLst>
+                        <p:par>
+                          <p:cTn id="16" fill="hold">
+                            <p:stCondLst>
+                              <p:cond delay="0"/>
+                            </p:stCondLst>
+                            <p:childTnLst>
+                              <p:par>
+                                <p:cTn id="17" presetID="1" presetClass="entr" presetSubtype="0" fill="hold" grpId="0" nodeType="clickEffect">
+                                  <p:stCondLst>
+                                    <p:cond delay="0"/>
+                                  </p:stCondLst>
+                                  <p:childTnLst>
+                                    <p:set>
+                                      <p:cBhvr>
+                                        <p:cTn id="18" dur="1" fill="hold">
+                                          <p:stCondLst>
+                                            <p:cond delay="0"/>
+                                          </p:stCondLst>
+                                        </p:cTn>
+                                        <p:tgtEl>
+                                          <p:spTgt spid="3">
+                                            <p:txEl>
+                                              <p:pRg st="6" end="6"/>
+                                            </p:txEl>
+                                          </p:spTgt>
+                                        </p:tgtEl>
+                                        <p:attrNameLst>
+                                          <p:attrName>style.visibility</p:attrName>
+                                        </p:attrNameLst>
+                                      </p:cBhvr>
+                                      <p:to>
+                                        <p:strVal val="visible"/>
+                                      </p:to>
+                                    </p:set>
+                                  </p:childTnLst>
+                                </p:cTn>
+                              </p:par>
+                            </p:childTnLst>
+                          </p:cTn>
+                        </p:par>
+                      </p:childTnLst>
+                    </p:cTn>
+                  </p:par>
+                  <p:par>
+                    <p:cTn id="19" fill="hold">
+                      <p:stCondLst>
+                        <p:cond delay="indefinite"/>
+                      </p:stCondLst>
+                      <p:childTnLst>
+                        <p:par>
+                          <p:cTn id="20" fill="hold">
+                            <p:stCondLst>
+                              <p:cond delay="0"/>
+                            </p:stCondLst>
+                            <p:childTnLst>
+                              <p:par>
+                                <p:cTn id="21" presetID="1" presetClass="entr" presetSubtype="0" fill="hold" grpId="0" nodeType="clickEffect">
+                                  <p:stCondLst>
+                                    <p:cond delay="0"/>
+                                  </p:stCondLst>
+                                  <p:childTnLst>
+                                    <p:set>
+                                      <p:cBhvr>
+                                        <p:cTn id="22" dur="1" fill="hold">
+                                          <p:stCondLst>
+                                            <p:cond delay="0"/>
+                                          </p:stCondLst>
+                                        </p:cTn>
+                                        <p:tgtEl>
+                                          <p:spTgt spid="3">
+                                            <p:txEl>
+                                              <p:pRg st="7" end="7"/>
+                                            </p:txEl>
+                                          </p:spTgt>
+                                        </p:tgtEl>
+                                        <p:attrNameLst>
+                                          <p:attrName>style.visibility</p:attrName>
+                                        </p:attrNameLst>
+                                      </p:cBhvr>
+                                      <p:to>
+                                        <p:strVal val="visible"/>
+                                      </p:to>
+                                    </p:set>
+                                  </p:childTnLst>
+                                </p:cTn>
+                              </p:par>
+                            </p:childTnLst>
+                          </p:cTn>
+                        </p:par>
+                      </p:childTnLst>
+                    </p:cTn>
+                  </p:par>
+                  <p:par>
+                    <p:cTn id="23" fill="hold">
+                      <p:stCondLst>
+                        <p:cond delay="indefinite"/>
+                      </p:stCondLst>
+                      <p:childTnLst>
+                        <p:par>
+                          <p:cTn id="24" fill="hold">
+                            <p:stCondLst>
+                              <p:cond delay="0"/>
+                            </p:stCondLst>
+                            <p:childTnLst>
+                              <p:par>
+                                <p:cTn id="25" presetID="1" presetClass="entr" presetSubtype="0" fill="hold" grpId="0" nodeType="clickEffect">
+                                  <p:stCondLst>
+                                    <p:cond delay="0"/>
+                                  </p:stCondLst>
+                                  <p:childTnLst>
+                                    <p:set>
+                                      <p:cBhvr>
+                                        <p:cTn id="26" dur="1" fill="hold">
+                                          <p:stCondLst>
+                                            <p:cond delay="0"/>
+                                          </p:stCondLst>
+                                        </p:cTn>
+                                        <p:tgtEl>
+                                          <p:spTgt spid="3">
+                                            <p:txEl>
+                                              <p:pRg st="8" end="8"/>
+                                            </p:txEl>
+                                          </p:spTgt>
+                                        </p:tgtEl>
+                                        <p:attrNameLst>
+                                          <p:attrName>style.visibility</p:attrName>
+                                        </p:attrNameLst>
+                                      </p:cBhvr>
+                                      <p:to>
+                                        <p:strVal val="visible"/>
+                                      </p:to>
+                                    </p:set>
+                                  </p:childTnLst>
+                                </p:cTn>
+                              </p:par>
+                            </p:childTnLst>
+                          </p:cTn>
+                        </p:par>
+                      </p:childTnLst>
+                    </p:cTn>
+                  </p:par>
+                </p:childTnLst>
+              </p:cTn>
+              <p:prevCondLst>
+                <p:cond evt="onPrev" delay="0">
+                  <p:tgtEl>
+                    <p:sldTgt/>
+                  </p:tgtEl>
+                </p:cond>
+              </p:prevCondLst>
+              <p:nextCondLst>
+                <p:cond evt="onNext" delay="0">
+                  <p:tgtEl>
+                    <p:sldTgt/>
+                  </p:tgtEl>
+                </p:cond>
+              </p:nextCondLst>
+            </p:seq>
+          </p:childTnLst>
+        </p:cTn>
+      </p:par>
+    </p:tnLst>
+    <p:bldLst>
+      <p:bldP spid="3" grpId="0" uiExpand="1" build="p"/>
+    </p:bldLst>
+  </p:timing>
+</p:sld>
+</file>
+
+<file path=ppt/slides/slide13.xml><?xml version="1.0" encoding="utf-8"?>
+<p:sld xmlns:a="http://schemas.openxmlformats.org/drawingml/2006/main" xmlns:r="http://schemas.openxmlformats.org/officeDocument/2006/relationships" xmlns:p="http://schemas.openxmlformats.org/presentationml/2006/main">
+  <p:cSld>
+    <p:spTree>
+      <p:nvGrpSpPr>
+        <p:cNvPr id="1" name=""/>
+        <p:cNvGrpSpPr/>
+        <p:nvPr/>
+      </p:nvGrpSpPr>
+      <p:grpSpPr>
+        <a:xfrm>
+          <a:off x="0" y="0"/>
+          <a:ext cx="0" cy="0"/>
+          <a:chOff x="0" y="0"/>
+          <a:chExt cx="0" cy="0"/>
+        </a:xfrm>
+      </p:grpSpPr>
+      <p:sp>
+        <p:nvSpPr>
+          <p:cNvPr id="2" name="Title 1"/>
+          <p:cNvSpPr>
+            <a:spLocks noGrp="1"/>
+          </p:cNvSpPr>
+          <p:nvPr>
+            <p:ph type="title"/>
+          </p:nvPr>
+        </p:nvSpPr>
+        <p:spPr/>
+        <p:txBody>
+          <a:bodyPr/>
+          <a:lstStyle/>
+          <a:p>
+            <a:pPr lvl="0" indent="0" marL="0">
+              <a:buNone/>
+            </a:pPr>
+            <a:r>
+              <a:rPr/>
+              <a:t>Что нового: модульный дизайн (3 из 3)</a:t>
+            </a:r>
+          </a:p>
+        </p:txBody>
+      </p:sp>
+      <p:sp>
+        <p:nvSpPr>
+          <p:cNvPr id="3" name="Content Placeholder 2"/>
+          <p:cNvSpPr>
+            <a:spLocks noGrp="1"/>
+          </p:cNvSpPr>
+          <p:nvPr>
+            <p:ph idx="1"/>
+          </p:nvPr>
+        </p:nvSpPr>
+        <p:spPr/>
+        <p:txBody>
+          <a:bodyPr/>
+          <a:lstStyle/>
+          <a:p>
+            <a:pPr lvl="0" indent="0" marL="0">
+              <a:buNone/>
+            </a:pPr>
+            <a:r>
+              <a:rPr/>
+              <a:t>Пример </a:t>
+            </a:r>
+            <a:r>
+              <a:rPr>
+                <a:latin typeface="Courier"/>
+              </a:rPr>
+              <a:t>includes</a:t>
+            </a:r>
+            <a:r>
+              <a:rPr/>
+              <a:t>:</a:t>
+            </a:r>
+          </a:p>
+        </p:txBody>
+      </p:sp>
+    </p:spTree>
+  </p:cSld>
+</p:sld>
+</file>
+
+<file path=ppt/slides/slide14.xml><?xml version="1.0" encoding="utf-8"?>
+<p:sld xmlns:a="http://schemas.openxmlformats.org/drawingml/2006/main" xmlns:r="http://schemas.openxmlformats.org/officeDocument/2006/relationships" xmlns:p="http://schemas.openxmlformats.org/presentationml/2006/main">
+  <p:cSld>
+    <p:spTree>
+      <p:nvGrpSpPr>
+        <p:cNvPr id="1" name=""/>
+        <p:cNvGrpSpPr/>
+        <p:nvPr/>
+      </p:nvGrpSpPr>
+      <p:grpSpPr>
+        <a:xfrm>
+          <a:off x="0" y="0"/>
+          <a:ext cx="0" cy="0"/>
+          <a:chOff x="0" y="0"/>
+          <a:chExt cx="0" cy="0"/>
+        </a:xfrm>
+      </p:grpSpPr>
+      <p:sp>
+        <p:nvSpPr>
+          <p:cNvPr id="2" name="Title 1"/>
+          <p:cNvSpPr>
+            <a:spLocks noGrp="1"/>
+          </p:cNvSpPr>
+          <p:nvPr>
+            <p:ph type="title"/>
+          </p:nvPr>
+        </p:nvSpPr>
+        <p:spPr/>
+        <p:txBody>
+          <a:bodyPr/>
+          <a:lstStyle/>
+          <a:p>
+            <a:pPr lvl="0" indent="0" marL="0">
+              <a:buNone/>
+            </a:pPr>
+            <a:r>
+              <a:rPr/>
+              <a:t>About</a:t>
+            </a:r>
+          </a:p>
+        </p:txBody>
+      </p:sp>
+      <p:sp>
+        <p:nvSpPr>
+          <p:cNvPr id="3" name="Content Placeholder 2"/>
+          <p:cNvSpPr>
+            <a:spLocks noGrp="1"/>
+          </p:cNvSpPr>
+          <p:nvPr>
+            <p:ph idx="1"/>
+          </p:nvPr>
+        </p:nvSpPr>
+        <p:spPr/>
+        <p:txBody>
+          <a:bodyPr/>
+          <a:lstStyle/>
+          <a:p>
+            <a:pPr lvl="0" indent="0">
+              <a:buNone/>
+            </a:pPr>
+            <a:r>
+              <a:rPr>
+                <a:solidFill>
+                  <a:srgbClr val="4758AB"/>
+                </a:solidFill>
+                <a:latin typeface="Courier"/>
+              </a:rPr>
+              <a:t>library</a:t>
+            </a:r>
+            <a:r>
+              <a:rPr>
+                <a:solidFill>
+                  <a:srgbClr val="003B4F"/>
+                </a:solidFill>
+                <a:latin typeface="Courier"/>
+              </a:rPr>
+              <a:t>(likert)</a:t>
+            </a:r>
+            <a:br/>
+            <a:r>
+              <a:rPr>
+                <a:solidFill>
+                  <a:srgbClr val="003B4F"/>
+                </a:solidFill>
+                <a:latin typeface="Courier"/>
+              </a:rPr>
+              <a:t>here</a:t>
+            </a:r>
+            <a:r>
+              <a:rPr>
+                <a:solidFill>
+                  <a:srgbClr val="5E5E5E"/>
+                </a:solidFill>
+                <a:latin typeface="Courier"/>
+              </a:rPr>
+              <a:t>::</a:t>
+            </a:r>
+            <a:r>
+              <a:rPr>
+                <a:solidFill>
+                  <a:srgbClr val="4758AB"/>
+                </a:solidFill>
+                <a:latin typeface="Courier"/>
+              </a:rPr>
+              <a:t>i_am</a:t>
+            </a:r>
+            <a:r>
+              <a:rPr>
+                <a:solidFill>
+                  <a:srgbClr val="003B4F"/>
+                </a:solidFill>
+                <a:latin typeface="Courier"/>
+              </a:rPr>
+              <a:t>(</a:t>
+            </a:r>
+            <a:r>
+              <a:rPr>
+                <a:solidFill>
+                  <a:srgbClr val="20794D"/>
+                </a:solidFill>
+                <a:latin typeface="Courier"/>
+              </a:rPr>
+              <a:t>'99-GSS/gss.qmd'</a:t>
+            </a:r>
+            <a:r>
+              <a:rPr>
+                <a:solidFill>
+                  <a:srgbClr val="003B4F"/>
+                </a:solidFill>
+                <a:latin typeface="Courier"/>
+              </a:rPr>
+              <a:t>)</a:t>
+            </a:r>
+          </a:p>
+          <a:p>
+            <a:pPr lvl="0" indent="0" marL="0">
+              <a:buNone/>
+            </a:pPr>
+            <a:r>
+              <a:rPr/>
+              <a:t>The General Social Survey (GSS) collects information from the general public on a wide variety of subjects, including attitudes toward social issues, religion, education, jobs and the economy, government and other institutions, politics, and policy issues. The Schwartz Values module is a part of GSS 2012 questionnaire. This module is a good example of ordinal data, particularly Likert items.</a:t>
+            </a:r>
+          </a:p>
+        </p:txBody>
+      </p:sp>
+    </p:spTree>
+  </p:cSld>
+</p:sld>
+</file>
+
+<file path=ppt/slides/slide15.xml><?xml version="1.0" encoding="utf-8"?>
+<p:sld xmlns:a="http://schemas.openxmlformats.org/drawingml/2006/main" xmlns:r="http://schemas.openxmlformats.org/officeDocument/2006/relationships" xmlns:p="http://schemas.openxmlformats.org/presentationml/2006/main">
+  <p:cSld>
+    <p:spTree>
+      <p:nvGrpSpPr>
+        <p:cNvPr id="1" name=""/>
+        <p:cNvGrpSpPr/>
+        <p:nvPr/>
+      </p:nvGrpSpPr>
+      <p:grpSpPr>
+        <a:xfrm>
+          <a:off x="0" y="0"/>
+          <a:ext cx="0" cy="0"/>
+          <a:chOff x="0" y="0"/>
+          <a:chExt cx="0" cy="0"/>
+        </a:xfrm>
+      </p:grpSpPr>
+      <p:sp>
+        <p:nvSpPr>
+          <p:cNvPr id="2" name="Title 1"/>
+          <p:cNvSpPr>
+            <a:spLocks noGrp="1"/>
+          </p:cNvSpPr>
+          <p:nvPr>
+            <p:ph type="title"/>
+          </p:nvPr>
+        </p:nvSpPr>
+        <p:spPr/>
+        <p:txBody>
+          <a:bodyPr/>
+          <a:lstStyle/>
+          <a:p>
+            <a:pPr lvl="0" indent="0" marL="0">
+              <a:buNone/>
+            </a:pPr>
+            <a:r>
+              <a:rPr/>
+              <a:t>Load Data</a:t>
+            </a:r>
+          </a:p>
+        </p:txBody>
+      </p:sp>
+      <p:sp>
+        <p:nvSpPr>
+          <p:cNvPr id="3" name="Content Placeholder 2"/>
+          <p:cNvSpPr>
+            <a:spLocks noGrp="1"/>
+          </p:cNvSpPr>
+          <p:nvPr>
+            <p:ph idx="1"/>
+          </p:nvPr>
+        </p:nvSpPr>
+        <p:spPr/>
+        <p:txBody>
+          <a:bodyPr/>
+          <a:lstStyle/>
+          <a:p>
+            <a:pPr lvl="0" indent="0">
+              <a:buNone/>
+            </a:pPr>
+            <a:r>
+              <a:rPr>
+                <a:solidFill>
+                  <a:srgbClr val="4758AB"/>
+                </a:solidFill>
+                <a:latin typeface="Courier"/>
+              </a:rPr>
+              <a:t>load</a:t>
+            </a:r>
+            <a:r>
+              <a:rPr>
+                <a:solidFill>
+                  <a:srgbClr val="003B4F"/>
+                </a:solidFill>
+                <a:latin typeface="Courier"/>
+              </a:rPr>
+              <a:t>(here</a:t>
+            </a:r>
+            <a:r>
+              <a:rPr>
+                <a:solidFill>
+                  <a:srgbClr val="5E5E5E"/>
+                </a:solidFill>
+                <a:latin typeface="Courier"/>
+              </a:rPr>
+              <a:t>::</a:t>
+            </a:r>
+            <a:r>
+              <a:rPr>
+                <a:solidFill>
+                  <a:srgbClr val="4758AB"/>
+                </a:solidFill>
+                <a:latin typeface="Courier"/>
+              </a:rPr>
+              <a:t>here</a:t>
+            </a:r>
+            <a:r>
+              <a:rPr>
+                <a:solidFill>
+                  <a:srgbClr val="003B4F"/>
+                </a:solidFill>
+                <a:latin typeface="Courier"/>
+              </a:rPr>
+              <a:t>(</a:t>
+            </a:r>
+            <a:r>
+              <a:rPr>
+                <a:solidFill>
+                  <a:srgbClr val="20794D"/>
+                </a:solidFill>
+                <a:latin typeface="Courier"/>
+              </a:rPr>
+              <a:t>'data'</a:t>
+            </a:r>
+            <a:r>
+              <a:rPr>
+                <a:solidFill>
+                  <a:srgbClr val="003B4F"/>
+                </a:solidFill>
+                <a:latin typeface="Courier"/>
+              </a:rPr>
+              <a:t>, </a:t>
+            </a:r>
+            <a:r>
+              <a:rPr>
+                <a:solidFill>
+                  <a:srgbClr val="20794D"/>
+                </a:solidFill>
+                <a:latin typeface="Courier"/>
+              </a:rPr>
+              <a:t>'gss12_values.RData'</a:t>
+            </a:r>
+            <a:r>
+              <a:rPr>
+                <a:solidFill>
+                  <a:srgbClr val="003B4F"/>
+                </a:solidFill>
+                <a:latin typeface="Courier"/>
+              </a:rPr>
+              <a:t>))</a:t>
+            </a:r>
+          </a:p>
+        </p:txBody>
+      </p:sp>
+    </p:spTree>
+  </p:cSld>
+</p:sld>
+</file>
+
+<file path=ppt/slides/slide16.xml><?xml version="1.0" encoding="utf-8"?>
+<p:sld xmlns:a="http://schemas.openxmlformats.org/drawingml/2006/main" xmlns:r="http://schemas.openxmlformats.org/officeDocument/2006/relationships" xmlns:p="http://schemas.openxmlformats.org/presentationml/2006/main">
+  <p:cSld>
+    <p:spTree>
+      <p:nvGrpSpPr>
+        <p:cNvPr id="1" name=""/>
+        <p:cNvGrpSpPr/>
+        <p:nvPr/>
+      </p:nvGrpSpPr>
+      <p:grpSpPr>
+        <a:xfrm>
+          <a:off x="0" y="0"/>
+          <a:ext cx="0" cy="0"/>
+          <a:chOff x="0" y="0"/>
+          <a:chExt cx="0" cy="0"/>
+        </a:xfrm>
+      </p:grpSpPr>
+      <p:sp>
+        <p:nvSpPr>
+          <p:cNvPr id="2" name="Title 1"/>
+          <p:cNvSpPr>
+            <a:spLocks noGrp="1"/>
+          </p:cNvSpPr>
+          <p:nvPr>
+            <p:ph type="title"/>
+          </p:nvPr>
+        </p:nvSpPr>
+        <p:spPr/>
+        <p:txBody>
+          <a:bodyPr/>
+          <a:lstStyle/>
+          <a:p>
+            <a:pPr lvl="0" indent="0" marL="0">
+              <a:buNone/>
+            </a:pPr>
+            <a:r>
+              <a:rPr/>
+              <a:t>Draw Diagram</a:t>
+            </a:r>
+          </a:p>
+        </p:txBody>
+      </p:sp>
+      <p:sp>
+        <p:nvSpPr>
+          <p:cNvPr id="3" name="Content Placeholder 2"/>
+          <p:cNvSpPr>
+            <a:spLocks noGrp="1"/>
+          </p:cNvSpPr>
+          <p:nvPr>
+            <p:ph idx="1"/>
+          </p:nvPr>
+        </p:nvSpPr>
+        <p:spPr/>
+        <p:txBody>
+          <a:bodyPr/>
+          <a:lstStyle/>
+          <a:p>
+            <a:pPr lvl="0" indent="0">
+              <a:buNone/>
+            </a:pPr>
+            <a:r>
+              <a:rPr>
+                <a:solidFill>
+                  <a:srgbClr val="003B4F"/>
+                </a:solidFill>
+                <a:latin typeface="Courier"/>
+              </a:rPr>
+              <a:t>gss_likert &lt;- gss12_values </a:t>
+            </a:r>
+            <a:r>
+              <a:rPr>
+                <a:solidFill>
+                  <a:srgbClr val="5E5E5E"/>
+                </a:solidFill>
+                <a:latin typeface="Courier"/>
+              </a:rPr>
+              <a:t>|&gt;</a:t>
+            </a:r>
+            <a:r>
+              <a:rPr>
+                <a:solidFill>
+                  <a:srgbClr val="003B4F"/>
+                </a:solidFill>
+                <a:latin typeface="Courier"/>
+              </a:rPr>
+              <a:t> </a:t>
+            </a:r>
+            <a:r>
+              <a:rPr>
+                <a:solidFill>
+                  <a:srgbClr val="4758AB"/>
+                </a:solidFill>
+                <a:latin typeface="Courier"/>
+              </a:rPr>
+              <a:t>as.data.frame</a:t>
+            </a:r>
+            <a:r>
+              <a:rPr>
+                <a:solidFill>
+                  <a:srgbClr val="003B4F"/>
+                </a:solidFill>
+                <a:latin typeface="Courier"/>
+              </a:rPr>
+              <a:t>() </a:t>
+            </a:r>
+            <a:r>
+              <a:rPr>
+                <a:solidFill>
+                  <a:srgbClr val="5E5E5E"/>
+                </a:solidFill>
+                <a:latin typeface="Courier"/>
+              </a:rPr>
+              <a:t>|&gt;</a:t>
+            </a:r>
+            <a:r>
+              <a:rPr>
+                <a:solidFill>
+                  <a:srgbClr val="003B4F"/>
+                </a:solidFill>
+                <a:latin typeface="Courier"/>
+              </a:rPr>
+              <a:t> </a:t>
+            </a:r>
+            <a:r>
+              <a:rPr>
+                <a:solidFill>
+                  <a:srgbClr val="4758AB"/>
+                </a:solidFill>
+                <a:latin typeface="Courier"/>
+              </a:rPr>
+              <a:t>likert</a:t>
+            </a:r>
+            <a:r>
+              <a:rPr>
+                <a:solidFill>
+                  <a:srgbClr val="003B4F"/>
+                </a:solidFill>
+                <a:latin typeface="Courier"/>
+              </a:rPr>
+              <a:t>()</a:t>
+            </a:r>
+          </a:p>
+        </p:txBody>
+      </p:sp>
+    </p:spTree>
+  </p:cSld>
+</p:sld>
+</file>
+
+<file path=ppt/slides/slide17.xml><?xml version="1.0" encoding="utf-8"?>
+<p:sld xmlns:a="http://schemas.openxmlformats.org/drawingml/2006/main" xmlns:r="http://schemas.openxmlformats.org/officeDocument/2006/relationships" xmlns:p="http://schemas.openxmlformats.org/presentationml/2006/main">
+  <p:cSld>
+    <p:spTree>
+      <p:nvGrpSpPr>
+        <p:cNvPr id="1" name=""/>
+        <p:cNvGrpSpPr/>
+        <p:nvPr/>
+      </p:nvGrpSpPr>
+      <p:grpSpPr>
+        <a:xfrm>
+          <a:off x="0" y="0"/>
+          <a:ext cx="0" cy="0"/>
+          <a:chOff x="0" y="0"/>
+          <a:chExt cx="0" cy="0"/>
+        </a:xfrm>
+      </p:grpSpPr>
+      <p:sp>
+        <p:nvSpPr>
+          <p:cNvPr id="2" name="Title 1"/>
+          <p:cNvSpPr>
+            <a:spLocks noGrp="1"/>
+          </p:cNvSpPr>
+          <p:nvPr>
+            <p:ph type="title"/>
+          </p:nvPr>
+        </p:nvSpPr>
+        <p:spPr/>
+        <p:txBody>
+          <a:bodyPr/>
+          <a:lstStyle/>
+          <a:p>
+            <a:pPr lvl="0" indent="0" marL="0">
+              <a:buNone/>
+            </a:pPr>
+            <a:r>
+              <a:rPr/>
+              <a:t>Что нового: множество форматов вывода</a:t>
+            </a:r>
+          </a:p>
+        </p:txBody>
+      </p:sp>
+      <p:sp>
+        <p:nvSpPr>
+          <p:cNvPr id="3" name="Content Placeholder 2"/>
+          <p:cNvSpPr>
+            <a:spLocks noGrp="1"/>
+          </p:cNvSpPr>
+          <p:nvPr>
+            <p:ph idx="1"/>
+          </p:nvPr>
+        </p:nvSpPr>
+        <p:spPr/>
+        <p:txBody>
+          <a:bodyPr/>
+          <a:lstStyle/>
+          <a:p>
+            <a:pPr lvl="0" indent="-342900" marL="342900">
+              <a:buAutoNum startAt="3" type="arabicPeriod"/>
+            </a:pPr>
+            <a:r>
+              <a:rPr/>
+              <a:t>Настраиваемые шаблоны: Quarto позволяет настраивать шаблоны и темы, которые можно использовать для управления внешним видом ваших документов. Это облегчает создание профессиональных документов с единым визуальным стилем.</a:t>
+            </a:r>
+          </a:p>
+          <a:p>
+            <a:pPr lvl="0" indent="-342900" marL="342900">
+              <a:buAutoNum startAt="3" type="arabicPeriod"/>
+            </a:pPr>
+            <a:r>
+              <a:rPr/>
+              <a:t>Расширенные функции форматирования: Quarto поддерживает расширенные функции форматирования, такие как LaTeX-формулы, библиографии и сноски. Это облегчает создание сложных научных и технических документов.</a:t>
+            </a:r>
+          </a:p>
+          <a:p>
+            <a:pPr lvl="0" indent="-342900" marL="342900">
+              <a:buAutoNum startAt="3" type="arabicPeriod"/>
+            </a:pPr>
+            <a:r>
+              <a:rPr/>
+              <a:t>Интерактивное и динамическое содержимое: Quarto поддерживает интерактивное и динамическое содержимое с использованием JavaScript и других веб-технологий. Это позволяет создавать документы с интерактивными графиками, анимацией и другими динамическими функциями.</a:t>
+            </a:r>
+          </a:p>
+        </p:txBody>
+      </p:sp>
+    </p:spTree>
+  </p:cSld>
+  <p:timing>
+    <p:tnLst>
+      <p:par>
+        <p:cTn id="1" dur="indefinite" restart="never" nodeType="tmRoot">
+          <p:childTnLst>
+            <p:seq concurrent="1" nextAc="seek">
+              <p:cTn id="2" dur="indefinite" nodeType="mainSeq">
+                <p:childTnLst>
+                  <p:par>
+                    <p:cTn id="3" fill="hold">
+                      <p:stCondLst>
+                        <p:cond delay="indefinite"/>
+                      </p:stCondLst>
+                      <p:childTnLst>
+                        <p:par>
+                          <p:cTn id="4" fill="hold">
+                            <p:stCondLst>
+                              <p:cond delay="0"/>
+                            </p:stCondLst>
+                            <p:childTnLst>
+                              <p:par>
+                                <p:cTn id="5" presetID="1" presetClass="entr" presetSubtype="0" fill="hold" grpId="0" nodeType="clickEffect">
+                                  <p:stCondLst>
+                                    <p:cond delay="0"/>
+                                  </p:stCondLst>
+                                  <p:childTnLst>
+                                    <p:set>
+                                      <p:cBhvr>
+                                        <p:cTn id="6" dur="1" fill="hold">
+                                          <p:stCondLst>
+                                            <p:cond delay="0"/>
+                                          </p:stCondLst>
+                                        </p:cTn>
+                                        <p:tgtEl>
+                                          <p:spTgt spid="3">
+                                            <p:txEl>
+                                              <p:pRg st="0" end="0"/>
+                                            </p:txEl>
+                                          </p:spTgt>
+                                        </p:tgtEl>
+                                        <p:attrNameLst>
+                                          <p:attrName>style.visibility</p:attrName>
+                                        </p:attrNameLst>
+                                      </p:cBhvr>
+                                      <p:to>
+                                        <p:strVal val="visible"/>
+                                      </p:to>
+                                    </p:set>
+                                  </p:childTnLst>
+                                </p:cTn>
+                              </p:par>
+                            </p:childTnLst>
+                          </p:cTn>
+                        </p:par>
+                      </p:childTnLst>
+                    </p:cTn>
+                  </p:par>
+                  <p:par>
+                    <p:cTn id="7" fill="hold">
+                      <p:stCondLst>
+                        <p:cond delay="indefinite"/>
+                      </p:stCondLst>
+                      <p:childTnLst>
+                        <p:par>
+                          <p:cTn id="8" fill="hold">
+                            <p:stCondLst>
+                              <p:cond delay="0"/>
+                            </p:stCondLst>
+                            <p:childTnLst>
+                              <p:par>
+                                <p:cTn id="9" presetID="1" presetClass="entr" presetSubtype="0" fill="hold" grpId="0" nodeType="clickEffect">
+                                  <p:stCondLst>
+                                    <p:cond delay="0"/>
+                                  </p:stCondLst>
+                                  <p:childTnLst>
+                                    <p:set>
+                                      <p:cBhvr>
+                                        <p:cTn id="10" dur="1" fill="hold">
+                                          <p:stCondLst>
+                                            <p:cond delay="0"/>
+                                          </p:stCondLst>
+                                        </p:cTn>
+                                        <p:tgtEl>
+                                          <p:spTgt spid="3">
+                                            <p:txEl>
+                                              <p:pRg st="1" end="1"/>
+                                            </p:txEl>
+                                          </p:spTgt>
+                                        </p:tgtEl>
+                                        <p:attrNameLst>
+                                          <p:attrName>style.visibility</p:attrName>
+                                        </p:attrNameLst>
+                                      </p:cBhvr>
+                                      <p:to>
+                                        <p:strVal val="visible"/>
+                                      </p:to>
+                                    </p:set>
+                                  </p:childTnLst>
+                                </p:cTn>
+                              </p:par>
+                            </p:childTnLst>
+                          </p:cTn>
+                        </p:par>
+                      </p:childTnLst>
+                    </p:cTn>
+                  </p:par>
+                  <p:par>
+                    <p:cTn id="11" fill="hold">
+                      <p:stCondLst>
+                        <p:cond delay="indefinite"/>
+                      </p:stCondLst>
+                      <p:childTnLst>
+                        <p:par>
+                          <p:cTn id="12" fill="hold">
+                            <p:stCondLst>
+                              <p:cond delay="0"/>
+                            </p:stCondLst>
+                            <p:childTnLst>
+                              <p:par>
+                                <p:cTn id="13" presetID="1" presetClass="entr" presetSubtype="0" fill="hold" grpId="0" nodeType="clickEffect">
+                                  <p:stCondLst>
+                                    <p:cond delay="0"/>
+                                  </p:stCondLst>
+                                  <p:childTnLst>
+                                    <p:set>
+                                      <p:cBhvr>
+                                        <p:cTn id="14" dur="1" fill="hold">
                                           <p:stCondLst>
                                             <p:cond delay="0"/>
                                           </p:stCondLst>
@@ -4027,6 +5793,302 @@
 </p:sld>
 </file>
 
+<file path=ppt/slides/slide18.xml><?xml version="1.0" encoding="utf-8"?>
+<p:sld xmlns:a="http://schemas.openxmlformats.org/drawingml/2006/main" xmlns:r="http://schemas.openxmlformats.org/officeDocument/2006/relationships" xmlns:p="http://schemas.openxmlformats.org/presentationml/2006/main">
+  <p:cSld>
+    <p:spTree>
+      <p:nvGrpSpPr>
+        <p:cNvPr id="1" name=""/>
+        <p:cNvGrpSpPr/>
+        <p:nvPr/>
+      </p:nvGrpSpPr>
+      <p:grpSpPr>
+        <a:xfrm>
+          <a:off x="0" y="0"/>
+          <a:ext cx="0" cy="0"/>
+          <a:chOff x="0" y="0"/>
+          <a:chExt cx="0" cy="0"/>
+        </a:xfrm>
+      </p:grpSpPr>
+      <p:sp>
+        <p:nvSpPr>
+          <p:cNvPr id="2" name="Title 1"/>
+          <p:cNvSpPr>
+            <a:spLocks noGrp="1"/>
+          </p:cNvSpPr>
+          <p:nvPr>
+            <p:ph type="title"/>
+          </p:nvPr>
+        </p:nvSpPr>
+        <p:spPr/>
+        <p:txBody>
+          <a:bodyPr/>
+          <a:lstStyle/>
+          <a:p>
+            <a:pPr lvl="0" indent="0" marL="0">
+              <a:buNone/>
+            </a:pPr>
+            <a:r>
+              <a:rPr/>
+              <a:t>Code</a:t>
+            </a:r>
+          </a:p>
+        </p:txBody>
+      </p:sp>
+      <p:sp>
+        <p:nvSpPr>
+          <p:cNvPr id="3" name="Content Placeholder 2"/>
+          <p:cNvSpPr>
+            <a:spLocks noGrp="1"/>
+          </p:cNvSpPr>
+          <p:nvPr>
+            <p:ph idx="1"/>
+          </p:nvPr>
+        </p:nvSpPr>
+        <p:spPr/>
+        <p:txBody>
+          <a:bodyPr/>
+          <a:lstStyle/>
+          <a:p>
+            <a:pPr lvl="0" indent="0" marL="0">
+              <a:buNone/>
+            </a:pPr>
+            <a:r>
+              <a:rPr/>
+              <a:t>When you click the </a:t>
+            </a:r>
+            <a:r>
+              <a:rPr b="1"/>
+              <a:t>Render</a:t>
+            </a:r>
+            <a:r>
+              <a:rPr/>
+              <a:t> button a presentation will be generated that includes both content and the output of embedded code. You can embed code like this:</a:t>
+            </a:r>
+          </a:p>
+          <a:p>
+            <a:pPr lvl="0" indent="0">
+              <a:buNone/>
+            </a:pPr>
+            <a:r>
+              <a:rPr>
+                <a:solidFill>
+                  <a:srgbClr val="AD0000"/>
+                </a:solidFill>
+                <a:latin typeface="Courier"/>
+              </a:rPr>
+              <a:t>1</a:t>
+            </a:r>
+            <a:r>
+              <a:rPr>
+                <a:solidFill>
+                  <a:srgbClr val="003B4F"/>
+                </a:solidFill>
+                <a:latin typeface="Courier"/>
+              </a:rPr>
+              <a:t> </a:t>
+            </a:r>
+            <a:r>
+              <a:rPr>
+                <a:solidFill>
+                  <a:srgbClr val="5E5E5E"/>
+                </a:solidFill>
+                <a:latin typeface="Courier"/>
+              </a:rPr>
+              <a:t>+</a:t>
+            </a:r>
+            <a:r>
+              <a:rPr>
+                <a:solidFill>
+                  <a:srgbClr val="003B4F"/>
+                </a:solidFill>
+                <a:latin typeface="Courier"/>
+              </a:rPr>
+              <a:t> </a:t>
+            </a:r>
+            <a:r>
+              <a:rPr>
+                <a:solidFill>
+                  <a:srgbClr val="AD0000"/>
+                </a:solidFill>
+                <a:latin typeface="Courier"/>
+              </a:rPr>
+              <a:t>1</a:t>
+            </a:r>
+          </a:p>
+        </p:txBody>
+      </p:sp>
+    </p:spTree>
+  </p:cSld>
+</p:sld>
+</file>
+
+<file path=ppt/slides/slide19.xml><?xml version="1.0" encoding="utf-8"?>
+<p:sld xmlns:a="http://schemas.openxmlformats.org/drawingml/2006/main" xmlns:r="http://schemas.openxmlformats.org/officeDocument/2006/relationships" xmlns:p="http://schemas.openxmlformats.org/presentationml/2006/main">
+  <p:cSld>
+    <p:spTree>
+      <p:nvGrpSpPr>
+        <p:cNvPr id="1" name=""/>
+        <p:cNvGrpSpPr/>
+        <p:nvPr/>
+      </p:nvGrpSpPr>
+      <p:grpSpPr>
+        <a:xfrm>
+          <a:off x="0" y="0"/>
+          <a:ext cx="0" cy="0"/>
+          <a:chOff x="0" y="0"/>
+          <a:chExt cx="0" cy="0"/>
+        </a:xfrm>
+      </p:grpSpPr>
+    </p:spTree>
+  </p:cSld>
+</p:sld>
+</file>
+
+<file path=ppt/slides/slide2.xml><?xml version="1.0" encoding="utf-8"?>
+<p:sld xmlns:a="http://schemas.openxmlformats.org/drawingml/2006/main" xmlns:r="http://schemas.openxmlformats.org/officeDocument/2006/relationships" xmlns:p="http://schemas.openxmlformats.org/presentationml/2006/main">
+  <p:cSld>
+    <p:spTree>
+      <p:nvGrpSpPr>
+        <p:cNvPr id="1" name=""/>
+        <p:cNvGrpSpPr/>
+        <p:nvPr/>
+      </p:nvGrpSpPr>
+      <p:grpSpPr>
+        <a:xfrm>
+          <a:off x="0" y="0"/>
+          <a:ext cx="0" cy="0"/>
+          <a:chOff x="0" y="0"/>
+          <a:chExt cx="0" cy="0"/>
+        </a:xfrm>
+      </p:grpSpPr>
+      <p:sp>
+        <p:nvSpPr>
+          <p:cNvPr id="2" name="Title 1"/>
+          <p:cNvSpPr>
+            <a:spLocks noGrp="1"/>
+          </p:cNvSpPr>
+          <p:nvPr>
+            <p:ph type="title"/>
+          </p:nvPr>
+        </p:nvSpPr>
+        <p:spPr/>
+        <p:txBody>
+          <a:bodyPr/>
+          <a:lstStyle/>
+          <a:p>
+            <a:pPr lvl="0" indent="0" marL="0">
+              <a:buNone/>
+            </a:pPr>
+            <a:r>
+              <a:rPr/>
+              <a:t>Webinar setup</a:t>
+            </a:r>
+          </a:p>
+        </p:txBody>
+      </p:sp>
+      <p:sp>
+        <p:nvSpPr>
+          <p:cNvPr id="3" name="Content Placeholder 2"/>
+          <p:cNvSpPr>
+            <a:spLocks noGrp="1"/>
+          </p:cNvSpPr>
+          <p:nvPr>
+            <p:ph idx="1"/>
+          </p:nvPr>
+        </p:nvSpPr>
+        <p:spPr/>
+        <p:txBody>
+          <a:bodyPr/>
+          <a:lstStyle/>
+          <a:p>
+            <a:pPr lvl="0" indent="0" marL="0">
+              <a:buNone/>
+            </a:pPr>
+            <a:r>
+              <a:rPr/>
+              <a:t>Insert webinar setup slide here</a:t>
+            </a:r>
+          </a:p>
+        </p:txBody>
+      </p:sp>
+    </p:spTree>
+  </p:cSld>
+</p:sld>
+</file>
+
+<file path=ppt/slides/slide3.xml><?xml version="1.0" encoding="utf-8"?>
+<p:sld xmlns:a="http://schemas.openxmlformats.org/drawingml/2006/main" xmlns:r="http://schemas.openxmlformats.org/officeDocument/2006/relationships" xmlns:p="http://schemas.openxmlformats.org/presentationml/2006/main">
+  <p:cSld>
+    <p:spTree>
+      <p:nvGrpSpPr>
+        <p:cNvPr id="1" name=""/>
+        <p:cNvGrpSpPr/>
+        <p:nvPr/>
+      </p:nvGrpSpPr>
+      <p:grpSpPr>
+        <a:xfrm>
+          <a:off x="0" y="0"/>
+          <a:ext cx="0" cy="0"/>
+          <a:chOff x="0" y="0"/>
+          <a:chExt cx="0" cy="0"/>
+        </a:xfrm>
+      </p:grpSpPr>
+      <p:sp>
+        <p:nvSpPr>
+          <p:cNvPr id="2" name="Title 1"/>
+          <p:cNvSpPr>
+            <a:spLocks noGrp="1"/>
+          </p:cNvSpPr>
+          <p:nvPr>
+            <p:ph type="title"/>
+          </p:nvPr>
+        </p:nvSpPr>
+        <p:spPr/>
+        <p:txBody>
+          <a:bodyPr/>
+          <a:lstStyle/>
+          <a:p>
+            <a:pPr lvl="0" indent="0" marL="0">
+              <a:buNone/>
+            </a:pPr>
+            <a:r>
+              <a:rPr/>
+              <a:t>About</a:t>
+            </a:r>
+          </a:p>
+        </p:txBody>
+      </p:sp>
+      <p:sp>
+        <p:nvSpPr>
+          <p:cNvPr id="3" name="Content Placeholder 2"/>
+          <p:cNvSpPr>
+            <a:spLocks noGrp="1"/>
+          </p:cNvSpPr>
+          <p:nvPr>
+            <p:ph idx="1"/>
+          </p:nvPr>
+        </p:nvSpPr>
+        <p:spPr/>
+        <p:txBody>
+          <a:bodyPr/>
+          <a:lstStyle/>
+          <a:p>
+            <a:pPr lvl="0" indent="0" marL="0">
+              <a:buNone/>
+            </a:pPr>
+            <a:r>
+              <a:rPr/>
+              <a:t>Insert about slide here</a:t>
+            </a:r>
+          </a:p>
+        </p:txBody>
+      </p:sp>
+    </p:spTree>
+  </p:cSld>
+</p:sld>
+</file>
+
 <file path=ppt/slides/slide4.xml><?xml version="1.0" encoding="utf-8"?>
 <p:sld xmlns:a="http://schemas.openxmlformats.org/drawingml/2006/main" xmlns:r="http://schemas.openxmlformats.org/officeDocument/2006/relationships" xmlns:p="http://schemas.openxmlformats.org/presentationml/2006/main">
   <p:cSld>
@@ -4054,12 +6116,7 @@
             <p:ph type="title"/>
           </p:nvPr>
         </p:nvSpPr>
-        <p:spPr>
-          <a:xfrm>
-            <a:off x="722313" y="3305176"/>
-            <a:ext cx="7772400" cy="1021556"/>
-          </a:xfrm>
-        </p:spPr>
+        <p:spPr/>
         <p:txBody>
           <a:bodyPr/>
           <a:lstStyle/>
@@ -4069,7 +6126,32 @@
             </a:pPr>
             <a:r>
               <a:rPr/>
-              <a:t>More</a:t>
+              <a:t>Webinar rules</a:t>
+            </a:r>
+          </a:p>
+        </p:txBody>
+      </p:sp>
+      <p:sp>
+        <p:nvSpPr>
+          <p:cNvPr id="3" name="Content Placeholder 2"/>
+          <p:cNvSpPr>
+            <a:spLocks noGrp="1"/>
+          </p:cNvSpPr>
+          <p:nvPr>
+            <p:ph idx="1"/>
+          </p:nvPr>
+        </p:nvSpPr>
+        <p:spPr/>
+        <p:txBody>
+          <a:bodyPr/>
+          <a:lstStyle/>
+          <a:p>
+            <a:pPr lvl="0" indent="0" marL="0">
+              <a:buNone/>
+            </a:pPr>
+            <a:r>
+              <a:rPr/>
+              <a:t>Insert webinar rules slide here</a:t>
             </a:r>
           </a:p>
         </p:txBody>
@@ -4116,7 +6198,7 @@
             </a:pPr>
             <a:r>
               <a:rPr/>
-              <a:t>Code</a:t>
+              <a:t>Webinar path</a:t>
             </a:r>
           </a:p>
         </p:txBody>
@@ -4141,71 +6223,1056 @@
             </a:pPr>
             <a:r>
               <a:rPr/>
-              <a:t>When you click the </a:t>
-            </a:r>
-            <a:r>
-              <a:rPr b="1"/>
-              <a:t>Render</a:t>
-            </a:r>
-            <a:r>
-              <a:rPr/>
-              <a:t> button a presentation will be generated that includes both content and the output of embedded code. You can embed code like this:</a:t>
-            </a:r>
-          </a:p>
-          <a:p>
-            <a:pPr lvl="0" indent="0">
-              <a:buNone/>
-            </a:pPr>
-            <a:r>
-              <a:rPr>
-                <a:solidFill>
-                  <a:srgbClr val="AD0000"/>
-                </a:solidFill>
-                <a:latin typeface="Courier"/>
-              </a:rPr>
-              <a:t>1</a:t>
-            </a:r>
-            <a:r>
-              <a:rPr>
-                <a:solidFill>
-                  <a:srgbClr val="003B4F"/>
-                </a:solidFill>
-                <a:latin typeface="Courier"/>
-              </a:rPr>
-              <a:t> </a:t>
-            </a:r>
-            <a:r>
-              <a:rPr>
-                <a:solidFill>
-                  <a:srgbClr val="5E5E5E"/>
-                </a:solidFill>
-                <a:latin typeface="Courier"/>
-              </a:rPr>
-              <a:t>+</a:t>
-            </a:r>
-            <a:r>
-              <a:rPr>
-                <a:solidFill>
-                  <a:srgbClr val="003B4F"/>
-                </a:solidFill>
-                <a:latin typeface="Courier"/>
-              </a:rPr>
-              <a:t> </a:t>
-            </a:r>
-            <a:r>
-              <a:rPr>
-                <a:solidFill>
-                  <a:srgbClr val="AD0000"/>
-                </a:solidFill>
-                <a:latin typeface="Courier"/>
-              </a:rPr>
-              <a:t>1</a:t>
+              <a:t>Insert webinar path slide here</a:t>
             </a:r>
           </a:p>
         </p:txBody>
       </p:sp>
     </p:spTree>
   </p:cSld>
+</p:sld>
+</file>
+
+<file path=ppt/slides/slide6.xml><?xml version="1.0" encoding="utf-8"?>
+<p:sld xmlns:a="http://schemas.openxmlformats.org/drawingml/2006/main" xmlns:r="http://schemas.openxmlformats.org/officeDocument/2006/relationships" xmlns:p="http://schemas.openxmlformats.org/presentationml/2006/main">
+  <p:cSld>
+    <p:spTree>
+      <p:nvGrpSpPr>
+        <p:cNvPr id="1" name=""/>
+        <p:cNvGrpSpPr/>
+        <p:nvPr/>
+      </p:nvGrpSpPr>
+      <p:grpSpPr>
+        <a:xfrm>
+          <a:off x="0" y="0"/>
+          <a:ext cx="0" cy="0"/>
+          <a:chOff x="0" y="0"/>
+          <a:chExt cx="0" cy="0"/>
+        </a:xfrm>
+      </p:grpSpPr>
+      <p:sp>
+        <p:nvSpPr>
+          <p:cNvPr id="2" name="Title 1"/>
+          <p:cNvSpPr>
+            <a:spLocks noGrp="1"/>
+          </p:cNvSpPr>
+          <p:nvPr>
+            <p:ph type="title"/>
+          </p:nvPr>
+        </p:nvSpPr>
+        <p:spPr>
+          <a:xfrm>
+            <a:off x="722313" y="3305176"/>
+            <a:ext cx="7772400" cy="1021556"/>
+          </a:xfrm>
+        </p:spPr>
+        <p:txBody>
+          <a:bodyPr/>
+          <a:lstStyle/>
+          <a:p>
+            <a:pPr lvl="0" indent="0" marL="0">
+              <a:buNone/>
+            </a:pPr>
+            <a:r>
+              <a:rPr/>
+              <a:t>Почему Quarto?</a:t>
+            </a:r>
+          </a:p>
+        </p:txBody>
+      </p:sp>
+    </p:spTree>
+  </p:cSld>
+</p:sld>
+</file>
+
+<file path=ppt/slides/slide7.xml><?xml version="1.0" encoding="utf-8"?>
+<p:sld xmlns:a="http://schemas.openxmlformats.org/drawingml/2006/main" xmlns:r="http://schemas.openxmlformats.org/officeDocument/2006/relationships" xmlns:p="http://schemas.openxmlformats.org/presentationml/2006/main">
+  <p:cSld>
+    <p:spTree>
+      <p:nvGrpSpPr>
+        <p:cNvPr id="1" name=""/>
+        <p:cNvGrpSpPr/>
+        <p:nvPr/>
+      </p:nvGrpSpPr>
+      <p:grpSpPr>
+        <a:xfrm>
+          <a:off x="0" y="0"/>
+          <a:ext cx="0" cy="0"/>
+          <a:chOff x="0" y="0"/>
+          <a:chExt cx="0" cy="0"/>
+        </a:xfrm>
+      </p:grpSpPr>
+      <p:sp>
+        <p:nvSpPr>
+          <p:cNvPr id="2" name="Title 1"/>
+          <p:cNvSpPr>
+            <a:spLocks noGrp="1"/>
+          </p:cNvSpPr>
+          <p:nvPr>
+            <p:ph type="title"/>
+          </p:nvPr>
+        </p:nvSpPr>
+        <p:spPr/>
+        <p:txBody>
+          <a:bodyPr/>
+          <a:lstStyle/>
+          <a:p>
+            <a:pPr lvl="0" indent="0" marL="0">
+              <a:buNone/>
+            </a:pPr>
+            <a:r>
+              <a:rPr/>
+              <a:t>Что за Quarto? (1 из 2)</a:t>
+            </a:r>
+          </a:p>
+        </p:txBody>
+      </p:sp>
+      <p:sp>
+        <p:nvSpPr>
+          <p:cNvPr id="3" name="Content Placeholder 2"/>
+          <p:cNvSpPr>
+            <a:spLocks noGrp="1"/>
+          </p:cNvSpPr>
+          <p:nvPr>
+            <p:ph idx="1"/>
+          </p:nvPr>
+        </p:nvSpPr>
+        <p:spPr/>
+        <p:txBody>
+          <a:bodyPr/>
+          <a:lstStyle/>
+          <a:p>
+            <a:pPr lvl="0" indent="0" marL="0">
+              <a:buNone/>
+            </a:pPr>
+            <a:r>
+              <a:rPr/>
+              <a:t>Quarto (отсылка к формату </a:t>
+            </a:r>
+            <a:r>
+              <a:rPr>
+                <a:latin typeface="Courier"/>
+              </a:rPr>
+              <a:t>in quarto</a:t>
+            </a:r>
+            <a:r>
+              <a:rPr/>
+              <a:t>) – система публикации документов от Posit (бывшая RStudio, создатели </a:t>
+            </a:r>
+            <a:r>
+              <a:rPr>
+                <a:latin typeface="Courier"/>
+              </a:rPr>
+              <a:t>Tidyverse</a:t>
+            </a:r>
+            <a:r>
+              <a:rPr/>
+              <a:t>).</a:t>
+            </a:r>
+          </a:p>
+          <a:p>
+            <a:pPr lvl="0" indent="0" marL="0">
+              <a:buNone/>
+            </a:pPr>
+            <a:r>
+              <a:rPr/>
+              <a:t>Quarto – не библиотека R, а автономное приложение с интерфейсом командной строки. Например, вы можете:</a:t>
+            </a:r>
+          </a:p>
+          <a:p>
+            <a:pPr lvl="0" indent="-342900" marL="342900">
+              <a:buAutoNum type="arabicPeriod"/>
+            </a:pPr>
+            <a:r>
+              <a:rPr/>
+              <a:t>Создать документ </a:t>
+            </a:r>
+            <a:r>
+              <a:rPr>
+                <a:latin typeface="Courier"/>
+              </a:rPr>
+              <a:t>document.qmd</a:t>
+            </a:r>
+            <a:r>
+              <a:rPr/>
+              <a:t> в своем любимом редакторе.</a:t>
+            </a:r>
+          </a:p>
+          <a:p>
+            <a:pPr lvl="0" indent="-342900" marL="342900">
+              <a:buAutoNum type="arabicPeriod"/>
+            </a:pPr>
+            <a:r>
+              <a:rPr/>
+              <a:t>Добавить YAML-метаданные (как Rmarkdown, но см. ниже).</a:t>
+            </a:r>
+          </a:p>
+          <a:p>
+            <a:pPr lvl="0" indent="-342900" marL="342900">
+              <a:buAutoNum type="arabicPeriod"/>
+            </a:pPr>
+            <a:r>
+              <a:rPr/>
+              <a:t>Сверстать документ в нужном вам формате:</a:t>
+            </a:r>
+          </a:p>
+          <a:p>
+            <a:pPr lvl="0" indent="0">
+              <a:buNone/>
+            </a:pPr>
+            <a:r>
+              <a:rPr>
+                <a:latin typeface="Courier"/>
+              </a:rPr>
+              <a:t>quarto render document.qmd</a:t>
+            </a:r>
+          </a:p>
+        </p:txBody>
+      </p:sp>
+    </p:spTree>
+  </p:cSld>
+  <p:timing>
+    <p:tnLst>
+      <p:par>
+        <p:cTn id="1" dur="indefinite" restart="never" nodeType="tmRoot">
+          <p:childTnLst>
+            <p:seq concurrent="1" nextAc="seek">
+              <p:cTn id="2" dur="indefinite" nodeType="mainSeq">
+                <p:childTnLst>
+                  <p:par>
+                    <p:cTn id="3" fill="hold">
+                      <p:stCondLst>
+                        <p:cond delay="indefinite"/>
+                      </p:stCondLst>
+                      <p:childTnLst>
+                        <p:par>
+                          <p:cTn id="4" fill="hold">
+                            <p:stCondLst>
+                              <p:cond delay="0"/>
+                            </p:stCondLst>
+                            <p:childTnLst>
+                              <p:par>
+                                <p:cTn id="5" presetID="1" presetClass="entr" presetSubtype="0" fill="hold" grpId="0" nodeType="clickEffect">
+                                  <p:stCondLst>
+                                    <p:cond delay="0"/>
+                                  </p:stCondLst>
+                                  <p:childTnLst>
+                                    <p:set>
+                                      <p:cBhvr>
+                                        <p:cTn id="6" dur="1" fill="hold">
+                                          <p:stCondLst>
+                                            <p:cond delay="0"/>
+                                          </p:stCondLst>
+                                        </p:cTn>
+                                        <p:tgtEl>
+                                          <p:spTgt spid="3">
+                                            <p:txEl>
+                                              <p:pRg st="2" end="2"/>
+                                            </p:txEl>
+                                          </p:spTgt>
+                                        </p:tgtEl>
+                                        <p:attrNameLst>
+                                          <p:attrName>style.visibility</p:attrName>
+                                        </p:attrNameLst>
+                                      </p:cBhvr>
+                                      <p:to>
+                                        <p:strVal val="visible"/>
+                                      </p:to>
+                                    </p:set>
+                                  </p:childTnLst>
+                                </p:cTn>
+                              </p:par>
+                            </p:childTnLst>
+                          </p:cTn>
+                        </p:par>
+                      </p:childTnLst>
+                    </p:cTn>
+                  </p:par>
+                  <p:par>
+                    <p:cTn id="7" fill="hold">
+                      <p:stCondLst>
+                        <p:cond delay="indefinite"/>
+                      </p:stCondLst>
+                      <p:childTnLst>
+                        <p:par>
+                          <p:cTn id="8" fill="hold">
+                            <p:stCondLst>
+                              <p:cond delay="0"/>
+                            </p:stCondLst>
+                            <p:childTnLst>
+                              <p:par>
+                                <p:cTn id="9" presetID="1" presetClass="entr" presetSubtype="0" fill="hold" grpId="0" nodeType="clickEffect">
+                                  <p:stCondLst>
+                                    <p:cond delay="0"/>
+                                  </p:stCondLst>
+                                  <p:childTnLst>
+                                    <p:set>
+                                      <p:cBhvr>
+                                        <p:cTn id="10" dur="1" fill="hold">
+                                          <p:stCondLst>
+                                            <p:cond delay="0"/>
+                                          </p:stCondLst>
+                                        </p:cTn>
+                                        <p:tgtEl>
+                                          <p:spTgt spid="3">
+                                            <p:txEl>
+                                              <p:pRg st="3" end="3"/>
+                                            </p:txEl>
+                                          </p:spTgt>
+                                        </p:tgtEl>
+                                        <p:attrNameLst>
+                                          <p:attrName>style.visibility</p:attrName>
+                                        </p:attrNameLst>
+                                      </p:cBhvr>
+                                      <p:to>
+                                        <p:strVal val="visible"/>
+                                      </p:to>
+                                    </p:set>
+                                  </p:childTnLst>
+                                </p:cTn>
+                              </p:par>
+                            </p:childTnLst>
+                          </p:cTn>
+                        </p:par>
+                      </p:childTnLst>
+                    </p:cTn>
+                  </p:par>
+                  <p:par>
+                    <p:cTn id="11" fill="hold">
+                      <p:stCondLst>
+                        <p:cond delay="indefinite"/>
+                      </p:stCondLst>
+                      <p:childTnLst>
+                        <p:par>
+                          <p:cTn id="12" fill="hold">
+                            <p:stCondLst>
+                              <p:cond delay="0"/>
+                            </p:stCondLst>
+                            <p:childTnLst>
+                              <p:par>
+                                <p:cTn id="13" presetID="1" presetClass="entr" presetSubtype="0" fill="hold" grpId="0" nodeType="clickEffect">
+                                  <p:stCondLst>
+                                    <p:cond delay="0"/>
+                                  </p:stCondLst>
+                                  <p:childTnLst>
+                                    <p:set>
+                                      <p:cBhvr>
+                                        <p:cTn id="14" dur="1" fill="hold">
+                                          <p:stCondLst>
+                                            <p:cond delay="0"/>
+                                          </p:stCondLst>
+                                        </p:cTn>
+                                        <p:tgtEl>
+                                          <p:spTgt spid="3">
+                                            <p:txEl>
+                                              <p:pRg st="4" end="4"/>
+                                            </p:txEl>
+                                          </p:spTgt>
+                                        </p:tgtEl>
+                                        <p:attrNameLst>
+                                          <p:attrName>style.visibility</p:attrName>
+                                        </p:attrNameLst>
+                                      </p:cBhvr>
+                                      <p:to>
+                                        <p:strVal val="visible"/>
+                                      </p:to>
+                                    </p:set>
+                                  </p:childTnLst>
+                                </p:cTn>
+                              </p:par>
+                            </p:childTnLst>
+                          </p:cTn>
+                        </p:par>
+                      </p:childTnLst>
+                    </p:cTn>
+                  </p:par>
+                </p:childTnLst>
+              </p:cTn>
+              <p:prevCondLst>
+                <p:cond evt="onPrev" delay="0">
+                  <p:tgtEl>
+                    <p:sldTgt/>
+                  </p:tgtEl>
+                </p:cond>
+              </p:prevCondLst>
+              <p:nextCondLst>
+                <p:cond evt="onNext" delay="0">
+                  <p:tgtEl>
+                    <p:sldTgt/>
+                  </p:tgtEl>
+                </p:cond>
+              </p:nextCondLst>
+            </p:seq>
+          </p:childTnLst>
+        </p:cTn>
+      </p:par>
+    </p:tnLst>
+    <p:bldLst>
+      <p:bldP spid="3" grpId="0" uiExpand="1" build="p"/>
+    </p:bldLst>
+  </p:timing>
+</p:sld>
+</file>
+
+<file path=ppt/slides/slide8.xml><?xml version="1.0" encoding="utf-8"?>
+<p:sld xmlns:a="http://schemas.openxmlformats.org/drawingml/2006/main" xmlns:r="http://schemas.openxmlformats.org/officeDocument/2006/relationships" xmlns:p="http://schemas.openxmlformats.org/presentationml/2006/main">
+  <p:cSld>
+    <p:spTree>
+      <p:nvGrpSpPr>
+        <p:cNvPr id="1" name=""/>
+        <p:cNvGrpSpPr/>
+        <p:nvPr/>
+      </p:nvGrpSpPr>
+      <p:grpSpPr>
+        <a:xfrm>
+          <a:off x="0" y="0"/>
+          <a:ext cx="0" cy="0"/>
+          <a:chOff x="0" y="0"/>
+          <a:chExt cx="0" cy="0"/>
+        </a:xfrm>
+      </p:grpSpPr>
+      <p:sp>
+        <p:nvSpPr>
+          <p:cNvPr id="2" name="Title 1"/>
+          <p:cNvSpPr>
+            <a:spLocks noGrp="1"/>
+          </p:cNvSpPr>
+          <p:nvPr>
+            <p:ph type="title"/>
+          </p:nvPr>
+        </p:nvSpPr>
+        <p:spPr/>
+        <p:txBody>
+          <a:bodyPr/>
+          <a:lstStyle/>
+          <a:p>
+            <a:pPr lvl="0" indent="0" marL="0">
+              <a:buNone/>
+            </a:pPr>
+            <a:r>
+              <a:rPr/>
+              <a:t>Что за Quarto? (2 из 2)</a:t>
+            </a:r>
+          </a:p>
+        </p:txBody>
+      </p:sp>
+      <p:sp>
+        <p:nvSpPr>
+          <p:cNvPr id="3" name="Content Placeholder 2"/>
+          <p:cNvSpPr>
+            <a:spLocks noGrp="1"/>
+          </p:cNvSpPr>
+          <p:nvPr>
+            <p:ph idx="1"/>
+          </p:nvPr>
+        </p:nvSpPr>
+        <p:spPr/>
+        <p:txBody>
+          <a:bodyPr/>
+          <a:lstStyle/>
+          <a:p>
+            <a:pPr lvl="0" indent="0" marL="0">
+              <a:buNone/>
+            </a:pPr>
+            <a:r>
+              <a:rPr/>
+              <a:t>RStudio IDE новых версий включает Quarto, а также предоставляет для него редактор кода с автозаполнением и удобный визуальный редактор.</a:t>
+            </a:r>
+          </a:p>
+          <a:p>
+            <a:pPr lvl="0" indent="0" marL="0">
+              <a:buNone/>
+            </a:pPr>
+            <a:r>
+              <a:rPr/>
+              <a:t>Quarto имеет более широкие по сравнению с Rmarkdown возможности. Можно воспринимать его как:</a:t>
+            </a:r>
+          </a:p>
+          <a:p>
+            <a:pPr lvl="0" indent="0" marL="0">
+              <a:buNone/>
+            </a:pPr>
+            <a:r>
+              <a:rPr/>
+              <a:t> </a:t>
+            </a:r>
+          </a:p>
+          <a:p>
+            <a:pPr lvl="0"/>
+            <a:r>
+              <a:rPr/>
+              <a:t>Rmarkdown++</a:t>
+            </a:r>
+          </a:p>
+          <a:p>
+            <a:pPr lvl="0"/>
+            <a:r>
+              <a:rPr/>
+              <a:t>MS Word с гибридным интерфейсом</a:t>
+            </a:r>
+          </a:p>
+          <a:p>
+            <a:pPr lvl="0"/>
+            <a:r>
+              <a:rPr/>
+              <a:t>Dreamweaver для аналитиков и ученых</a:t>
+            </a:r>
+          </a:p>
+        </p:txBody>
+      </p:sp>
+    </p:spTree>
+  </p:cSld>
+  <p:timing>
+    <p:tnLst>
+      <p:par>
+        <p:cTn id="1" dur="indefinite" restart="never" nodeType="tmRoot">
+          <p:childTnLst>
+            <p:seq concurrent="1" nextAc="seek">
+              <p:cTn id="2" dur="indefinite" nodeType="mainSeq">
+                <p:childTnLst>
+                  <p:par>
+                    <p:cTn id="3" fill="hold">
+                      <p:stCondLst>
+                        <p:cond delay="indefinite"/>
+                      </p:stCondLst>
+                      <p:childTnLst>
+                        <p:par>
+                          <p:cTn id="4" fill="hold">
+                            <p:stCondLst>
+                              <p:cond delay="0"/>
+                            </p:stCondLst>
+                            <p:childTnLst>
+                              <p:par>
+                                <p:cTn id="5" presetID="1" presetClass="entr" presetSubtype="0" fill="hold" grpId="0" nodeType="clickEffect">
+                                  <p:stCondLst>
+                                    <p:cond delay="0"/>
+                                  </p:stCondLst>
+                                  <p:childTnLst>
+                                    <p:set>
+                                      <p:cBhvr>
+                                        <p:cTn id="6" dur="1" fill="hold">
+                                          <p:stCondLst>
+                                            <p:cond delay="0"/>
+                                          </p:stCondLst>
+                                        </p:cTn>
+                                        <p:tgtEl>
+                                          <p:spTgt spid="3">
+                                            <p:txEl>
+                                              <p:pRg st="3" end="3"/>
+                                            </p:txEl>
+                                          </p:spTgt>
+                                        </p:tgtEl>
+                                        <p:attrNameLst>
+                                          <p:attrName>style.visibility</p:attrName>
+                                        </p:attrNameLst>
+                                      </p:cBhvr>
+                                      <p:to>
+                                        <p:strVal val="visible"/>
+                                      </p:to>
+                                    </p:set>
+                                  </p:childTnLst>
+                                </p:cTn>
+                              </p:par>
+                            </p:childTnLst>
+                          </p:cTn>
+                        </p:par>
+                      </p:childTnLst>
+                    </p:cTn>
+                  </p:par>
+                  <p:par>
+                    <p:cTn id="7" fill="hold">
+                      <p:stCondLst>
+                        <p:cond delay="indefinite"/>
+                      </p:stCondLst>
+                      <p:childTnLst>
+                        <p:par>
+                          <p:cTn id="8" fill="hold">
+                            <p:stCondLst>
+                              <p:cond delay="0"/>
+                            </p:stCondLst>
+                            <p:childTnLst>
+                              <p:par>
+                                <p:cTn id="9" presetID="1" presetClass="entr" presetSubtype="0" fill="hold" grpId="0" nodeType="clickEffect">
+                                  <p:stCondLst>
+                                    <p:cond delay="0"/>
+                                  </p:stCondLst>
+                                  <p:childTnLst>
+                                    <p:set>
+                                      <p:cBhvr>
+                                        <p:cTn id="10" dur="1" fill="hold">
+                                          <p:stCondLst>
+                                            <p:cond delay="0"/>
+                                          </p:stCondLst>
+                                        </p:cTn>
+                                        <p:tgtEl>
+                                          <p:spTgt spid="3">
+                                            <p:txEl>
+                                              <p:pRg st="4" end="4"/>
+                                            </p:txEl>
+                                          </p:spTgt>
+                                        </p:tgtEl>
+                                        <p:attrNameLst>
+                                          <p:attrName>style.visibility</p:attrName>
+                                        </p:attrNameLst>
+                                      </p:cBhvr>
+                                      <p:to>
+                                        <p:strVal val="visible"/>
+                                      </p:to>
+                                    </p:set>
+                                  </p:childTnLst>
+                                </p:cTn>
+                              </p:par>
+                            </p:childTnLst>
+                          </p:cTn>
+                        </p:par>
+                      </p:childTnLst>
+                    </p:cTn>
+                  </p:par>
+                  <p:par>
+                    <p:cTn id="11" fill="hold">
+                      <p:stCondLst>
+                        <p:cond delay="indefinite"/>
+                      </p:stCondLst>
+                      <p:childTnLst>
+                        <p:par>
+                          <p:cTn id="12" fill="hold">
+                            <p:stCondLst>
+                              <p:cond delay="0"/>
+                            </p:stCondLst>
+                            <p:childTnLst>
+                              <p:par>
+                                <p:cTn id="13" presetID="1" presetClass="entr" presetSubtype="0" fill="hold" grpId="0" nodeType="clickEffect">
+                                  <p:stCondLst>
+                                    <p:cond delay="0"/>
+                                  </p:stCondLst>
+                                  <p:childTnLst>
+                                    <p:set>
+                                      <p:cBhvr>
+                                        <p:cTn id="14" dur="1" fill="hold">
+                                          <p:stCondLst>
+                                            <p:cond delay="0"/>
+                                          </p:stCondLst>
+                                        </p:cTn>
+                                        <p:tgtEl>
+                                          <p:spTgt spid="3">
+                                            <p:txEl>
+                                              <p:pRg st="5" end="5"/>
+                                            </p:txEl>
+                                          </p:spTgt>
+                                        </p:tgtEl>
+                                        <p:attrNameLst>
+                                          <p:attrName>style.visibility</p:attrName>
+                                        </p:attrNameLst>
+                                      </p:cBhvr>
+                                      <p:to>
+                                        <p:strVal val="visible"/>
+                                      </p:to>
+                                    </p:set>
+                                  </p:childTnLst>
+                                </p:cTn>
+                              </p:par>
+                            </p:childTnLst>
+                          </p:cTn>
+                        </p:par>
+                      </p:childTnLst>
+                    </p:cTn>
+                  </p:par>
+                </p:childTnLst>
+              </p:cTn>
+              <p:prevCondLst>
+                <p:cond evt="onPrev" delay="0">
+                  <p:tgtEl>
+                    <p:sldTgt/>
+                  </p:tgtEl>
+                </p:cond>
+              </p:prevCondLst>
+              <p:nextCondLst>
+                <p:cond evt="onNext" delay="0">
+                  <p:tgtEl>
+                    <p:sldTgt/>
+                  </p:tgtEl>
+                </p:cond>
+              </p:nextCondLst>
+            </p:seq>
+          </p:childTnLst>
+        </p:cTn>
+      </p:par>
+    </p:tnLst>
+    <p:bldLst>
+      <p:bldP spid="3" grpId="0" uiExpand="1" build="p"/>
+    </p:bldLst>
+  </p:timing>
+</p:sld>
+</file>
+
+<file path=ppt/slides/slide9.xml><?xml version="1.0" encoding="utf-8"?>
+<p:sld xmlns:a="http://schemas.openxmlformats.org/drawingml/2006/main" xmlns:r="http://schemas.openxmlformats.org/officeDocument/2006/relationships" xmlns:p="http://schemas.openxmlformats.org/presentationml/2006/main">
+  <p:cSld>
+    <p:spTree>
+      <p:nvGrpSpPr>
+        <p:cNvPr id="1" name=""/>
+        <p:cNvGrpSpPr/>
+        <p:nvPr/>
+      </p:nvGrpSpPr>
+      <p:grpSpPr>
+        <a:xfrm>
+          <a:off x="0" y="0"/>
+          <a:ext cx="0" cy="0"/>
+          <a:chOff x="0" y="0"/>
+          <a:chExt cx="0" cy="0"/>
+        </a:xfrm>
+      </p:grpSpPr>
+      <p:sp>
+        <p:nvSpPr>
+          <p:cNvPr id="9" name="Заголовок 8">
+            <a:extLst>
+              <a:ext uri="{FF2B5EF4-FFF2-40B4-BE49-F238E27FC236}">
+                <a16:creationId xmlns:a16="http://schemas.microsoft.com/office/drawing/2014/main" id="{FB47BD9B-F2D0-6358-9482-569589771537}"/>
+              </a:ext>
+            </a:extLst>
+          </p:cNvPr>
+          <p:cNvSpPr>
+            <a:spLocks noGrp="1"/>
+          </p:cNvSpPr>
+          <p:nvPr>
+            <p:ph hasCustomPrompt="1" type="title"/>
+          </p:nvPr>
+        </p:nvSpPr>
+        <p:spPr/>
+        <p:txBody>
+          <a:bodyPr/>
+          <a:lstStyle/>
+          <a:p>
+            <a:pPr lvl="0" indent="0" marL="0">
+              <a:buNone/>
+            </a:pPr>
+            <a:r>
+              <a:rPr/>
+              <a:t>Что нового: не только R</a:t>
+            </a:r>
+          </a:p>
+        </p:txBody>
+      </p:sp>
+      <p:sp>
+        <p:nvSpPr>
+          <p:cNvPr id="6" name="Text Placeholder 2">
+            <a:extLst>
+              <a:ext uri="{FF2B5EF4-FFF2-40B4-BE49-F238E27FC236}">
+                <a16:creationId xmlns:a16="http://schemas.microsoft.com/office/drawing/2014/main" id="{D4BCB0AA-6968-3B8A-7F32-11A39C0E23A3}"/>
+              </a:ext>
+            </a:extLst>
+          </p:cNvPr>
+          <p:cNvSpPr>
+            <a:spLocks noGrp="1"/>
+          </p:cNvSpPr>
+          <p:nvPr>
+            <p:ph idx="10" type="body"/>
+          </p:nvPr>
+        </p:nvSpPr>
+        <p:spPr/>
+        <p:txBody>
+          <a:bodyPr/>
+          <a:lstStyle/>
+          <a:p>
+            <a:pPr lvl="0" indent="0" marL="0">
+              <a:buNone/>
+            </a:pPr>
+            <a:r>
+              <a:rPr/>
+              <a:t>Quarto умеет обрабатывать код на следующих языках:</a:t>
+            </a:r>
+          </a:p>
+          <a:p>
+            <a:pPr lvl="0"/>
+            <a:r>
+              <a:rPr/>
+              <a:t>R</a:t>
+            </a:r>
+          </a:p>
+          <a:p>
+            <a:pPr lvl="0"/>
+            <a:r>
+              <a:rPr/>
+              <a:t>Python</a:t>
+            </a:r>
+          </a:p>
+          <a:p>
+            <a:pPr lvl="0"/>
+            <a:r>
+              <a:rPr/>
+              <a:t>Julia</a:t>
+            </a:r>
+          </a:p>
+          <a:p>
+            <a:pPr lvl="0"/>
+            <a:r>
+              <a:rPr/>
+              <a:t>Observable</a:t>
+            </a:r>
+          </a:p>
+        </p:txBody>
+      </p:sp>
+      <p:pic>
+        <p:nvPicPr>
+          <p:cNvPr descr="languages_grey.png" id="0" name="Picture 1"/>
+          <p:cNvPicPr>
+            <a:picLocks noGrp="1" noChangeAspect="1"/>
+          </p:cNvPicPr>
+          <p:nvPr/>
+        </p:nvPicPr>
+        <p:blipFill>
+          <a:blip r:embed="rId2"/>
+          <a:stretch>
+            <a:fillRect/>
+          </a:stretch>
+        </p:blipFill>
+        <p:spPr bwMode="auto">
+          <a:xfrm>
+            <a:off x="4902200" y="1143000"/>
+            <a:ext cx="3441700" cy="3441700"/>
+          </a:xfrm>
+          <a:prstGeom prst="rect">
+            <a:avLst/>
+          </a:prstGeom>
+          <a:noFill/>
+          <a:ln w="9525">
+            <a:noFill/>
+            <a:headEnd/>
+            <a:tailEnd/>
+          </a:ln>
+        </p:spPr>
+      </p:pic>
+    </p:spTree>
+  </p:cSld>
+  <p:timing>
+    <p:tnLst>
+      <p:par>
+        <p:cTn id="1" dur="indefinite" restart="never" nodeType="tmRoot">
+          <p:childTnLst>
+            <p:seq concurrent="1" nextAc="seek">
+              <p:cTn id="2" dur="indefinite" nodeType="mainSeq">
+                <p:childTnLst>
+                  <p:par>
+                    <p:cTn id="3" fill="hold">
+                      <p:stCondLst>
+                        <p:cond delay="indefinite"/>
+                      </p:stCondLst>
+                      <p:childTnLst>
+                        <p:par>
+                          <p:cTn id="4" fill="hold">
+                            <p:stCondLst>
+                              <p:cond delay="0"/>
+                            </p:stCondLst>
+                            <p:childTnLst>
+                              <p:par>
+                                <p:cTn id="5" presetID="1" presetClass="entr" presetSubtype="0" fill="hold" grpId="0" nodeType="clickEffect">
+                                  <p:stCondLst>
+                                    <p:cond delay="0"/>
+                                  </p:stCondLst>
+                                  <p:childTnLst>
+                                    <p:set>
+                                      <p:cBhvr>
+                                        <p:cTn id="6" dur="1" fill="hold">
+                                          <p:stCondLst>
+                                            <p:cond delay="0"/>
+                                          </p:stCondLst>
+                                        </p:cTn>
+                                        <p:tgtEl>
+                                          <p:spTgt spid="6">
+                                            <p:txEl>
+                                              <p:pRg st="1" end="1"/>
+                                            </p:txEl>
+                                          </p:spTgt>
+                                        </p:tgtEl>
+                                        <p:attrNameLst>
+                                          <p:attrName>style.visibility</p:attrName>
+                                        </p:attrNameLst>
+                                      </p:cBhvr>
+                                      <p:to>
+                                        <p:strVal val="visible"/>
+                                      </p:to>
+                                    </p:set>
+                                  </p:childTnLst>
+                                </p:cTn>
+                              </p:par>
+                            </p:childTnLst>
+                          </p:cTn>
+                        </p:par>
+                      </p:childTnLst>
+                    </p:cTn>
+                  </p:par>
+                  <p:par>
+                    <p:cTn id="7" fill="hold">
+                      <p:stCondLst>
+                        <p:cond delay="indefinite"/>
+                      </p:stCondLst>
+                      <p:childTnLst>
+                        <p:par>
+                          <p:cTn id="8" fill="hold">
+                            <p:stCondLst>
+                              <p:cond delay="0"/>
+                            </p:stCondLst>
+                            <p:childTnLst>
+                              <p:par>
+                                <p:cTn id="9" presetID="1" presetClass="entr" presetSubtype="0" fill="hold" grpId="0" nodeType="clickEffect">
+                                  <p:stCondLst>
+                                    <p:cond delay="0"/>
+                                  </p:stCondLst>
+                                  <p:childTnLst>
+                                    <p:set>
+                                      <p:cBhvr>
+                                        <p:cTn id="10" dur="1" fill="hold">
+                                          <p:stCondLst>
+                                            <p:cond delay="0"/>
+                                          </p:stCondLst>
+                                        </p:cTn>
+                                        <p:tgtEl>
+                                          <p:spTgt spid="6">
+                                            <p:txEl>
+                                              <p:pRg st="2" end="2"/>
+                                            </p:txEl>
+                                          </p:spTgt>
+                                        </p:tgtEl>
+                                        <p:attrNameLst>
+                                          <p:attrName>style.visibility</p:attrName>
+                                        </p:attrNameLst>
+                                      </p:cBhvr>
+                                      <p:to>
+                                        <p:strVal val="visible"/>
+                                      </p:to>
+                                    </p:set>
+                                  </p:childTnLst>
+                                </p:cTn>
+                              </p:par>
+                            </p:childTnLst>
+                          </p:cTn>
+                        </p:par>
+                      </p:childTnLst>
+                    </p:cTn>
+                  </p:par>
+                  <p:par>
+                    <p:cTn id="11" fill="hold">
+                      <p:stCondLst>
+                        <p:cond delay="indefinite"/>
+                      </p:stCondLst>
+                      <p:childTnLst>
+                        <p:par>
+                          <p:cTn id="12" fill="hold">
+                            <p:stCondLst>
+                              <p:cond delay="0"/>
+                            </p:stCondLst>
+                            <p:childTnLst>
+                              <p:par>
+                                <p:cTn id="13" presetID="1" presetClass="entr" presetSubtype="0" fill="hold" grpId="0" nodeType="clickEffect">
+                                  <p:stCondLst>
+                                    <p:cond delay="0"/>
+                                  </p:stCondLst>
+                                  <p:childTnLst>
+                                    <p:set>
+                                      <p:cBhvr>
+                                        <p:cTn id="14" dur="1" fill="hold">
+                                          <p:stCondLst>
+                                            <p:cond delay="0"/>
+                                          </p:stCondLst>
+                                        </p:cTn>
+                                        <p:tgtEl>
+                                          <p:spTgt spid="6">
+                                            <p:txEl>
+                                              <p:pRg st="3" end="3"/>
+                                            </p:txEl>
+                                          </p:spTgt>
+                                        </p:tgtEl>
+                                        <p:attrNameLst>
+                                          <p:attrName>style.visibility</p:attrName>
+                                        </p:attrNameLst>
+                                      </p:cBhvr>
+                                      <p:to>
+                                        <p:strVal val="visible"/>
+                                      </p:to>
+                                    </p:set>
+                                  </p:childTnLst>
+                                </p:cTn>
+                              </p:par>
+                            </p:childTnLst>
+                          </p:cTn>
+                        </p:par>
+                      </p:childTnLst>
+                    </p:cTn>
+                  </p:par>
+                  <p:par>
+                    <p:cTn id="15" fill="hold">
+                      <p:stCondLst>
+                        <p:cond delay="indefinite"/>
+                      </p:stCondLst>
+                      <p:childTnLst>
+                        <p:par>
+                          <p:cTn id="16" fill="hold">
+                            <p:stCondLst>
+                              <p:cond delay="0"/>
+                            </p:stCondLst>
+                            <p:childTnLst>
+                              <p:par>
+                                <p:cTn id="17" presetID="1" presetClass="entr" presetSubtype="0" fill="hold" grpId="0" nodeType="clickEffect">
+                                  <p:stCondLst>
+                                    <p:cond delay="0"/>
+                                  </p:stCondLst>
+                                  <p:childTnLst>
+                                    <p:set>
+                                      <p:cBhvr>
+                                        <p:cTn id="18" dur="1" fill="hold">
+                                          <p:stCondLst>
+                                            <p:cond delay="0"/>
+                                          </p:stCondLst>
+                                        </p:cTn>
+                                        <p:tgtEl>
+                                          <p:spTgt spid="6">
+                                            <p:txEl>
+                                              <p:pRg st="4" end="4"/>
+                                            </p:txEl>
+                                          </p:spTgt>
+                                        </p:tgtEl>
+                                        <p:attrNameLst>
+                                          <p:attrName>style.visibility</p:attrName>
+                                        </p:attrNameLst>
+                                      </p:cBhvr>
+                                      <p:to>
+                                        <p:strVal val="visible"/>
+                                      </p:to>
+                                    </p:set>
+                                  </p:childTnLst>
+                                </p:cTn>
+                              </p:par>
+                            </p:childTnLst>
+                          </p:cTn>
+                        </p:par>
+                      </p:childTnLst>
+                    </p:cTn>
+                  </p:par>
+                </p:childTnLst>
+              </p:cTn>
+              <p:prevCondLst>
+                <p:cond evt="onPrev" delay="0">
+                  <p:tgtEl>
+                    <p:sldTgt/>
+                  </p:tgtEl>
+                </p:cond>
+              </p:prevCondLst>
+              <p:nextCondLst>
+                <p:cond evt="onNext" delay="0">
+                  <p:tgtEl>
+                    <p:sldTgt/>
+                  </p:tgtEl>
+                </p:cond>
+              </p:nextCondLst>
+            </p:seq>
+          </p:childTnLst>
+        </p:cTn>
+      </p:par>
+    </p:tnLst>
+    <p:bldLst>
+      <p:bldP spid="6" grpId="0" uiExpand="1" build="p"/>
+    </p:bldLst>
+  </p:timing>
 </p:sld>
 </file>
 

</xml_diff>

<commit_message>
Much better presentation (part 1)
</commit_message>
<xml_diff>
--- a/01-Quarto/slides_draft.pptx
+++ b/01-Quarto/slides_draft.pptx
@@ -4,6 +4,9 @@
   <p:sldMasterIdLst>
     <p:sldMasterId id="2147483648" r:id="rId1"/>
   </p:sldMasterIdLst>
+  <p:notesMasterIdLst>
+    <p:notesMasterId r:id="rId21"/>
+  </p:notesMasterIdLst>
   <p:sldIdLst>
     <p:sldId id="256" r:id="rId2"/>
     <p:sldId id="257" r:id="rId3"/>
@@ -141,6 +144,519 @@
 </p:presentation>
 </file>
 
+<file path=ppt/notesMasters/notesMaster1.xml><?xml version="1.0" encoding="utf-8"?>
+<p:notesMaster xmlns:a="http://schemas.openxmlformats.org/drawingml/2006/main" xmlns:r="http://schemas.openxmlformats.org/officeDocument/2006/relationships" xmlns:p="http://schemas.openxmlformats.org/presentationml/2006/main">
+  <p:cSld>
+    <p:bg>
+      <p:bgRef idx="1001">
+        <a:schemeClr val="bg1"/>
+      </p:bgRef>
+    </p:bg>
+    <p:spTree>
+      <p:nvGrpSpPr>
+        <p:cNvPr id="1" name=""/>
+        <p:cNvGrpSpPr/>
+        <p:nvPr/>
+      </p:nvGrpSpPr>
+      <p:grpSpPr>
+        <a:xfrm>
+          <a:off x="0" y="0"/>
+          <a:ext cx="0" cy="0"/>
+          <a:chOff x="0" y="0"/>
+          <a:chExt cx="0" cy="0"/>
+        </a:xfrm>
+      </p:grpSpPr>
+      <p:sp>
+        <p:nvSpPr>
+          <p:cNvPr id="2" name="Header Placeholder 1"/>
+          <p:cNvSpPr>
+            <a:spLocks noGrp="1"/>
+          </p:cNvSpPr>
+          <p:nvPr>
+            <p:ph type="hdr" sz="quarter"/>
+          </p:nvPr>
+        </p:nvSpPr>
+        <p:spPr>
+          <a:xfrm>
+            <a:off x="0" y="0"/>
+            <a:ext cx="2971800" cy="458788"/>
+          </a:xfrm>
+          <a:prstGeom prst="rect">
+            <a:avLst/>
+          </a:prstGeom>
+        </p:spPr>
+        <p:txBody>
+          <a:bodyPr vert="horz" lIns="91440" tIns="45720" rIns="91440" bIns="45720" rtlCol="0"/>
+          <a:lstStyle>
+            <a:lvl1pPr algn="l">
+              <a:defRPr sz="1200"/>
+            </a:lvl1pPr>
+          </a:lstStyle>
+          <a:p>
+            <a:endParaRPr lang="en-US"/>
+          </a:p>
+        </p:txBody>
+      </p:sp>
+      <p:sp>
+        <p:nvSpPr>
+          <p:cNvPr id="3" name="Date Placeholder 2"/>
+          <p:cNvSpPr>
+            <a:spLocks noGrp="1"/>
+          </p:cNvSpPr>
+          <p:nvPr>
+            <p:ph type="dt" idx="1"/>
+          </p:nvPr>
+        </p:nvSpPr>
+        <p:spPr>
+          <a:xfrm>
+            <a:off x="3884613" y="0"/>
+            <a:ext cx="2971800" cy="458788"/>
+          </a:xfrm>
+          <a:prstGeom prst="rect">
+            <a:avLst/>
+          </a:prstGeom>
+        </p:spPr>
+        <p:txBody>
+          <a:bodyPr vert="horz" lIns="91440" tIns="45720" rIns="91440" bIns="45720" rtlCol="0"/>
+          <a:lstStyle>
+            <a:lvl1pPr algn="r">
+              <a:defRPr sz="1200"/>
+            </a:lvl1pPr>
+          </a:lstStyle>
+          <a:p>
+            <a:fld id="{0F9C1CCF-B725-44A7-AA57-5E433BD85C9F}" type="datetimeFigureOut">
+              <a:rPr lang="en-US" smtClean="0"/>
+              <a:t>6/15/2023</a:t>
+            </a:fld>
+            <a:endParaRPr lang="en-US"/>
+          </a:p>
+        </p:txBody>
+      </p:sp>
+      <p:sp>
+        <p:nvSpPr>
+          <p:cNvPr id="4" name="Slide Image Placeholder 3"/>
+          <p:cNvSpPr>
+            <a:spLocks noGrp="1" noRot="1" noChangeAspect="1"/>
+          </p:cNvSpPr>
+          <p:nvPr>
+            <p:ph type="sldImg" idx="2"/>
+          </p:nvPr>
+        </p:nvSpPr>
+        <p:spPr>
+          <a:xfrm>
+            <a:off x="685800" y="1143000"/>
+            <a:ext cx="5486400" cy="3086100"/>
+          </a:xfrm>
+          <a:prstGeom prst="rect">
+            <a:avLst/>
+          </a:prstGeom>
+          <a:noFill/>
+          <a:ln w="12700">
+            <a:solidFill>
+              <a:prstClr val="black"/>
+            </a:solidFill>
+          </a:ln>
+        </p:spPr>
+        <p:txBody>
+          <a:bodyPr vert="horz" lIns="91440" tIns="45720" rIns="91440" bIns="45720" rtlCol="0" anchor="ctr"/>
+          <a:lstStyle/>
+          <a:p>
+            <a:endParaRPr lang="en-US"/>
+          </a:p>
+        </p:txBody>
+      </p:sp>
+      <p:sp>
+        <p:nvSpPr>
+          <p:cNvPr id="5" name="Notes Placeholder 4"/>
+          <p:cNvSpPr>
+            <a:spLocks noGrp="1"/>
+          </p:cNvSpPr>
+          <p:nvPr>
+            <p:ph type="body" sz="quarter" idx="3"/>
+          </p:nvPr>
+        </p:nvSpPr>
+        <p:spPr>
+          <a:xfrm>
+            <a:off x="685800" y="4400550"/>
+            <a:ext cx="5486400" cy="3600450"/>
+          </a:xfrm>
+          <a:prstGeom prst="rect">
+            <a:avLst/>
+          </a:prstGeom>
+        </p:spPr>
+        <p:txBody>
+          <a:bodyPr vert="horz" lIns="91440" tIns="45720" rIns="91440" bIns="45720" rtlCol="0"/>
+          <a:lstStyle/>
+          <a:p>
+            <a:pPr lvl="0"/>
+            <a:r>
+              <a:rPr lang="en-US"/>
+              <a:t>Click to edit Master text styles</a:t>
+            </a:r>
+          </a:p>
+          <a:p>
+            <a:pPr lvl="1"/>
+            <a:r>
+              <a:rPr lang="en-US"/>
+              <a:t>Second level</a:t>
+            </a:r>
+          </a:p>
+          <a:p>
+            <a:pPr lvl="2"/>
+            <a:r>
+              <a:rPr lang="en-US"/>
+              <a:t>Third level</a:t>
+            </a:r>
+          </a:p>
+          <a:p>
+            <a:pPr lvl="3"/>
+            <a:r>
+              <a:rPr lang="en-US"/>
+              <a:t>Fourth level</a:t>
+            </a:r>
+          </a:p>
+          <a:p>
+            <a:pPr lvl="4"/>
+            <a:r>
+              <a:rPr lang="en-US"/>
+              <a:t>Fifth level</a:t>
+            </a:r>
+          </a:p>
+        </p:txBody>
+      </p:sp>
+      <p:sp>
+        <p:nvSpPr>
+          <p:cNvPr id="6" name="Footer Placeholder 5"/>
+          <p:cNvSpPr>
+            <a:spLocks noGrp="1"/>
+          </p:cNvSpPr>
+          <p:nvPr>
+            <p:ph type="ftr" sz="quarter" idx="4"/>
+          </p:nvPr>
+        </p:nvSpPr>
+        <p:spPr>
+          <a:xfrm>
+            <a:off x="0" y="8685213"/>
+            <a:ext cx="2971800" cy="458787"/>
+          </a:xfrm>
+          <a:prstGeom prst="rect">
+            <a:avLst/>
+          </a:prstGeom>
+        </p:spPr>
+        <p:txBody>
+          <a:bodyPr vert="horz" lIns="91440" tIns="45720" rIns="91440" bIns="45720" rtlCol="0" anchor="b"/>
+          <a:lstStyle>
+            <a:lvl1pPr algn="l">
+              <a:defRPr sz="1200"/>
+            </a:lvl1pPr>
+          </a:lstStyle>
+          <a:p>
+            <a:endParaRPr lang="en-US"/>
+          </a:p>
+        </p:txBody>
+      </p:sp>
+      <p:sp>
+        <p:nvSpPr>
+          <p:cNvPr id="7" name="Slide Number Placeholder 6"/>
+          <p:cNvSpPr>
+            <a:spLocks noGrp="1"/>
+          </p:cNvSpPr>
+          <p:nvPr>
+            <p:ph type="sldNum" sz="quarter" idx="5"/>
+          </p:nvPr>
+        </p:nvSpPr>
+        <p:spPr>
+          <a:xfrm>
+            <a:off x="3884613" y="8685213"/>
+            <a:ext cx="2971800" cy="458787"/>
+          </a:xfrm>
+          <a:prstGeom prst="rect">
+            <a:avLst/>
+          </a:prstGeom>
+        </p:spPr>
+        <p:txBody>
+          <a:bodyPr vert="horz" lIns="91440" tIns="45720" rIns="91440" bIns="45720" rtlCol="0" anchor="b"/>
+          <a:lstStyle>
+            <a:lvl1pPr algn="r">
+              <a:defRPr sz="1200"/>
+            </a:lvl1pPr>
+          </a:lstStyle>
+          <a:p>
+            <a:fld id="{18BDFEC3-8487-43E8-A154-7C12CBC1FFF2}" type="slidenum">
+              <a:rPr lang="en-US" smtClean="0"/>
+              <a:t>‹#›</a:t>
+            </a:fld>
+            <a:endParaRPr lang="en-US"/>
+          </a:p>
+        </p:txBody>
+      </p:sp>
+    </p:spTree>
+    <p:extLst>
+      <p:ext uri="{BB962C8B-B14F-4D97-AF65-F5344CB8AC3E}">
+        <p14:creationId xmlns:p14="http://schemas.microsoft.com/office/powerpoint/2010/main" val="3782709779"/>
+      </p:ext>
+    </p:extLst>
+  </p:cSld>
+  <p:clrMap bg1="lt1" tx1="dk1" bg2="lt2" tx2="dk2" accent1="accent1" accent2="accent2" accent3="accent3" accent4="accent4" accent5="accent5" accent6="accent6" hlink="hlink" folHlink="folHlink"/>
+  <p:notesStyle>
+    <a:lvl1pPr marL="0" algn="l" defTabSz="914400" rtl="0" eaLnBrk="1" latinLnBrk="0" hangingPunct="1">
+      <a:defRPr sz="1200" kern="1200">
+        <a:solidFill>
+          <a:schemeClr val="tx1"/>
+        </a:solidFill>
+        <a:latin typeface="+mn-lt"/>
+        <a:ea typeface="+mn-ea"/>
+        <a:cs typeface="+mn-cs"/>
+      </a:defRPr>
+    </a:lvl1pPr>
+    <a:lvl2pPr marL="457200" algn="l" defTabSz="914400" rtl="0" eaLnBrk="1" latinLnBrk="0" hangingPunct="1">
+      <a:defRPr sz="1200" kern="1200">
+        <a:solidFill>
+          <a:schemeClr val="tx1"/>
+        </a:solidFill>
+        <a:latin typeface="+mn-lt"/>
+        <a:ea typeface="+mn-ea"/>
+        <a:cs typeface="+mn-cs"/>
+      </a:defRPr>
+    </a:lvl2pPr>
+    <a:lvl3pPr marL="914400" algn="l" defTabSz="914400" rtl="0" eaLnBrk="1" latinLnBrk="0" hangingPunct="1">
+      <a:defRPr sz="1200" kern="1200">
+        <a:solidFill>
+          <a:schemeClr val="tx1"/>
+        </a:solidFill>
+        <a:latin typeface="+mn-lt"/>
+        <a:ea typeface="+mn-ea"/>
+        <a:cs typeface="+mn-cs"/>
+      </a:defRPr>
+    </a:lvl3pPr>
+    <a:lvl4pPr marL="1371600" algn="l" defTabSz="914400" rtl="0" eaLnBrk="1" latinLnBrk="0" hangingPunct="1">
+      <a:defRPr sz="1200" kern="1200">
+        <a:solidFill>
+          <a:schemeClr val="tx1"/>
+        </a:solidFill>
+        <a:latin typeface="+mn-lt"/>
+        <a:ea typeface="+mn-ea"/>
+        <a:cs typeface="+mn-cs"/>
+      </a:defRPr>
+    </a:lvl4pPr>
+    <a:lvl5pPr marL="1828800" algn="l" defTabSz="914400" rtl="0" eaLnBrk="1" latinLnBrk="0" hangingPunct="1">
+      <a:defRPr sz="1200" kern="1200">
+        <a:solidFill>
+          <a:schemeClr val="tx1"/>
+        </a:solidFill>
+        <a:latin typeface="+mn-lt"/>
+        <a:ea typeface="+mn-ea"/>
+        <a:cs typeface="+mn-cs"/>
+      </a:defRPr>
+    </a:lvl5pPr>
+    <a:lvl6pPr marL="2286000" algn="l" defTabSz="914400" rtl="0" eaLnBrk="1" latinLnBrk="0" hangingPunct="1">
+      <a:defRPr sz="1200" kern="1200">
+        <a:solidFill>
+          <a:schemeClr val="tx1"/>
+        </a:solidFill>
+        <a:latin typeface="+mn-lt"/>
+        <a:ea typeface="+mn-ea"/>
+        <a:cs typeface="+mn-cs"/>
+      </a:defRPr>
+    </a:lvl6pPr>
+    <a:lvl7pPr marL="2743200" algn="l" defTabSz="914400" rtl="0" eaLnBrk="1" latinLnBrk="0" hangingPunct="1">
+      <a:defRPr sz="1200" kern="1200">
+        <a:solidFill>
+          <a:schemeClr val="tx1"/>
+        </a:solidFill>
+        <a:latin typeface="+mn-lt"/>
+        <a:ea typeface="+mn-ea"/>
+        <a:cs typeface="+mn-cs"/>
+      </a:defRPr>
+    </a:lvl7pPr>
+    <a:lvl8pPr marL="3200400" algn="l" defTabSz="914400" rtl="0" eaLnBrk="1" latinLnBrk="0" hangingPunct="1">
+      <a:defRPr sz="1200" kern="1200">
+        <a:solidFill>
+          <a:schemeClr val="tx1"/>
+        </a:solidFill>
+        <a:latin typeface="+mn-lt"/>
+        <a:ea typeface="+mn-ea"/>
+        <a:cs typeface="+mn-cs"/>
+      </a:defRPr>
+    </a:lvl8pPr>
+    <a:lvl9pPr marL="3657600" algn="l" defTabSz="914400" rtl="0" eaLnBrk="1" latinLnBrk="0" hangingPunct="1">
+      <a:defRPr sz="1200" kern="1200">
+        <a:solidFill>
+          <a:schemeClr val="tx1"/>
+        </a:solidFill>
+        <a:latin typeface="+mn-lt"/>
+        <a:ea typeface="+mn-ea"/>
+        <a:cs typeface="+mn-cs"/>
+      </a:defRPr>
+    </a:lvl9pPr>
+  </p:notesStyle>
+</p:notesMaster>
+</file>
+
+<file path=ppt/notesSlides/notesSlide1.xml><?xml version="1.0" encoding="utf-8"?>
+<p:notes xmlns:a="http://schemas.openxmlformats.org/drawingml/2006/main" xmlns:r="http://schemas.openxmlformats.org/officeDocument/2006/relationships" xmlns:p="http://schemas.openxmlformats.org/presentationml/2006/main">
+  <p:cSld>
+    <p:spTree>
+      <p:nvGrpSpPr>
+        <p:cNvPr id="1" name=""/>
+        <p:cNvGrpSpPr/>
+        <p:nvPr/>
+      </p:nvGrpSpPr>
+      <p:grpSpPr>
+        <a:xfrm>
+          <a:off x="0" y="0"/>
+          <a:ext cx="0" cy="0"/>
+          <a:chOff x="0" y="0"/>
+          <a:chExt cx="0" cy="0"/>
+        </a:xfrm>
+      </p:grpSpPr>
+      <p:sp>
+        <p:nvSpPr>
+          <p:cNvPr id="2" name="Slide Image Placeholder 1"/>
+          <p:cNvSpPr>
+            <a:spLocks noGrp="1" noRot="1" noChangeAspect="1"/>
+          </p:cNvSpPr>
+          <p:nvPr>
+            <p:ph type="sldImg"/>
+          </p:nvPr>
+        </p:nvSpPr>
+        <p:spPr/>
+      </p:sp>
+      <p:sp>
+        <p:nvSpPr>
+          <p:cNvPr id="3" name="Notes Placeholder 2"/>
+          <p:cNvSpPr>
+            <a:spLocks noGrp="1"/>
+          </p:cNvSpPr>
+          <p:nvPr>
+            <p:ph type="body" idx="1"/>
+          </p:nvPr>
+        </p:nvSpPr>
+        <p:spPr/>
+        <p:txBody>
+          <a:bodyPr/>
+          <a:lstStyle/>
+          <a:p>
+            <a:pPr lvl="0" indent="0" marL="0">
+              <a:buNone/>
+            </a:pPr>
+            <a:r>
+              <a:rPr/>
+              <a:t>Запятая в качестве десятичного разделителя – стандарт математической записи в России (установлен сразу несколькими ГОСТами) и в большинстве стран Европы, Южной Америки и Африки.</a:t>
+            </a:r>
+          </a:p>
+        </p:txBody>
+      </p:sp>
+      <p:sp>
+        <p:nvSpPr>
+          <p:cNvPr id="4" name="Slide Number Placeholder 3"/>
+          <p:cNvSpPr>
+            <a:spLocks noGrp="1"/>
+          </p:cNvSpPr>
+          <p:nvPr>
+            <p:ph type="sldNum" sz="quarter" idx="10"/>
+          </p:nvPr>
+        </p:nvSpPr>
+        <p:spPr/>
+        <p:txBody>
+          <a:bodyPr/>
+          <a:lstStyle/>
+          <a:p>
+            <a:fld id="{18BDFEC3-8487-43E8-A154-7C12CBC1FFF2}" type="slidenum">
+              <a:rPr lang="en-US"/>
+              <a:t>14</a:t>
+            </a:fld>
+            <a:endParaRPr lang="en-US"/>
+          </a:p>
+        </p:txBody>
+      </p:sp>
+    </p:spTree>
+  </p:cSld>
+</p:notes>
+</file>
+
+<file path=ppt/notesSlides/notesSlide2.xml><?xml version="1.0" encoding="utf-8"?>
+<p:notes xmlns:a="http://schemas.openxmlformats.org/drawingml/2006/main" xmlns:r="http://schemas.openxmlformats.org/officeDocument/2006/relationships" xmlns:p="http://schemas.openxmlformats.org/presentationml/2006/main">
+  <p:cSld>
+    <p:spTree>
+      <p:nvGrpSpPr>
+        <p:cNvPr id="1" name=""/>
+        <p:cNvGrpSpPr/>
+        <p:nvPr/>
+      </p:nvGrpSpPr>
+      <p:grpSpPr>
+        <a:xfrm>
+          <a:off x="0" y="0"/>
+          <a:ext cx="0" cy="0"/>
+          <a:chOff x="0" y="0"/>
+          <a:chExt cx="0" cy="0"/>
+        </a:xfrm>
+      </p:grpSpPr>
+      <p:sp>
+        <p:nvSpPr>
+          <p:cNvPr id="2" name="Slide Image Placeholder 1"/>
+          <p:cNvSpPr>
+            <a:spLocks noGrp="1" noRot="1" noChangeAspect="1"/>
+          </p:cNvSpPr>
+          <p:nvPr>
+            <p:ph type="sldImg"/>
+          </p:nvPr>
+        </p:nvSpPr>
+        <p:spPr/>
+      </p:sp>
+      <p:sp>
+        <p:nvSpPr>
+          <p:cNvPr id="3" name="Notes Placeholder 2"/>
+          <p:cNvSpPr>
+            <a:spLocks noGrp="1"/>
+          </p:cNvSpPr>
+          <p:nvPr>
+            <p:ph type="body" idx="1"/>
+          </p:nvPr>
+        </p:nvSpPr>
+        <p:spPr/>
+        <p:txBody>
+          <a:bodyPr/>
+          <a:lstStyle/>
+          <a:p>
+            <a:pPr lvl="0" indent="0" marL="0">
+              <a:buNone/>
+            </a:pPr>
+            <a:r>
+              <a:rPr/>
+              <a:t>Данная презентация создана в Quarto на основе шаблона Otus!</a:t>
+            </a:r>
+          </a:p>
+        </p:txBody>
+      </p:sp>
+      <p:sp>
+        <p:nvSpPr>
+          <p:cNvPr id="4" name="Slide Number Placeholder 3"/>
+          <p:cNvSpPr>
+            <a:spLocks noGrp="1"/>
+          </p:cNvSpPr>
+          <p:nvPr>
+            <p:ph type="sldNum" sz="quarter" idx="10"/>
+          </p:nvPr>
+        </p:nvSpPr>
+        <p:spPr/>
+        <p:txBody>
+          <a:bodyPr/>
+          <a:lstStyle/>
+          <a:p>
+            <a:fld id="{18BDFEC3-8487-43E8-A154-7C12CBC1FFF2}" type="slidenum">
+              <a:rPr lang="en-US"/>
+              <a:t>17</a:t>
+            </a:fld>
+            <a:endParaRPr lang="en-US"/>
+          </a:p>
+        </p:txBody>
+      </p:sp>
+    </p:spTree>
+  </p:cSld>
+</p:notes>
+</file>
+
 <file path=ppt/slideLayouts/slideLayout1.xml><?xml version="1.0" encoding="utf-8"?>
 <p:sldLayout xmlns:a="http://schemas.openxmlformats.org/drawingml/2006/main" xmlns:r="http://schemas.openxmlformats.org/officeDocument/2006/relationships" xmlns:p="http://schemas.openxmlformats.org/presentationml/2006/main" type="title" preserve="1">
   <p:cSld name="Title Slide">
@@ -359,38 +875,70 @@
         </p:nvSpPr>
         <p:spPr/>
         <p:txBody>
-          <a:bodyPr vert="eaVert"/>
+          <a:bodyPr vert="eaVert">
+            <a:normAutofit/>
+          </a:bodyPr>
           <a:lstStyle>
             <a:lvl1pPr>
-              <a:defRPr>
+              <a:spcBef>
+                <a:spcPts val="400"/>
+              </a:spcBef>
+              <a:spcAft>
+                <a:spcPts val="600"/>
+              </a:spcAft>
+              <a:defRPr sz="2000">
                 <a:solidFill>
                   <a:schemeClr val="bg1"/>
                 </a:solidFill>
               </a:defRPr>
             </a:lvl1pPr>
             <a:lvl2pPr>
-              <a:defRPr>
+              <a:spcBef>
+                <a:spcPts val="400"/>
+              </a:spcBef>
+              <a:spcAft>
+                <a:spcPts val="600"/>
+              </a:spcAft>
+              <a:defRPr sz="2000">
                 <a:solidFill>
                   <a:schemeClr val="bg1"/>
                 </a:solidFill>
               </a:defRPr>
             </a:lvl2pPr>
             <a:lvl3pPr>
-              <a:defRPr>
+              <a:spcBef>
+                <a:spcPts val="400"/>
+              </a:spcBef>
+              <a:spcAft>
+                <a:spcPts val="600"/>
+              </a:spcAft>
+              <a:defRPr sz="1600">
                 <a:solidFill>
                   <a:schemeClr val="bg1"/>
                 </a:solidFill>
               </a:defRPr>
             </a:lvl3pPr>
             <a:lvl4pPr>
-              <a:defRPr>
+              <a:spcBef>
+                <a:spcPts val="400"/>
+              </a:spcBef>
+              <a:spcAft>
+                <a:spcPts val="600"/>
+              </a:spcAft>
+              <a:defRPr sz="1400">
                 <a:solidFill>
                   <a:schemeClr val="bg1"/>
                 </a:solidFill>
               </a:defRPr>
             </a:lvl4pPr>
             <a:lvl5pPr>
-              <a:defRPr>
+              <a:spcBef>
+                <a:spcPts val="400"/>
+              </a:spcBef>
+              <a:spcAft>
+                <a:spcPts val="600"/>
+              </a:spcAft>
+              <a:defRPr sz="1400">
                 <a:solidFill>
                   <a:schemeClr val="bg1"/>
                 </a:solidFill>
@@ -679,35 +1227,65 @@
           <a:bodyPr vert="eaVert"/>
           <a:lstStyle>
             <a:lvl1pPr>
-              <a:defRPr>
+              <a:spcBef>
+                <a:spcPts val="400"/>
+              </a:spcBef>
+              <a:spcAft>
+                <a:spcPts val="600"/>
+              </a:spcAft>
+              <a:defRPr sz="2000">
                 <a:solidFill>
                   <a:schemeClr val="bg1"/>
                 </a:solidFill>
               </a:defRPr>
             </a:lvl1pPr>
             <a:lvl2pPr>
-              <a:defRPr>
+              <a:spcBef>
+                <a:spcPts val="400"/>
+              </a:spcBef>
+              <a:spcAft>
+                <a:spcPts val="600"/>
+              </a:spcAft>
+              <a:defRPr sz="2000">
                 <a:solidFill>
                   <a:schemeClr val="bg1"/>
                 </a:solidFill>
               </a:defRPr>
             </a:lvl2pPr>
             <a:lvl3pPr>
-              <a:defRPr>
+              <a:spcBef>
+                <a:spcPts val="400"/>
+              </a:spcBef>
+              <a:spcAft>
+                <a:spcPts val="600"/>
+              </a:spcAft>
+              <a:defRPr sz="1600">
                 <a:solidFill>
                   <a:schemeClr val="bg1"/>
                 </a:solidFill>
               </a:defRPr>
             </a:lvl3pPr>
             <a:lvl4pPr>
-              <a:defRPr>
+              <a:spcBef>
+                <a:spcPts val="400"/>
+              </a:spcBef>
+              <a:spcAft>
+                <a:spcPts val="600"/>
+              </a:spcAft>
+              <a:defRPr sz="1400">
                 <a:solidFill>
                   <a:schemeClr val="bg1"/>
                 </a:solidFill>
               </a:defRPr>
             </a:lvl4pPr>
             <a:lvl5pPr>
-              <a:defRPr>
+              <a:spcBef>
+                <a:spcPts val="400"/>
+              </a:spcBef>
+              <a:spcAft>
+                <a:spcPts val="600"/>
+              </a:spcAft>
+              <a:defRPr sz="1400">
                 <a:solidFill>
                   <a:schemeClr val="bg1"/>
                 </a:solidFill>
@@ -991,6 +1569,12 @@
           <a:bodyPr/>
           <a:lstStyle>
             <a:lvl1pPr>
+              <a:spcBef>
+                <a:spcPts val="400"/>
+              </a:spcBef>
+              <a:spcAft>
+                <a:spcPts val="600"/>
+              </a:spcAft>
               <a:buClr>
                 <a:srgbClr val="FD6435"/>
               </a:buClr>
@@ -1001,6 +1585,12 @@
               </a:defRPr>
             </a:lvl1pPr>
             <a:lvl2pPr>
+              <a:spcBef>
+                <a:spcPts val="400"/>
+              </a:spcBef>
+              <a:spcAft>
+                <a:spcPts val="600"/>
+              </a:spcAft>
               <a:defRPr sz="1800">
                 <a:solidFill>
                   <a:schemeClr val="bg1"/>
@@ -1008,6 +1598,12 @@
               </a:defRPr>
             </a:lvl2pPr>
             <a:lvl3pPr>
+              <a:spcBef>
+                <a:spcPts val="400"/>
+              </a:spcBef>
+              <a:spcAft>
+                <a:spcPts val="600"/>
+              </a:spcAft>
               <a:defRPr sz="1400">
                 <a:solidFill>
                   <a:schemeClr val="bg1"/>
@@ -1015,6 +1611,12 @@
               </a:defRPr>
             </a:lvl3pPr>
             <a:lvl4pPr>
+              <a:spcBef>
+                <a:spcPts val="400"/>
+              </a:spcBef>
+              <a:spcAft>
+                <a:spcPts val="600"/>
+              </a:spcAft>
               <a:defRPr sz="1200">
                 <a:solidFill>
                   <a:schemeClr val="bg1"/>
@@ -1022,6 +1624,12 @@
               </a:defRPr>
             </a:lvl4pPr>
             <a:lvl5pPr>
+              <a:spcBef>
+                <a:spcPts val="400"/>
+              </a:spcBef>
+              <a:spcAft>
+                <a:spcPts val="600"/>
+              </a:spcAft>
               <a:defRPr sz="1200">
                 <a:solidFill>
                   <a:schemeClr val="bg1"/>
@@ -1434,6 +2042,12 @@
           <a:bodyPr/>
           <a:lstStyle>
             <a:lvl1pPr>
+              <a:spcBef>
+                <a:spcPts val="400"/>
+              </a:spcBef>
+              <a:spcAft>
+                <a:spcPts val="600"/>
+              </a:spcAft>
               <a:buClr>
                 <a:srgbClr val="FD6435"/>
               </a:buClr>
@@ -1444,6 +2058,12 @@
               </a:defRPr>
             </a:lvl1pPr>
             <a:lvl2pPr>
+              <a:spcBef>
+                <a:spcPts val="400"/>
+              </a:spcBef>
+              <a:spcAft>
+                <a:spcPts val="600"/>
+              </a:spcAft>
               <a:buClr>
                 <a:srgbClr val="FD6435"/>
               </a:buClr>
@@ -1454,6 +2074,12 @@
               </a:defRPr>
             </a:lvl2pPr>
             <a:lvl3pPr>
+              <a:spcBef>
+                <a:spcPts val="400"/>
+              </a:spcBef>
+              <a:spcAft>
+                <a:spcPts val="600"/>
+              </a:spcAft>
               <a:defRPr sz="1400">
                 <a:solidFill>
                   <a:schemeClr val="bg1"/>
@@ -1461,6 +2087,12 @@
               </a:defRPr>
             </a:lvl3pPr>
             <a:lvl4pPr>
+              <a:spcBef>
+                <a:spcPts val="400"/>
+              </a:spcBef>
+              <a:spcAft>
+                <a:spcPts val="600"/>
+              </a:spcAft>
               <a:defRPr sz="1200">
                 <a:solidFill>
                   <a:schemeClr val="bg1"/>
@@ -1468,6 +2100,12 @@
               </a:defRPr>
             </a:lvl4pPr>
             <a:lvl5pPr>
+              <a:spcBef>
+                <a:spcPts val="400"/>
+              </a:spcBef>
+              <a:spcAft>
+                <a:spcPts val="600"/>
+              </a:spcAft>
               <a:defRPr sz="1200">
                 <a:solidFill>
                   <a:schemeClr val="bg1"/>
@@ -1544,6 +2182,12 @@
           <a:bodyPr/>
           <a:lstStyle>
             <a:lvl1pPr>
+              <a:spcBef>
+                <a:spcPts val="400"/>
+              </a:spcBef>
+              <a:spcAft>
+                <a:spcPts val="600"/>
+              </a:spcAft>
               <a:buClr>
                 <a:srgbClr val="FD6435"/>
               </a:buClr>
@@ -1554,6 +2198,12 @@
               </a:defRPr>
             </a:lvl1pPr>
             <a:lvl2pPr>
+              <a:spcBef>
+                <a:spcPts val="400"/>
+              </a:spcBef>
+              <a:spcAft>
+                <a:spcPts val="600"/>
+              </a:spcAft>
               <a:buClr>
                 <a:srgbClr val="FD6435"/>
               </a:buClr>
@@ -1564,6 +2214,12 @@
               </a:defRPr>
             </a:lvl2pPr>
             <a:lvl3pPr>
+              <a:spcBef>
+                <a:spcPts val="400"/>
+              </a:spcBef>
+              <a:spcAft>
+                <a:spcPts val="600"/>
+              </a:spcAft>
               <a:defRPr sz="1400">
                 <a:solidFill>
                   <a:schemeClr val="bg1"/>
@@ -1571,6 +2227,12 @@
               </a:defRPr>
             </a:lvl3pPr>
             <a:lvl4pPr>
+              <a:spcBef>
+                <a:spcPts val="400"/>
+              </a:spcBef>
+              <a:spcAft>
+                <a:spcPts val="600"/>
+              </a:spcAft>
               <a:defRPr sz="1200">
                 <a:solidFill>
                   <a:schemeClr val="bg1"/>
@@ -1578,6 +2240,12 @@
               </a:defRPr>
             </a:lvl4pPr>
             <a:lvl5pPr>
+              <a:spcBef>
+                <a:spcPts val="400"/>
+              </a:spcBef>
+              <a:spcAft>
+                <a:spcPts val="600"/>
+              </a:spcAft>
               <a:defRPr sz="1200">
                 <a:solidFill>
                   <a:schemeClr val="bg1"/>
@@ -1859,6 +2527,12 @@
           <a:bodyPr/>
           <a:lstStyle>
             <a:lvl1pPr>
+              <a:spcBef>
+                <a:spcPts val="400"/>
+              </a:spcBef>
+              <a:spcAft>
+                <a:spcPts val="600"/>
+              </a:spcAft>
               <a:buClr>
                 <a:srgbClr val="FD6435"/>
               </a:buClr>
@@ -1869,6 +2543,12 @@
               </a:defRPr>
             </a:lvl1pPr>
             <a:lvl2pPr>
+              <a:spcBef>
+                <a:spcPts val="400"/>
+              </a:spcBef>
+              <a:spcAft>
+                <a:spcPts val="600"/>
+              </a:spcAft>
               <a:defRPr sz="1400">
                 <a:solidFill>
                   <a:schemeClr val="bg1"/>
@@ -1876,6 +2556,12 @@
               </a:defRPr>
             </a:lvl2pPr>
             <a:lvl3pPr>
+              <a:spcBef>
+                <a:spcPts val="400"/>
+              </a:spcBef>
+              <a:spcAft>
+                <a:spcPts val="600"/>
+              </a:spcAft>
               <a:defRPr sz="1200">
                 <a:solidFill>
                   <a:schemeClr val="bg1"/>
@@ -1883,6 +2569,12 @@
               </a:defRPr>
             </a:lvl3pPr>
             <a:lvl4pPr>
+              <a:spcBef>
+                <a:spcPts val="400"/>
+              </a:spcBef>
+              <a:spcAft>
+                <a:spcPts val="600"/>
+              </a:spcAft>
               <a:defRPr sz="1100">
                 <a:solidFill>
                   <a:schemeClr val="bg1"/>
@@ -1890,6 +2582,12 @@
               </a:defRPr>
             </a:lvl4pPr>
             <a:lvl5pPr>
+              <a:spcBef>
+                <a:spcPts val="400"/>
+              </a:spcBef>
+              <a:spcAft>
+                <a:spcPts val="600"/>
+              </a:spcAft>
               <a:defRPr sz="1100">
                 <a:solidFill>
                   <a:schemeClr val="bg1"/>
@@ -2037,6 +2735,12 @@
           </a:bodyPr>
           <a:lstStyle>
             <a:lvl1pPr>
+              <a:spcBef>
+                <a:spcPts val="400"/>
+              </a:spcBef>
+              <a:spcAft>
+                <a:spcPts val="600"/>
+              </a:spcAft>
               <a:defRPr sz="1600">
                 <a:solidFill>
                   <a:schemeClr val="bg1"/>
@@ -2044,6 +2748,12 @@
               </a:defRPr>
             </a:lvl1pPr>
             <a:lvl2pPr>
+              <a:spcBef>
+                <a:spcPts val="400"/>
+              </a:spcBef>
+              <a:spcAft>
+                <a:spcPts val="600"/>
+              </a:spcAft>
               <a:defRPr sz="1400">
                 <a:solidFill>
                   <a:schemeClr val="bg1"/>
@@ -2051,6 +2761,12 @@
               </a:defRPr>
             </a:lvl2pPr>
             <a:lvl3pPr>
+              <a:spcBef>
+                <a:spcPts val="400"/>
+              </a:spcBef>
+              <a:spcAft>
+                <a:spcPts val="600"/>
+              </a:spcAft>
               <a:defRPr sz="1200">
                 <a:solidFill>
                   <a:schemeClr val="bg1"/>
@@ -2058,6 +2774,12 @@
               </a:defRPr>
             </a:lvl3pPr>
             <a:lvl4pPr>
+              <a:spcBef>
+                <a:spcPts val="400"/>
+              </a:spcBef>
+              <a:spcAft>
+                <a:spcPts val="600"/>
+              </a:spcAft>
               <a:defRPr sz="1100">
                 <a:solidFill>
                   <a:schemeClr val="bg1"/>
@@ -2065,6 +2787,12 @@
               </a:defRPr>
             </a:lvl4pPr>
             <a:lvl5pPr>
+              <a:spcBef>
+                <a:spcPts val="400"/>
+              </a:spcBef>
+              <a:spcAft>
+                <a:spcPts val="600"/>
+              </a:spcAft>
               <a:defRPr sz="1100">
                 <a:solidFill>
                   <a:schemeClr val="bg1"/>
@@ -2559,35 +3287,65 @@
           <a:bodyPr/>
           <a:lstStyle>
             <a:lvl1pPr>
-              <a:defRPr sz="2400">
+              <a:spcBef>
+                <a:spcPts val="400"/>
+              </a:spcBef>
+              <a:spcAft>
+                <a:spcPts val="600"/>
+              </a:spcAft>
+              <a:defRPr sz="2000">
                 <a:solidFill>
                   <a:schemeClr val="bg1"/>
                 </a:solidFill>
               </a:defRPr>
             </a:lvl1pPr>
             <a:lvl2pPr>
-              <a:defRPr sz="2100">
+              <a:spcBef>
+                <a:spcPts val="400"/>
+              </a:spcBef>
+              <a:spcAft>
+                <a:spcPts val="600"/>
+              </a:spcAft>
+              <a:defRPr sz="2000">
                 <a:solidFill>
                   <a:schemeClr val="bg1"/>
                 </a:solidFill>
               </a:defRPr>
             </a:lvl2pPr>
             <a:lvl3pPr>
-              <a:defRPr sz="1800">
+              <a:spcBef>
+                <a:spcPts val="400"/>
+              </a:spcBef>
+              <a:spcAft>
+                <a:spcPts val="600"/>
+              </a:spcAft>
+              <a:defRPr sz="1600">
                 <a:solidFill>
                   <a:schemeClr val="bg1"/>
                 </a:solidFill>
               </a:defRPr>
             </a:lvl3pPr>
             <a:lvl4pPr>
-              <a:defRPr sz="1500">
+              <a:spcBef>
+                <a:spcPts val="400"/>
+              </a:spcBef>
+              <a:spcAft>
+                <a:spcPts val="600"/>
+              </a:spcAft>
+              <a:defRPr sz="1400">
                 <a:solidFill>
                   <a:schemeClr val="bg1"/>
                 </a:solidFill>
               </a:defRPr>
             </a:lvl4pPr>
             <a:lvl5pPr>
-              <a:defRPr sz="1500">
+              <a:spcBef>
+                <a:spcPts val="400"/>
+              </a:spcBef>
+              <a:spcAft>
+                <a:spcPts val="600"/>
+              </a:spcAft>
+              <a:defRPr sz="1400">
                 <a:solidFill>
                   <a:schemeClr val="bg1"/>
                 </a:solidFill>
@@ -2786,143 +3544,65 @@
             <a:spLocks noGrp="1"/>
           </p:cNvSpPr>
           <p:nvPr>
-            <p:ph type="body" idx="10"/>
-          </p:nvPr>
-        </p:nvSpPr>
-        <p:spPr>
-          <a:xfrm>
-            <a:off x="457200" y="1151335"/>
-            <a:ext cx="4040188" cy="479822"/>
-          </a:xfrm>
-        </p:spPr>
-        <p:txBody>
-          <a:bodyPr anchor="b"/>
-          <a:lstStyle>
-            <a:lvl1pPr marL="0" indent="0">
-              <a:buNone/>
-              <a:defRPr sz="1800" b="1" baseline="0">
-                <a:solidFill>
-                  <a:srgbClr val="FD6435"/>
-                </a:solidFill>
-                <a:latin typeface="+Заголовок 2"/>
-              </a:defRPr>
-            </a:lvl1pPr>
-            <a:lvl2pPr marL="342900" indent="0">
-              <a:buNone/>
-              <a:defRPr sz="1500" b="1"/>
-            </a:lvl2pPr>
-            <a:lvl3pPr marL="685800" indent="0">
-              <a:buNone/>
-              <a:defRPr sz="1350" b="1"/>
-            </a:lvl3pPr>
-            <a:lvl4pPr marL="1028700" indent="0">
-              <a:buNone/>
-              <a:defRPr sz="1200" b="1"/>
-            </a:lvl4pPr>
-            <a:lvl5pPr marL="1371600" indent="0">
-              <a:buNone/>
-              <a:defRPr sz="1200" b="1"/>
-            </a:lvl5pPr>
-            <a:lvl6pPr marL="1714500" indent="0">
-              <a:buNone/>
-              <a:defRPr sz="1200" b="1"/>
-            </a:lvl6pPr>
-            <a:lvl7pPr marL="2057400" indent="0">
-              <a:buNone/>
-              <a:defRPr sz="1200" b="1"/>
-            </a:lvl7pPr>
-            <a:lvl8pPr marL="2400300" indent="0">
-              <a:buNone/>
-              <a:defRPr sz="1200" b="1"/>
-            </a:lvl8pPr>
-            <a:lvl9pPr marL="2743200" indent="0">
-              <a:buNone/>
-              <a:defRPr sz="1200" b="1"/>
-            </a:lvl9pPr>
-          </a:lstStyle>
-          <a:p>
-            <a:pPr lvl="0"/>
-            <a:r>
-              <a:rPr lang="en-US" dirty="0"/>
-              <a:t>Click to edit Master text styles</a:t>
-            </a:r>
-          </a:p>
-        </p:txBody>
-      </p:sp>
-      <p:sp>
-        <p:nvSpPr>
-          <p:cNvPr id="7" name="Content Placeholder 3">
-            <a:extLst>
-              <a:ext uri="{FF2B5EF4-FFF2-40B4-BE49-F238E27FC236}">
-                <a16:creationId xmlns:a16="http://schemas.microsoft.com/office/drawing/2014/main" id="{95CFA527-AF59-94AE-9BAC-8EE3F5FB1FDC}"/>
-              </a:ext>
-            </a:extLst>
-          </p:cNvPr>
-          <p:cNvSpPr>
-            <a:spLocks noGrp="1"/>
-          </p:cNvSpPr>
-          <p:nvPr>
-            <p:ph sz="half" idx="2"/>
+            <p:ph type="body" idx="10" hasCustomPrompt="1"/>
           </p:nvPr>
         </p:nvSpPr>
         <p:spPr>
           <a:xfrm>
             <a:off x="457200" y="1631156"/>
-            <a:ext cx="4040188" cy="2963466"/>
+            <a:ext cx="4040188" cy="2963467"/>
           </a:xfrm>
         </p:spPr>
         <p:txBody>
-          <a:bodyPr/>
+          <a:bodyPr anchor="t"/>
           <a:lstStyle>
-            <a:lvl1pPr>
-              <a:buClr>
-                <a:srgbClr val="FD6435"/>
-              </a:buClr>
-              <a:defRPr sz="1800">
+            <a:lvl1pPr marL="285750" indent="-285750">
+              <a:spcBef>
+                <a:spcPts val="400"/>
+              </a:spcBef>
+              <a:spcAft>
+                <a:spcPts val="600"/>
+              </a:spcAft>
+              <a:buFont typeface="Arial" panose="020B0604020202020204" pitchFamily="34" charset="0"/>
+              <a:buChar char="•"/>
+              <a:defRPr sz="1800" b="0" baseline="0">
                 <a:solidFill>
                   <a:schemeClr val="bg1"/>
                 </a:solidFill>
+                <a:latin typeface="+mn-lt"/>
               </a:defRPr>
             </a:lvl1pPr>
-            <a:lvl2pPr>
-              <a:defRPr sz="1500">
-                <a:solidFill>
-                  <a:schemeClr val="bg1"/>
-                </a:solidFill>
-              </a:defRPr>
+            <a:lvl2pPr marL="342900" indent="0">
+              <a:buNone/>
+              <a:defRPr sz="1500" b="1"/>
             </a:lvl2pPr>
-            <a:lvl3pPr>
-              <a:defRPr sz="1350">
-                <a:solidFill>
-                  <a:schemeClr val="bg1"/>
-                </a:solidFill>
-              </a:defRPr>
+            <a:lvl3pPr marL="685800" indent="0">
+              <a:buNone/>
+              <a:defRPr sz="1350" b="1"/>
             </a:lvl3pPr>
-            <a:lvl4pPr>
-              <a:defRPr sz="1200">
-                <a:solidFill>
-                  <a:schemeClr val="bg1"/>
-                </a:solidFill>
-              </a:defRPr>
+            <a:lvl4pPr marL="1028700" indent="0">
+              <a:buNone/>
+              <a:defRPr sz="1200" b="1"/>
             </a:lvl4pPr>
-            <a:lvl5pPr>
-              <a:defRPr sz="1200">
-                <a:solidFill>
-                  <a:schemeClr val="bg1"/>
-                </a:solidFill>
-              </a:defRPr>
+            <a:lvl5pPr marL="1371600" indent="0">
+              <a:buNone/>
+              <a:defRPr sz="1200" b="1"/>
             </a:lvl5pPr>
-            <a:lvl6pPr>
-              <a:defRPr sz="1200"/>
+            <a:lvl6pPr marL="1714500" indent="0">
+              <a:buNone/>
+              <a:defRPr sz="1200" b="1"/>
             </a:lvl6pPr>
-            <a:lvl7pPr>
-              <a:defRPr sz="1200"/>
+            <a:lvl7pPr marL="2057400" indent="0">
+              <a:buNone/>
+              <a:defRPr sz="1200" b="1"/>
             </a:lvl7pPr>
-            <a:lvl8pPr>
-              <a:defRPr sz="1200"/>
+            <a:lvl8pPr marL="2400300" indent="0">
+              <a:buNone/>
+              <a:defRPr sz="1200" b="1"/>
             </a:lvl8pPr>
-            <a:lvl9pPr>
-              <a:defRPr sz="1200"/>
+            <a:lvl9pPr marL="2743200" indent="0">
+              <a:buNone/>
+              <a:defRPr sz="1200" b="1"/>
             </a:lvl9pPr>
           </a:lstStyle>
           <a:p>
@@ -3136,6 +3816,12 @@
           <a:bodyPr/>
           <a:lstStyle>
             <a:lvl1pPr marL="0" indent="0">
+              <a:spcBef>
+                <a:spcPts val="200"/>
+              </a:spcBef>
+              <a:spcAft>
+                <a:spcPts val="300"/>
+              </a:spcAft>
               <a:buNone/>
               <a:defRPr sz="1050">
                 <a:solidFill>
@@ -3549,8 +4235,12 @@
           <a:p>
             <a:pPr lvl="1"/>
             <a:r>
+              <a:rPr lang="en-US"/>
+              <a:t>Second </a:t>
+            </a:r>
+            <a:r>
               <a:rPr dirty="0" lang="en-US"/>
-              <a:t>Second level</a:t>
+              <a:t>level</a:t>
             </a:r>
           </a:p>
           <a:p>
@@ -3663,14 +4353,17 @@
     <p:bodyStyle>
       <a:lvl1pPr algn="l" defTabSz="342900" eaLnBrk="1" hangingPunct="1" indent="-342900" latinLnBrk="0" marL="342900" rtl="0">
         <a:spcBef>
-          <a:spcPct val="20000"/>
+          <a:spcPts val="400"/>
         </a:spcBef>
+        <a:spcAft>
+          <a:spcPts val="600"/>
+        </a:spcAft>
         <a:buClr>
           <a:srgbClr val="FD6435"/>
         </a:buClr>
         <a:buFont typeface="Arial"/>
         <a:buChar char="•"/>
-        <a:defRPr kern="1200" sz="2400">
+        <a:defRPr kern="1200" sz="2000">
           <a:solidFill>
             <a:schemeClr val="bg1"/>
           </a:solidFill>
@@ -3681,14 +4374,17 @@
       </a:lvl1pPr>
       <a:lvl2pPr algn="l" defTabSz="342900" eaLnBrk="1" hangingPunct="1" indent="-342900" latinLnBrk="0" marL="685800" rtl="0">
         <a:spcBef>
-          <a:spcPct val="20000"/>
+          <a:spcPts val="400"/>
         </a:spcBef>
+        <a:spcAft>
+          <a:spcPts val="600"/>
+        </a:spcAft>
         <a:buClr>
           <a:srgbClr val="FD6435"/>
         </a:buClr>
         <a:buFont typeface="Arial"/>
         <a:buChar char="–"/>
-        <a:defRPr kern="1200" sz="2100">
+        <a:defRPr kern="1200" sz="2000">
           <a:solidFill>
             <a:schemeClr val="bg1"/>
           </a:solidFill>
@@ -3699,11 +4395,14 @@
       </a:lvl2pPr>
       <a:lvl3pPr algn="l" defTabSz="342900" eaLnBrk="1" hangingPunct="1" indent="-342900" latinLnBrk="0" marL="1028700" rtl="0">
         <a:spcBef>
-          <a:spcPct val="20000"/>
+          <a:spcPts val="400"/>
         </a:spcBef>
+        <a:spcAft>
+          <a:spcPts val="600"/>
+        </a:spcAft>
         <a:buFont typeface="Arial"/>
         <a:buChar char="•"/>
-        <a:defRPr kern="1200" sz="1800">
+        <a:defRPr kern="1200" sz="1600">
           <a:solidFill>
             <a:schemeClr val="bg1"/>
           </a:solidFill>
@@ -3714,11 +4413,14 @@
       </a:lvl3pPr>
       <a:lvl4pPr algn="l" defTabSz="342900" eaLnBrk="1" hangingPunct="1" indent="-342900" latinLnBrk="0" marL="1371600" rtl="0">
         <a:spcBef>
-          <a:spcPct val="20000"/>
+          <a:spcPts val="400"/>
         </a:spcBef>
+        <a:spcAft>
+          <a:spcPts val="600"/>
+        </a:spcAft>
         <a:buFont typeface="Arial"/>
         <a:buChar char="–"/>
-        <a:defRPr kern="1200" sz="1500">
+        <a:defRPr kern="1200" sz="1400">
           <a:solidFill>
             <a:schemeClr val="bg1"/>
           </a:solidFill>
@@ -3729,11 +4431,14 @@
       </a:lvl4pPr>
       <a:lvl5pPr algn="l" defTabSz="342900" eaLnBrk="1" hangingPunct="1" indent="-342900" latinLnBrk="0" marL="1714500" rtl="0">
         <a:spcBef>
-          <a:spcPct val="20000"/>
+          <a:spcPts val="400"/>
         </a:spcBef>
+        <a:spcAft>
+          <a:spcPts val="600"/>
+        </a:spcAft>
         <a:buFont typeface="Arial"/>
         <a:buChar char="»"/>
-        <a:defRPr kern="1200" sz="1500">
+        <a:defRPr kern="1200" sz="1400">
           <a:solidFill>
             <a:schemeClr val="bg1"/>
           </a:solidFill>
@@ -4046,7 +4751,7 @@
             </a:pPr>
             <a:r>
               <a:rPr/>
-              <a:t>Что нового: все в одном</a:t>
+              <a:t>Что нового: множество форматов вывода «из коробки»</a:t>
             </a:r>
           </a:p>
         </p:txBody>
@@ -4064,7 +4769,7 @@
             <a:spLocks noGrp="1"/>
           </p:cNvSpPr>
           <p:nvPr>
-            <p:ph idx="10" type="body"/>
+            <p:ph hasCustomPrompt="1" idx="10" type="body"/>
           </p:nvPr>
         </p:nvSpPr>
         <p:spPr/>
@@ -4591,9 +5296,6 @@
             </a:pPr>
             <a:r>
               <a:rPr>
-                <a:solidFill>
-                  <a:srgbClr val="003B4F"/>
-                </a:solidFill>
                 <a:latin typeface="Courier"/>
               </a:rPr>
               <a:t>{{&lt; include _data.qmd &gt;}}</a:t>
@@ -4648,15 +5350,6 @@
             <a:r>
               <a:rPr/>
               <a:t>Библиографическая информация</a:t>
-            </a:r>
-          </a:p>
-          <a:p>
-            <a:pPr lvl="0" indent="0" marL="0">
-              <a:buNone/>
-            </a:pPr>
-            <a:r>
-              <a:rPr/>
-              <a:t>https://quarto.org/docs/authoring/includes.html</a:t>
             </a:r>
           </a:p>
         </p:txBody>
@@ -5055,555 +5748,43 @@
             </a:pPr>
             <a:r>
               <a:rPr/>
-              <a:t>Пример </a:t>
-            </a:r>
-            <a:r>
-              <a:rPr>
-                <a:latin typeface="Courier"/>
-              </a:rPr>
-              <a:t>includes</a:t>
-            </a:r>
+              <a:t>Некоторые преимущества модульных документов включают:</a:t>
+            </a:r>
+          </a:p>
+          <a:p>
+            <a:pPr lvl="0" indent="-342900" marL="342900">
+              <a:buAutoNum type="arabicPeriod"/>
+            </a:pPr>
             <a:r>
               <a:rPr/>
-              <a:t>:</a:t>
-            </a:r>
-          </a:p>
-        </p:txBody>
-      </p:sp>
-    </p:spTree>
-  </p:cSld>
-</p:sld>
-</file>
-
-<file path=ppt/slides/slide14.xml><?xml version="1.0" encoding="utf-8"?>
-<p:sld xmlns:a="http://schemas.openxmlformats.org/drawingml/2006/main" xmlns:r="http://schemas.openxmlformats.org/officeDocument/2006/relationships" xmlns:p="http://schemas.openxmlformats.org/presentationml/2006/main">
-  <p:cSld>
-    <p:spTree>
-      <p:nvGrpSpPr>
-        <p:cNvPr id="1" name=""/>
-        <p:cNvGrpSpPr/>
-        <p:nvPr/>
-      </p:nvGrpSpPr>
-      <p:grpSpPr>
-        <a:xfrm>
-          <a:off x="0" y="0"/>
-          <a:ext cx="0" cy="0"/>
-          <a:chOff x="0" y="0"/>
-          <a:chExt cx="0" cy="0"/>
-        </a:xfrm>
-      </p:grpSpPr>
-      <p:sp>
-        <p:nvSpPr>
-          <p:cNvPr id="2" name="Title 1"/>
-          <p:cNvSpPr>
-            <a:spLocks noGrp="1"/>
-          </p:cNvSpPr>
-          <p:nvPr>
-            <p:ph type="title"/>
-          </p:nvPr>
-        </p:nvSpPr>
-        <p:spPr/>
-        <p:txBody>
-          <a:bodyPr/>
-          <a:lstStyle/>
-          <a:p>
-            <a:pPr lvl="0" indent="0" marL="0">
-              <a:buNone/>
+              <a:t>Повторное использование: можно повторно использовать те же ячейки в нескольких документах</a:t>
+            </a:r>
+          </a:p>
+          <a:p>
+            <a:pPr lvl="0" indent="-342900" marL="342900">
+              <a:buAutoNum type="arabicPeriod"/>
             </a:pPr>
             <a:r>
               <a:rPr/>
-              <a:t>About</a:t>
-            </a:r>
-          </a:p>
-        </p:txBody>
-      </p:sp>
-      <p:sp>
-        <p:nvSpPr>
-          <p:cNvPr id="3" name="Content Placeholder 2"/>
-          <p:cNvSpPr>
-            <a:spLocks noGrp="1"/>
-          </p:cNvSpPr>
-          <p:nvPr>
-            <p:ph idx="1"/>
-          </p:nvPr>
-        </p:nvSpPr>
-        <p:spPr/>
-        <p:txBody>
-          <a:bodyPr/>
-          <a:lstStyle/>
-          <a:p>
-            <a:pPr lvl="0" indent="0">
-              <a:buNone/>
+              <a:t>Гибкость: можно повторно комбинировать ячейки разными способами для разных выводов или целей</a:t>
+            </a:r>
+          </a:p>
+          <a:p>
+            <a:pPr lvl="0" indent="-342900" marL="342900">
+              <a:buAutoNum type="arabicPeriod"/>
             </a:pPr>
             <a:r>
-              <a:rPr>
-                <a:solidFill>
-                  <a:srgbClr val="4758AB"/>
-                </a:solidFill>
-                <a:latin typeface="Courier"/>
-              </a:rPr>
-              <a:t>library</a:t>
-            </a:r>
-            <a:r>
-              <a:rPr>
-                <a:solidFill>
-                  <a:srgbClr val="003B4F"/>
-                </a:solidFill>
-                <a:latin typeface="Courier"/>
-              </a:rPr>
-              <a:t>(likert)</a:t>
-            </a:r>
-            <a:br/>
-            <a:r>
-              <a:rPr>
-                <a:solidFill>
-                  <a:srgbClr val="003B4F"/>
-                </a:solidFill>
-                <a:latin typeface="Courier"/>
-              </a:rPr>
-              <a:t>here</a:t>
-            </a:r>
-            <a:r>
-              <a:rPr>
-                <a:solidFill>
-                  <a:srgbClr val="5E5E5E"/>
-                </a:solidFill>
-                <a:latin typeface="Courier"/>
-              </a:rPr>
-              <a:t>::</a:t>
-            </a:r>
-            <a:r>
-              <a:rPr>
-                <a:solidFill>
-                  <a:srgbClr val="4758AB"/>
-                </a:solidFill>
-                <a:latin typeface="Courier"/>
-              </a:rPr>
-              <a:t>i_am</a:t>
-            </a:r>
-            <a:r>
-              <a:rPr>
-                <a:solidFill>
-                  <a:srgbClr val="003B4F"/>
-                </a:solidFill>
-                <a:latin typeface="Courier"/>
-              </a:rPr>
-              <a:t>(</a:t>
-            </a:r>
-            <a:r>
-              <a:rPr>
-                <a:solidFill>
-                  <a:srgbClr val="20794D"/>
-                </a:solidFill>
-                <a:latin typeface="Courier"/>
-              </a:rPr>
-              <a:t>'99-GSS/gss.qmd'</a:t>
-            </a:r>
-            <a:r>
-              <a:rPr>
-                <a:solidFill>
-                  <a:srgbClr val="003B4F"/>
-                </a:solidFill>
-                <a:latin typeface="Courier"/>
-              </a:rPr>
-              <a:t>)</a:t>
-            </a:r>
-          </a:p>
-          <a:p>
-            <a:pPr lvl="0" indent="0" marL="0">
-              <a:buNone/>
+              <a:rPr/>
+              <a:t>Абстракция: скрывать детали реализации от читателей документа</a:t>
+            </a:r>
+          </a:p>
+          <a:p>
+            <a:pPr lvl="0" indent="-342900" marL="342900">
+              <a:buAutoNum type="arabicPeriod"/>
             </a:pPr>
             <a:r>
               <a:rPr/>
-              <a:t>The General Social Survey (GSS) collects information from the general public on a wide variety of subjects, including attitudes toward social issues, religion, education, jobs and the economy, government and other institutions, politics, and policy issues. The Schwartz Values module is a part of GSS 2012 questionnaire. This module is a good example of ordinal data, particularly Likert items.</a:t>
-            </a:r>
-          </a:p>
-        </p:txBody>
-      </p:sp>
-    </p:spTree>
-  </p:cSld>
-</p:sld>
-</file>
-
-<file path=ppt/slides/slide15.xml><?xml version="1.0" encoding="utf-8"?>
-<p:sld xmlns:a="http://schemas.openxmlformats.org/drawingml/2006/main" xmlns:r="http://schemas.openxmlformats.org/officeDocument/2006/relationships" xmlns:p="http://schemas.openxmlformats.org/presentationml/2006/main">
-  <p:cSld>
-    <p:spTree>
-      <p:nvGrpSpPr>
-        <p:cNvPr id="1" name=""/>
-        <p:cNvGrpSpPr/>
-        <p:nvPr/>
-      </p:nvGrpSpPr>
-      <p:grpSpPr>
-        <a:xfrm>
-          <a:off x="0" y="0"/>
-          <a:ext cx="0" cy="0"/>
-          <a:chOff x="0" y="0"/>
-          <a:chExt cx="0" cy="0"/>
-        </a:xfrm>
-      </p:grpSpPr>
-      <p:sp>
-        <p:nvSpPr>
-          <p:cNvPr id="2" name="Title 1"/>
-          <p:cNvSpPr>
-            <a:spLocks noGrp="1"/>
-          </p:cNvSpPr>
-          <p:nvPr>
-            <p:ph type="title"/>
-          </p:nvPr>
-        </p:nvSpPr>
-        <p:spPr/>
-        <p:txBody>
-          <a:bodyPr/>
-          <a:lstStyle/>
-          <a:p>
-            <a:pPr lvl="0" indent="0" marL="0">
-              <a:buNone/>
-            </a:pPr>
-            <a:r>
-              <a:rPr/>
-              <a:t>Load Data</a:t>
-            </a:r>
-          </a:p>
-        </p:txBody>
-      </p:sp>
-      <p:sp>
-        <p:nvSpPr>
-          <p:cNvPr id="3" name="Content Placeholder 2"/>
-          <p:cNvSpPr>
-            <a:spLocks noGrp="1"/>
-          </p:cNvSpPr>
-          <p:nvPr>
-            <p:ph idx="1"/>
-          </p:nvPr>
-        </p:nvSpPr>
-        <p:spPr/>
-        <p:txBody>
-          <a:bodyPr/>
-          <a:lstStyle/>
-          <a:p>
-            <a:pPr lvl="0" indent="0">
-              <a:buNone/>
-            </a:pPr>
-            <a:r>
-              <a:rPr>
-                <a:solidFill>
-                  <a:srgbClr val="4758AB"/>
-                </a:solidFill>
-                <a:latin typeface="Courier"/>
-              </a:rPr>
-              <a:t>load</a:t>
-            </a:r>
-            <a:r>
-              <a:rPr>
-                <a:solidFill>
-                  <a:srgbClr val="003B4F"/>
-                </a:solidFill>
-                <a:latin typeface="Courier"/>
-              </a:rPr>
-              <a:t>(here</a:t>
-            </a:r>
-            <a:r>
-              <a:rPr>
-                <a:solidFill>
-                  <a:srgbClr val="5E5E5E"/>
-                </a:solidFill>
-                <a:latin typeface="Courier"/>
-              </a:rPr>
-              <a:t>::</a:t>
-            </a:r>
-            <a:r>
-              <a:rPr>
-                <a:solidFill>
-                  <a:srgbClr val="4758AB"/>
-                </a:solidFill>
-                <a:latin typeface="Courier"/>
-              </a:rPr>
-              <a:t>here</a:t>
-            </a:r>
-            <a:r>
-              <a:rPr>
-                <a:solidFill>
-                  <a:srgbClr val="003B4F"/>
-                </a:solidFill>
-                <a:latin typeface="Courier"/>
-              </a:rPr>
-              <a:t>(</a:t>
-            </a:r>
-            <a:r>
-              <a:rPr>
-                <a:solidFill>
-                  <a:srgbClr val="20794D"/>
-                </a:solidFill>
-                <a:latin typeface="Courier"/>
-              </a:rPr>
-              <a:t>'data'</a:t>
-            </a:r>
-            <a:r>
-              <a:rPr>
-                <a:solidFill>
-                  <a:srgbClr val="003B4F"/>
-                </a:solidFill>
-                <a:latin typeface="Courier"/>
-              </a:rPr>
-              <a:t>, </a:t>
-            </a:r>
-            <a:r>
-              <a:rPr>
-                <a:solidFill>
-                  <a:srgbClr val="20794D"/>
-                </a:solidFill>
-                <a:latin typeface="Courier"/>
-              </a:rPr>
-              <a:t>'gss12_values.RData'</a:t>
-            </a:r>
-            <a:r>
-              <a:rPr>
-                <a:solidFill>
-                  <a:srgbClr val="003B4F"/>
-                </a:solidFill>
-                <a:latin typeface="Courier"/>
-              </a:rPr>
-              <a:t>))</a:t>
-            </a:r>
-          </a:p>
-        </p:txBody>
-      </p:sp>
-    </p:spTree>
-  </p:cSld>
-</p:sld>
-</file>
-
-<file path=ppt/slides/slide16.xml><?xml version="1.0" encoding="utf-8"?>
-<p:sld xmlns:a="http://schemas.openxmlformats.org/drawingml/2006/main" xmlns:r="http://schemas.openxmlformats.org/officeDocument/2006/relationships" xmlns:p="http://schemas.openxmlformats.org/presentationml/2006/main">
-  <p:cSld>
-    <p:spTree>
-      <p:nvGrpSpPr>
-        <p:cNvPr id="1" name=""/>
-        <p:cNvGrpSpPr/>
-        <p:nvPr/>
-      </p:nvGrpSpPr>
-      <p:grpSpPr>
-        <a:xfrm>
-          <a:off x="0" y="0"/>
-          <a:ext cx="0" cy="0"/>
-          <a:chOff x="0" y="0"/>
-          <a:chExt cx="0" cy="0"/>
-        </a:xfrm>
-      </p:grpSpPr>
-      <p:sp>
-        <p:nvSpPr>
-          <p:cNvPr id="2" name="Title 1"/>
-          <p:cNvSpPr>
-            <a:spLocks noGrp="1"/>
-          </p:cNvSpPr>
-          <p:nvPr>
-            <p:ph type="title"/>
-          </p:nvPr>
-        </p:nvSpPr>
-        <p:spPr/>
-        <p:txBody>
-          <a:bodyPr/>
-          <a:lstStyle/>
-          <a:p>
-            <a:pPr lvl="0" indent="0" marL="0">
-              <a:buNone/>
-            </a:pPr>
-            <a:r>
-              <a:rPr/>
-              <a:t>Draw Diagram</a:t>
-            </a:r>
-          </a:p>
-        </p:txBody>
-      </p:sp>
-      <p:sp>
-        <p:nvSpPr>
-          <p:cNvPr id="3" name="Content Placeholder 2"/>
-          <p:cNvSpPr>
-            <a:spLocks noGrp="1"/>
-          </p:cNvSpPr>
-          <p:nvPr>
-            <p:ph idx="1"/>
-          </p:nvPr>
-        </p:nvSpPr>
-        <p:spPr/>
-        <p:txBody>
-          <a:bodyPr/>
-          <a:lstStyle/>
-          <a:p>
-            <a:pPr lvl="0" indent="0">
-              <a:buNone/>
-            </a:pPr>
-            <a:r>
-              <a:rPr>
-                <a:solidFill>
-                  <a:srgbClr val="003B4F"/>
-                </a:solidFill>
-                <a:latin typeface="Courier"/>
-              </a:rPr>
-              <a:t>gss_likert &lt;- gss12_values </a:t>
-            </a:r>
-            <a:r>
-              <a:rPr>
-                <a:solidFill>
-                  <a:srgbClr val="5E5E5E"/>
-                </a:solidFill>
-                <a:latin typeface="Courier"/>
-              </a:rPr>
-              <a:t>|&gt;</a:t>
-            </a:r>
-            <a:r>
-              <a:rPr>
-                <a:solidFill>
-                  <a:srgbClr val="003B4F"/>
-                </a:solidFill>
-                <a:latin typeface="Courier"/>
-              </a:rPr>
-              <a:t> </a:t>
-            </a:r>
-            <a:r>
-              <a:rPr>
-                <a:solidFill>
-                  <a:srgbClr val="4758AB"/>
-                </a:solidFill>
-                <a:latin typeface="Courier"/>
-              </a:rPr>
-              <a:t>as.data.frame</a:t>
-            </a:r>
-            <a:r>
-              <a:rPr>
-                <a:solidFill>
-                  <a:srgbClr val="003B4F"/>
-                </a:solidFill>
-                <a:latin typeface="Courier"/>
-              </a:rPr>
-              <a:t>() </a:t>
-            </a:r>
-            <a:r>
-              <a:rPr>
-                <a:solidFill>
-                  <a:srgbClr val="5E5E5E"/>
-                </a:solidFill>
-                <a:latin typeface="Courier"/>
-              </a:rPr>
-              <a:t>|&gt;</a:t>
-            </a:r>
-            <a:r>
-              <a:rPr>
-                <a:solidFill>
-                  <a:srgbClr val="003B4F"/>
-                </a:solidFill>
-                <a:latin typeface="Courier"/>
-              </a:rPr>
-              <a:t> </a:t>
-            </a:r>
-            <a:r>
-              <a:rPr>
-                <a:solidFill>
-                  <a:srgbClr val="4758AB"/>
-                </a:solidFill>
-                <a:latin typeface="Courier"/>
-              </a:rPr>
-              <a:t>likert</a:t>
-            </a:r>
-            <a:r>
-              <a:rPr>
-                <a:solidFill>
-                  <a:srgbClr val="003B4F"/>
-                </a:solidFill>
-                <a:latin typeface="Courier"/>
-              </a:rPr>
-              <a:t>()</a:t>
-            </a:r>
-          </a:p>
-        </p:txBody>
-      </p:sp>
-    </p:spTree>
-  </p:cSld>
-</p:sld>
-</file>
-
-<file path=ppt/slides/slide17.xml><?xml version="1.0" encoding="utf-8"?>
-<p:sld xmlns:a="http://schemas.openxmlformats.org/drawingml/2006/main" xmlns:r="http://schemas.openxmlformats.org/officeDocument/2006/relationships" xmlns:p="http://schemas.openxmlformats.org/presentationml/2006/main">
-  <p:cSld>
-    <p:spTree>
-      <p:nvGrpSpPr>
-        <p:cNvPr id="1" name=""/>
-        <p:cNvGrpSpPr/>
-        <p:nvPr/>
-      </p:nvGrpSpPr>
-      <p:grpSpPr>
-        <a:xfrm>
-          <a:off x="0" y="0"/>
-          <a:ext cx="0" cy="0"/>
-          <a:chOff x="0" y="0"/>
-          <a:chExt cx="0" cy="0"/>
-        </a:xfrm>
-      </p:grpSpPr>
-      <p:sp>
-        <p:nvSpPr>
-          <p:cNvPr id="2" name="Title 1"/>
-          <p:cNvSpPr>
-            <a:spLocks noGrp="1"/>
-          </p:cNvSpPr>
-          <p:nvPr>
-            <p:ph type="title"/>
-          </p:nvPr>
-        </p:nvSpPr>
-        <p:spPr/>
-        <p:txBody>
-          <a:bodyPr/>
-          <a:lstStyle/>
-          <a:p>
-            <a:pPr lvl="0" indent="0" marL="0">
-              <a:buNone/>
-            </a:pPr>
-            <a:r>
-              <a:rPr/>
-              <a:t>Что нового: множество форматов вывода</a:t>
-            </a:r>
-          </a:p>
-        </p:txBody>
-      </p:sp>
-      <p:sp>
-        <p:nvSpPr>
-          <p:cNvPr id="3" name="Content Placeholder 2"/>
-          <p:cNvSpPr>
-            <a:spLocks noGrp="1"/>
-          </p:cNvSpPr>
-          <p:nvPr>
-            <p:ph idx="1"/>
-          </p:nvPr>
-        </p:nvSpPr>
-        <p:spPr/>
-        <p:txBody>
-          <a:bodyPr/>
-          <a:lstStyle/>
-          <a:p>
-            <a:pPr lvl="0" indent="-342900" marL="342900">
-              <a:buAutoNum startAt="3" type="arabicPeriod"/>
-            </a:pPr>
-            <a:r>
-              <a:rPr/>
-              <a:t>Настраиваемые шаблоны: Quarto позволяет настраивать шаблоны и темы, которые можно использовать для управления внешним видом ваших документов. Это облегчает создание профессиональных документов с единым визуальным стилем.</a:t>
-            </a:r>
-          </a:p>
-          <a:p>
-            <a:pPr lvl="0" indent="-342900" marL="342900">
-              <a:buAutoNum startAt="3" type="arabicPeriod"/>
-            </a:pPr>
-            <a:r>
-              <a:rPr/>
-              <a:t>Расширенные функции форматирования: Quarto поддерживает расширенные функции форматирования, такие как LaTeX-формулы, библиографии и сноски. Это облегчает создание сложных научных и технических документов.</a:t>
-            </a:r>
-          </a:p>
-          <a:p>
-            <a:pPr lvl="0" indent="-342900" marL="342900">
-              <a:buAutoNum startAt="3" type="arabicPeriod"/>
-            </a:pPr>
-            <a:r>
-              <a:rPr/>
-              <a:t>Интерактивное и динамическое содержимое: Quarto поддерживает интерактивное и динамическое содержимое с использованием JavaScript и других веб-технологий. Это позволяет создавать документы с интерактивными графиками, анимацией и другими динамическими функциями.</a:t>
+              <a:t>Удобство поддержки: нужно вносить изменения только в одном месте</a:t>
             </a:r>
           </a:p>
         </p:txBody>
@@ -5646,7 +5827,7 @@
                                         <p:tgtEl>
                                           <p:spTgt spid="3">
                                             <p:txEl>
-                                              <p:pRg st="0" end="0"/>
+                                              <p:pRg st="1" end="1"/>
                                             </p:txEl>
                                           </p:spTgt>
                                         </p:tgtEl>
@@ -5695,7 +5876,7 @@
                                         <p:tgtEl>
                                           <p:spTgt spid="3">
                                             <p:txEl>
-                                              <p:pRg st="1" end="1"/>
+                                              <p:pRg st="2" end="2"/>
                                             </p:txEl>
                                           </p:spTgt>
                                         </p:tgtEl>
@@ -5737,6 +5918,828 @@
                                     <p:set>
                                       <p:cBhvr>
                                         <p:cTn id="14" dur="1" fill="hold">
+                                          <p:stCondLst>
+                                            <p:cond delay="0"/>
+                                          </p:stCondLst>
+                                        </p:cTn>
+                                        <p:tgtEl>
+                                          <p:spTgt spid="3">
+                                            <p:txEl>
+                                              <p:pRg st="3" end="3"/>
+                                            </p:txEl>
+                                          </p:spTgt>
+                                        </p:tgtEl>
+                                        <p:attrNameLst>
+                                          <p:attrName>style.visibility</p:attrName>
+                                        </p:attrNameLst>
+                                      </p:cBhvr>
+                                      <p:to>
+                                        <p:strVal val="visible"/>
+                                      </p:to>
+                                    </p:set>
+                                  </p:childTnLst>
+                                </p:cTn>
+                              </p:par>
+                            </p:childTnLst>
+                          </p:cTn>
+                        </p:par>
+                      </p:childTnLst>
+                    </p:cTn>
+                  </p:par>
+                  <p:par>
+                    <p:cTn id="15" fill="hold">
+                      <p:stCondLst>
+                        <p:cond delay="indefinite"/>
+                      </p:stCondLst>
+                      <p:childTnLst>
+                        <p:par>
+                          <p:cTn id="16" fill="hold">
+                            <p:stCondLst>
+                              <p:cond delay="0"/>
+                            </p:stCondLst>
+                            <p:childTnLst>
+                              <p:par>
+                                <p:cTn id="17" presetID="1" presetClass="entr" presetSubtype="0" fill="hold" grpId="0" nodeType="clickEffect">
+                                  <p:stCondLst>
+                                    <p:cond delay="0"/>
+                                  </p:stCondLst>
+                                  <p:childTnLst>
+                                    <p:set>
+                                      <p:cBhvr>
+                                        <p:cTn id="18" dur="1" fill="hold">
+                                          <p:stCondLst>
+                                            <p:cond delay="0"/>
+                                          </p:stCondLst>
+                                        </p:cTn>
+                                        <p:tgtEl>
+                                          <p:spTgt spid="3">
+                                            <p:txEl>
+                                              <p:pRg st="4" end="4"/>
+                                            </p:txEl>
+                                          </p:spTgt>
+                                        </p:tgtEl>
+                                        <p:attrNameLst>
+                                          <p:attrName>style.visibility</p:attrName>
+                                        </p:attrNameLst>
+                                      </p:cBhvr>
+                                      <p:to>
+                                        <p:strVal val="visible"/>
+                                      </p:to>
+                                    </p:set>
+                                  </p:childTnLst>
+                                </p:cTn>
+                              </p:par>
+                            </p:childTnLst>
+                          </p:cTn>
+                        </p:par>
+                      </p:childTnLst>
+                    </p:cTn>
+                  </p:par>
+                </p:childTnLst>
+              </p:cTn>
+              <p:prevCondLst>
+                <p:cond evt="onPrev" delay="0">
+                  <p:tgtEl>
+                    <p:sldTgt/>
+                  </p:tgtEl>
+                </p:cond>
+              </p:prevCondLst>
+              <p:nextCondLst>
+                <p:cond evt="onNext" delay="0">
+                  <p:tgtEl>
+                    <p:sldTgt/>
+                  </p:tgtEl>
+                </p:cond>
+              </p:nextCondLst>
+            </p:seq>
+          </p:childTnLst>
+        </p:cTn>
+      </p:par>
+    </p:tnLst>
+    <p:bldLst>
+      <p:bldP spid="3" grpId="0" uiExpand="1" build="p"/>
+    </p:bldLst>
+  </p:timing>
+</p:sld>
+</file>
+
+<file path=ppt/slides/slide14.xml><?xml version="1.0" encoding="utf-8"?>
+<p:sld xmlns:a="http://schemas.openxmlformats.org/drawingml/2006/main" xmlns:r="http://schemas.openxmlformats.org/officeDocument/2006/relationships" xmlns:p="http://schemas.openxmlformats.org/presentationml/2006/main">
+  <p:cSld>
+    <p:spTree>
+      <p:nvGrpSpPr>
+        <p:cNvPr id="1" name=""/>
+        <p:cNvGrpSpPr/>
+        <p:nvPr/>
+      </p:nvGrpSpPr>
+      <p:grpSpPr>
+        <a:xfrm>
+          <a:off x="0" y="0"/>
+          <a:ext cx="0" cy="0"/>
+          <a:chOff x="0" y="0"/>
+          <a:chExt cx="0" cy="0"/>
+        </a:xfrm>
+      </p:grpSpPr>
+      <p:sp>
+        <p:nvSpPr>
+          <p:cNvPr id="2" name="Title 1"/>
+          <p:cNvSpPr>
+            <a:spLocks noGrp="1"/>
+          </p:cNvSpPr>
+          <p:nvPr>
+            <p:ph type="title"/>
+          </p:nvPr>
+        </p:nvSpPr>
+        <p:spPr/>
+        <p:txBody>
+          <a:bodyPr/>
+          <a:lstStyle/>
+          <a:p>
+            <a:pPr lvl="0" indent="0" marL="0">
+              <a:buNone/>
+            </a:pPr>
+            <a:r>
+              <a:rPr/>
+              <a:t>Что нового: расширенное форматирование</a:t>
+            </a:r>
+          </a:p>
+        </p:txBody>
+      </p:sp>
+      <mc:AlternateContent xmlns:mc="http://schemas.openxmlformats.org/markup-compatibility/2006">
+        <mc:Choice xmlns:a14="http://schemas.microsoft.com/office/drawing/2010/main" Requires="a14">
+          <p:sp>
+            <p:nvSpPr>
+              <p:cNvPr id="3" name="Content Placeholder 2"/>
+              <p:cNvSpPr>
+                <a:spLocks noGrp="1"/>
+              </p:cNvSpPr>
+              <p:nvPr>
+                <p:ph idx="1"/>
+              </p:nvPr>
+            </p:nvSpPr>
+            <p:spPr/>
+            <p:txBody>
+              <a:bodyPr/>
+              <a:lstStyle/>
+              <a:p>
+                <a:pPr lvl="0" indent="0" marL="0">
+                  <a:buNone/>
+                </a:pPr>
+                <a:r>
+                  <a:rPr/>
+                  <a:t>Quarto изначально включает все необходимое для научных публикаций и </a:t>
+                </a:r>
+                <a:r>
+                  <a:rPr>
+                    <a:hlinkClick r:id="rId3"/>
+                  </a:rPr>
+                  <a:t>воспроизводимого анализа</a:t>
+                </a:r>
+                <a:r>
+                  <a:rPr/>
+                  <a:t>:</a:t>
+                </a:r>
+              </a:p>
+              <a:p>
+                <a:pPr lvl="0"/>
+                <a:r>
+                  <a:rPr/>
+                  <a:t>обширную поддержку перекрестных ссылок и цитат;</a:t>
+                </a:r>
+              </a:p>
+              <a:p>
+                <a:pPr lvl="0"/>
+                <a:r>
+                  <a:rPr/>
+                  <a:t>расширенное аннотирование рисунков, таблиц и кода;</a:t>
+                </a:r>
+              </a:p>
+              <a:p>
+                <a:pPr lvl="0"/>
+                <a:r>
+                  <a:rPr/>
+                  <a:t>расширенные возможности написания формул LaTeX.</a:t>
+                </a:r>
+              </a:p>
+              <a:p>
+                <a:pPr lvl="0" indent="0" marL="0">
+                  <a:buNone/>
+                </a:pPr>
+                <a:r>
+                  <a:rPr b="1"/>
+                  <a:t>Пример</a:t>
+                </a:r>
+                <a:r>
+                  <a:rPr/>
+                  <a:t>: Запись матрицы (пакет </a:t>
+                </a:r>
+                <a:r>
+                  <a:rPr>
+                    <a:latin typeface="Courier"/>
+                  </a:rPr>
+                  <a:t>amsmath</a:t>
+                </a:r>
+                <a:r>
+                  <a:rPr/>
+                  <a:t>)</a:t>
+                </a:r>
+              </a:p>
+              <a:p>
+                <a:pPr lvl="0" indent="0" marL="0">
+                  <a:buNone/>
+                </a:pPr>
+                <a14:m>
+                  <m:oMathPara xmlns:m="http://schemas.openxmlformats.org/officeDocument/2006/math">
+                    <m:oMathParaPr>
+                      <m:jc m:val="center"/>
+                    </m:oMathParaPr>
+                    <m:oMath>
+                      <m:r>
+                        <m:t>A</m:t>
+                      </m:r>
+                      <m:r>
+                        <m:rPr>
+                          <m:sty m:val="p"/>
+                        </m:rPr>
+                        <m:t>=</m:t>
+                      </m:r>
+                      <m:d>
+                        <m:dPr>
+                          <m:begChr m:val="("/>
+                          <m:endChr m:val=")"/>
+                          <m:sepChr m:val=""/>
+                          <m:grow/>
+                        </m:dPr>
+                        <m:e>
+                          <m:m>
+                            <m:mPr>
+                              <m:baseJc m:val="center"/>
+                              <m:plcHide m:val="1"/>
+                              <m:mcs>
+                                <m:mc>
+                                  <m:mcPr>
+                                    <m:mcJc m:val="center"/>
+                                    <m:count m:val="1"/>
+                                  </m:mcPr>
+                                </m:mc>
+                                <m:mc>
+                                  <m:mcPr>
+                                    <m:mcJc m:val="center"/>
+                                    <m:count m:val="1"/>
+                                  </m:mcPr>
+                                </m:mc>
+                                <m:mc>
+                                  <m:mcPr>
+                                    <m:mcJc m:val="center"/>
+                                    <m:count m:val="1"/>
+                                  </m:mcPr>
+                                </m:mc>
+                              </m:mcs>
+                            </m:mPr>
+                            <m:mr>
+                              <m:e>
+                                <m:r>
+                                  <m:t>4</m:t>
+                                </m:r>
+                              </m:e>
+                              <m:e>
+                                <m:r>
+                                  <m:rPr>
+                                    <m:sty m:val="p"/>
+                                  </m:rPr>
+                                  <m:t>−</m:t>
+                                </m:r>
+                                <m:r>
+                                  <m:t>3</m:t>
+                                </m:r>
+                              </m:e>
+                              <m:e>
+                                <m:r>
+                                  <m:rPr>
+                                    <m:sty m:val="p"/>
+                                  </m:rPr>
+                                  <m:t>−</m:t>
+                                </m:r>
+                                <m:r>
+                                  <m:t>3</m:t>
+                                </m:r>
+                              </m:e>
+                            </m:mr>
+                            <m:mr>
+                              <m:e>
+                                <m:r>
+                                  <m:t>1</m:t>
+                                </m:r>
+                              </m:e>
+                              <m:e>
+                                <m:r>
+                                  <m:t>2</m:t>
+                                </m:r>
+                              </m:e>
+                              <m:e>
+                                <m:r>
+                                  <m:t>1</m:t>
+                                </m:r>
+                              </m:e>
+                            </m:mr>
+                            <m:mr>
+                              <m:e>
+                                <m:r>
+                                  <m:t>1</m:t>
+                                </m:r>
+                              </m:e>
+                              <m:e>
+                                <m:r>
+                                  <m:t>1</m:t>
+                                </m:r>
+                              </m:e>
+                              <m:e>
+                                <m:r>
+                                  <m:t>2</m:t>
+                                </m:r>
+                              </m:e>
+                            </m:mr>
+                          </m:m>
+                        </m:e>
+                      </m:d>
+                    </m:oMath>
+                  </m:oMathPara>
+                </a14:m>
+              </a:p>
+              <a:p>
+                <a:pPr lvl="0" indent="0" marL="0">
+                  <a:buNone/>
+                </a:pPr>
+                <a:r>
+                  <a:rPr b="1"/>
+                  <a:t>Пример</a:t>
+                </a:r>
+                <a:r>
+                  <a:rPr/>
+                  <a:t>: Запятая как десятичный разделитель (пакет </a:t>
+                </a:r>
+                <a:r>
+                  <a:rPr>
+                    <a:latin typeface="Courier"/>
+                  </a:rPr>
+                  <a:t>icomma</a:t>
+                </a:r>
+                <a:r>
+                  <a:rPr/>
+                  <a:t>)</a:t>
+                </a:r>
+              </a:p>
+              <a:p>
+                <a:pPr lvl="0" indent="0" marL="0">
+                  <a:buNone/>
+                </a:pPr>
+                <a14:m>
+                  <m:oMathPara xmlns:m="http://schemas.openxmlformats.org/officeDocument/2006/math">
+                    <m:oMathParaPr>
+                      <m:jc m:val="center"/>
+                    </m:oMathParaPr>
+                    <m:oMath>
+                      <m:r>
+                        <m:t>x</m:t>
+                      </m:r>
+                      <m:r>
+                        <m:rPr>
+                          <m:sty m:val="p"/>
+                        </m:rPr>
+                        <m:t>=</m:t>
+                      </m:r>
+                      <m:r>
+                        <m:t>1</m:t>
+                      </m:r>
+                      <m:r>
+                        <m:rPr>
+                          <m:sty m:val="p"/>
+                        </m:rPr>
+                        <m:t>,</m:t>
+                      </m:r>
+                      <m:r>
+                        <m:t>11</m:t>
+                      </m:r>
+                      <m:r>
+                        <m:rPr>
+                          <m:sty m:val="p"/>
+                        </m:rPr>
+                        <m:t>,</m:t>
+                      </m:r>
+                      <m:r>
+                        <m:t> </m:t>
+                      </m:r>
+                      <m:r>
+                        <m:t>y</m:t>
+                      </m:r>
+                      <m:r>
+                        <m:rPr>
+                          <m:sty m:val="p"/>
+                        </m:rPr>
+                        <m:t>=</m:t>
+                      </m:r>
+                      <m:r>
+                        <m:t>2</m:t>
+                      </m:r>
+                      <m:r>
+                        <m:rPr>
+                          <m:sty m:val="p"/>
+                        </m:rPr>
+                        <m:t>,</m:t>
+                      </m:r>
+                      <m:r>
+                        <m:t>18</m:t>
+                      </m:r>
+                      <m:r>
+                        <m:rPr>
+                          <m:sty m:val="p"/>
+                        </m:rPr>
+                        <m:t>,</m:t>
+                      </m:r>
+                      <m:r>
+                        <m:t> </m:t>
+                      </m:r>
+                      <m:r>
+                        <m:t>π</m:t>
+                      </m:r>
+                      <m:r>
+                        <m:rPr>
+                          <m:sty m:val="p"/>
+                        </m:rPr>
+                        <m:t>=</m:t>
+                      </m:r>
+                      <m:r>
+                        <m:t>3</m:t>
+                      </m:r>
+                      <m:r>
+                        <m:rPr>
+                          <m:sty m:val="p"/>
+                        </m:rPr>
+                        <m:t>,</m:t>
+                      </m:r>
+                      <m:r>
+                        <m:t>141593</m:t>
+                      </m:r>
+                      <m:r>
+                        <m:rPr>
+                          <m:sty m:val="p"/>
+                        </m:rPr>
+                        <m:t>…</m:t>
+                      </m:r>
+                    </m:oMath>
+                  </m:oMathPara>
+                </a14:m>
+              </a:p>
+            </p:txBody>
+          </p:sp>
+        </mc:Choice>
+      </mc:AlternateContent>
+    </p:spTree>
+  </p:cSld>
+  <p:timing>
+    <p:tnLst>
+      <p:par>
+        <p:cTn id="1" dur="indefinite" restart="never" nodeType="tmRoot">
+          <p:childTnLst>
+            <p:seq concurrent="1" nextAc="seek">
+              <p:cTn id="2" dur="indefinite" nodeType="mainSeq">
+                <p:childTnLst>
+                  <p:par>
+                    <p:cTn id="3" fill="hold">
+                      <p:stCondLst>
+                        <p:cond delay="indefinite"/>
+                      </p:stCondLst>
+                      <p:childTnLst>
+                        <p:par>
+                          <p:cTn id="4" fill="hold">
+                            <p:stCondLst>
+                              <p:cond delay="0"/>
+                            </p:stCondLst>
+                            <p:childTnLst>
+                              <p:par>
+                                <p:cTn id="5" presetID="1" presetClass="entr" presetSubtype="0" fill="hold" grpId="0" nodeType="clickEffect">
+                                  <p:stCondLst>
+                                    <p:cond delay="0"/>
+                                  </p:stCondLst>
+                                  <p:childTnLst>
+                                    <p:set>
+                                      <p:cBhvr>
+                                        <p:cTn id="6" dur="1" fill="hold">
+                                          <p:stCondLst>
+                                            <p:cond delay="0"/>
+                                          </p:stCondLst>
+                                        </p:cTn>
+                                        <p:tgtEl>
+                                          <p:spTgt spid="3">
+                                            <p:txEl>
+                                              <p:pRg st="1" end="1"/>
+                                            </p:txEl>
+                                          </p:spTgt>
+                                        </p:tgtEl>
+                                        <p:attrNameLst>
+                                          <p:attrName>style.visibility</p:attrName>
+                                        </p:attrNameLst>
+                                      </p:cBhvr>
+                                      <p:to>
+                                        <p:strVal val="visible"/>
+                                      </p:to>
+                                    </p:set>
+                                  </p:childTnLst>
+                                </p:cTn>
+                              </p:par>
+                            </p:childTnLst>
+                          </p:cTn>
+                        </p:par>
+                      </p:childTnLst>
+                    </p:cTn>
+                  </p:par>
+                  <p:par>
+                    <p:cTn id="7" fill="hold">
+                      <p:stCondLst>
+                        <p:cond delay="indefinite"/>
+                      </p:stCondLst>
+                      <p:childTnLst>
+                        <p:par>
+                          <p:cTn id="8" fill="hold">
+                            <p:stCondLst>
+                              <p:cond delay="0"/>
+                            </p:stCondLst>
+                            <p:childTnLst>
+                              <p:par>
+                                <p:cTn id="9" presetID="1" presetClass="entr" presetSubtype="0" fill="hold" grpId="0" nodeType="clickEffect">
+                                  <p:stCondLst>
+                                    <p:cond delay="0"/>
+                                  </p:stCondLst>
+                                  <p:childTnLst>
+                                    <p:set>
+                                      <p:cBhvr>
+                                        <p:cTn id="10" dur="1" fill="hold">
+                                          <p:stCondLst>
+                                            <p:cond delay="0"/>
+                                          </p:stCondLst>
+                                        </p:cTn>
+                                        <p:tgtEl>
+                                          <p:spTgt spid="3">
+                                            <p:txEl>
+                                              <p:pRg st="2" end="2"/>
+                                            </p:txEl>
+                                          </p:spTgt>
+                                        </p:tgtEl>
+                                        <p:attrNameLst>
+                                          <p:attrName>style.visibility</p:attrName>
+                                        </p:attrNameLst>
+                                      </p:cBhvr>
+                                      <p:to>
+                                        <p:strVal val="visible"/>
+                                      </p:to>
+                                    </p:set>
+                                  </p:childTnLst>
+                                </p:cTn>
+                              </p:par>
+                            </p:childTnLst>
+                          </p:cTn>
+                        </p:par>
+                      </p:childTnLst>
+                    </p:cTn>
+                  </p:par>
+                  <p:par>
+                    <p:cTn id="11" fill="hold">
+                      <p:stCondLst>
+                        <p:cond delay="indefinite"/>
+                      </p:stCondLst>
+                      <p:childTnLst>
+                        <p:par>
+                          <p:cTn id="12" fill="hold">
+                            <p:stCondLst>
+                              <p:cond delay="0"/>
+                            </p:stCondLst>
+                            <p:childTnLst>
+                              <p:par>
+                                <p:cTn id="13" presetID="1" presetClass="entr" presetSubtype="0" fill="hold" grpId="0" nodeType="clickEffect">
+                                  <p:stCondLst>
+                                    <p:cond delay="0"/>
+                                  </p:stCondLst>
+                                  <p:childTnLst>
+                                    <p:set>
+                                      <p:cBhvr>
+                                        <p:cTn id="14" dur="1" fill="hold">
+                                          <p:stCondLst>
+                                            <p:cond delay="0"/>
+                                          </p:stCondLst>
+                                        </p:cTn>
+                                        <p:tgtEl>
+                                          <p:spTgt spid="3">
+                                            <p:txEl>
+                                              <p:pRg st="3" end="3"/>
+                                            </p:txEl>
+                                          </p:spTgt>
+                                        </p:tgtEl>
+                                        <p:attrNameLst>
+                                          <p:attrName>style.visibility</p:attrName>
+                                        </p:attrNameLst>
+                                      </p:cBhvr>
+                                      <p:to>
+                                        <p:strVal val="visible"/>
+                                      </p:to>
+                                    </p:set>
+                                  </p:childTnLst>
+                                </p:cTn>
+                              </p:par>
+                            </p:childTnLst>
+                          </p:cTn>
+                        </p:par>
+                      </p:childTnLst>
+                    </p:cTn>
+                  </p:par>
+                </p:childTnLst>
+              </p:cTn>
+              <p:prevCondLst>
+                <p:cond evt="onPrev" delay="0">
+                  <p:tgtEl>
+                    <p:sldTgt/>
+                  </p:tgtEl>
+                </p:cond>
+              </p:prevCondLst>
+              <p:nextCondLst>
+                <p:cond evt="onNext" delay="0">
+                  <p:tgtEl>
+                    <p:sldTgt/>
+                  </p:tgtEl>
+                </p:cond>
+              </p:nextCondLst>
+            </p:seq>
+          </p:childTnLst>
+        </p:cTn>
+      </p:par>
+    </p:tnLst>
+    <p:bldLst>
+      <p:bldP spid="3" grpId="0" uiExpand="1" build="p"/>
+    </p:bldLst>
+  </p:timing>
+</p:sld>
+</file>
+
+<file path=ppt/slides/slide15.xml><?xml version="1.0" encoding="utf-8"?>
+<p:sld xmlns:a="http://schemas.openxmlformats.org/drawingml/2006/main" xmlns:r="http://schemas.openxmlformats.org/officeDocument/2006/relationships" xmlns:p="http://schemas.openxmlformats.org/presentationml/2006/main">
+  <p:cSld>
+    <p:spTree>
+      <p:nvGrpSpPr>
+        <p:cNvPr id="1" name=""/>
+        <p:cNvGrpSpPr/>
+        <p:nvPr/>
+      </p:nvGrpSpPr>
+      <p:grpSpPr>
+        <a:xfrm>
+          <a:off x="0" y="0"/>
+          <a:ext cx="0" cy="0"/>
+          <a:chOff x="0" y="0"/>
+          <a:chExt cx="0" cy="0"/>
+        </a:xfrm>
+      </p:grpSpPr>
+      <p:sp>
+        <p:nvSpPr>
+          <p:cNvPr id="2" name="Title 1"/>
+          <p:cNvSpPr>
+            <a:spLocks noGrp="1"/>
+          </p:cNvSpPr>
+          <p:nvPr>
+            <p:ph type="title"/>
+          </p:nvPr>
+        </p:nvSpPr>
+        <p:spPr/>
+        <p:txBody>
+          <a:bodyPr/>
+          <a:lstStyle/>
+          <a:p>
+            <a:pPr lvl="0" indent="0" marL="0">
+              <a:buNone/>
+            </a:pPr>
+            <a:r>
+              <a:rPr/>
+              <a:t>Что нового: интерактивное и динамическое содержимое</a:t>
+            </a:r>
+          </a:p>
+        </p:txBody>
+      </p:sp>
+      <p:sp>
+        <p:nvSpPr>
+          <p:cNvPr id="3" name="Content Placeholder 2"/>
+          <p:cNvSpPr>
+            <a:spLocks noGrp="1"/>
+          </p:cNvSpPr>
+          <p:nvPr>
+            <p:ph idx="1"/>
+          </p:nvPr>
+        </p:nvSpPr>
+        <p:spPr/>
+        <p:txBody>
+          <a:bodyPr/>
+          <a:lstStyle/>
+          <a:p>
+            <a:pPr lvl="0" indent="0" marL="0">
+              <a:buNone/>
+            </a:pPr>
+            <a:r>
+              <a:rPr/>
+              <a:t>Quarto поддерживает интерактивное и динамическое содержимое с использованием JavaScript и других веб-технологий. Это позволяет создавать документы с интерактивными графиками, анимацией и другими динамическими функциями. Для создания интерактивного документа выберите один из следующих форматов:</a:t>
+            </a:r>
+          </a:p>
+          <a:p>
+            <a:pPr lvl="0"/>
+            <a:r>
+              <a:rPr/>
+              <a:t>Shiny</a:t>
+            </a:r>
+          </a:p>
+          <a:p>
+            <a:pPr lvl="0"/>
+            <a:r>
+              <a:rPr/>
+              <a:t>Observable JS</a:t>
+            </a:r>
+          </a:p>
+        </p:txBody>
+      </p:sp>
+    </p:spTree>
+  </p:cSld>
+  <p:timing>
+    <p:tnLst>
+      <p:par>
+        <p:cTn id="1" dur="indefinite" restart="never" nodeType="tmRoot">
+          <p:childTnLst>
+            <p:seq concurrent="1" nextAc="seek">
+              <p:cTn id="2" dur="indefinite" nodeType="mainSeq">
+                <p:childTnLst>
+                  <p:par>
+                    <p:cTn id="3" fill="hold">
+                      <p:stCondLst>
+                        <p:cond delay="indefinite"/>
+                      </p:stCondLst>
+                      <p:childTnLst>
+                        <p:par>
+                          <p:cTn id="4" fill="hold">
+                            <p:stCondLst>
+                              <p:cond delay="0"/>
+                            </p:stCondLst>
+                            <p:childTnLst>
+                              <p:par>
+                                <p:cTn id="5" presetID="1" presetClass="entr" presetSubtype="0" fill="hold" grpId="0" nodeType="clickEffect">
+                                  <p:stCondLst>
+                                    <p:cond delay="0"/>
+                                  </p:stCondLst>
+                                  <p:childTnLst>
+                                    <p:set>
+                                      <p:cBhvr>
+                                        <p:cTn id="6" dur="1" fill="hold">
+                                          <p:stCondLst>
+                                            <p:cond delay="0"/>
+                                          </p:stCondLst>
+                                        </p:cTn>
+                                        <p:tgtEl>
+                                          <p:spTgt spid="3">
+                                            <p:txEl>
+                                              <p:pRg st="1" end="1"/>
+                                            </p:txEl>
+                                          </p:spTgt>
+                                        </p:tgtEl>
+                                        <p:attrNameLst>
+                                          <p:attrName>style.visibility</p:attrName>
+                                        </p:attrNameLst>
+                                      </p:cBhvr>
+                                      <p:to>
+                                        <p:strVal val="visible"/>
+                                      </p:to>
+                                    </p:set>
+                                  </p:childTnLst>
+                                </p:cTn>
+                              </p:par>
+                            </p:childTnLst>
+                          </p:cTn>
+                        </p:par>
+                      </p:childTnLst>
+                    </p:cTn>
+                  </p:par>
+                  <p:par>
+                    <p:cTn id="7" fill="hold">
+                      <p:stCondLst>
+                        <p:cond delay="indefinite"/>
+                      </p:stCondLst>
+                      <p:childTnLst>
+                        <p:par>
+                          <p:cTn id="8" fill="hold">
+                            <p:stCondLst>
+                              <p:cond delay="0"/>
+                            </p:stCondLst>
+                            <p:childTnLst>
+                              <p:par>
+                                <p:cTn id="9" presetID="1" presetClass="entr" presetSubtype="0" fill="hold" grpId="0" nodeType="clickEffect">
+                                  <p:stCondLst>
+                                    <p:cond delay="0"/>
+                                  </p:stCondLst>
+                                  <p:childTnLst>
+                                    <p:set>
+                                      <p:cBhvr>
+                                        <p:cTn id="10" dur="1" fill="hold">
                                           <p:stCondLst>
                                             <p:cond delay="0"/>
                                           </p:stCondLst>
@@ -5790,6 +6793,197 @@
       <p:bldP spid="3" grpId="0" uiExpand="1" build="p"/>
     </p:bldLst>
   </p:timing>
+</p:sld>
+</file>
+
+<file path=ppt/slides/slide16.xml><?xml version="1.0" encoding="utf-8"?>
+<p:sld xmlns:a="http://schemas.openxmlformats.org/drawingml/2006/main" xmlns:r="http://schemas.openxmlformats.org/officeDocument/2006/relationships" xmlns:p="http://schemas.openxmlformats.org/presentationml/2006/main">
+  <p:cSld>
+    <p:spTree>
+      <p:nvGrpSpPr>
+        <p:cNvPr id="1" name=""/>
+        <p:cNvGrpSpPr/>
+        <p:nvPr/>
+      </p:nvGrpSpPr>
+      <p:grpSpPr>
+        <a:xfrm>
+          <a:off x="0" y="0"/>
+          <a:ext cx="0" cy="0"/>
+          <a:chOff x="0" y="0"/>
+          <a:chExt cx="0" cy="0"/>
+        </a:xfrm>
+      </p:grpSpPr>
+      <p:sp>
+        <p:nvSpPr>
+          <p:cNvPr id="9" name="Заголовок 8">
+            <a:extLst>
+              <a:ext uri="{FF2B5EF4-FFF2-40B4-BE49-F238E27FC236}">
+                <a16:creationId xmlns:a16="http://schemas.microsoft.com/office/drawing/2014/main" id="{FB47BD9B-F2D0-6358-9482-569589771537}"/>
+              </a:ext>
+            </a:extLst>
+          </p:cNvPr>
+          <p:cNvSpPr>
+            <a:spLocks noGrp="1"/>
+          </p:cNvSpPr>
+          <p:nvPr>
+            <p:ph hasCustomPrompt="1" type="title"/>
+          </p:nvPr>
+        </p:nvSpPr>
+        <p:spPr/>
+        <p:txBody>
+          <a:bodyPr/>
+          <a:lstStyle/>
+          <a:p>
+            <a:pPr lvl="0" indent="0" marL="0">
+              <a:buNone/>
+            </a:pPr>
+            <a:r>
+              <a:rPr/>
+              <a:t>Что нового: настраиваемые шаблоны и брендирование</a:t>
+            </a:r>
+          </a:p>
+        </p:txBody>
+      </p:sp>
+      <p:sp>
+        <p:nvSpPr>
+          <p:cNvPr id="6" name="Text Placeholder 2">
+            <a:extLst>
+              <a:ext uri="{FF2B5EF4-FFF2-40B4-BE49-F238E27FC236}">
+                <a16:creationId xmlns:a16="http://schemas.microsoft.com/office/drawing/2014/main" id="{D4BCB0AA-6968-3B8A-7F32-11A39C0E23A3}"/>
+              </a:ext>
+            </a:extLst>
+          </p:cNvPr>
+          <p:cNvSpPr>
+            <a:spLocks noGrp="1"/>
+          </p:cNvSpPr>
+          <p:nvPr>
+            <p:ph hasCustomPrompt="1" idx="10" type="body"/>
+          </p:nvPr>
+        </p:nvSpPr>
+        <p:spPr/>
+        <p:txBody>
+          <a:bodyPr/>
+          <a:lstStyle/>
+          <a:p>
+            <a:pPr lvl="0" indent="0" marL="0">
+              <a:buNone/>
+            </a:pPr>
+            <a:r>
+              <a:rPr/>
+              <a:t>Quarto позволяет настраивать шаблоны и темы, которые можно использовать для управления внешним видом ваших документов. Это облегчает создание профессиональных документов с единым визуальным стилем.</a:t>
+            </a:r>
+          </a:p>
+        </p:txBody>
+      </p:sp>
+      <p:pic>
+        <p:nvPicPr>
+          <p:cNvPr descr="branding-example.png" id="0" name="Picture 1"/>
+          <p:cNvPicPr>
+            <a:picLocks noGrp="1" noChangeAspect="1"/>
+          </p:cNvPicPr>
+          <p:nvPr/>
+        </p:nvPicPr>
+        <p:blipFill>
+          <a:blip r:embed="rId2"/>
+          <a:stretch>
+            <a:fillRect/>
+          </a:stretch>
+        </p:blipFill>
+        <p:spPr bwMode="auto">
+          <a:xfrm>
+            <a:off x="4572000" y="1155700"/>
+            <a:ext cx="4114800" cy="2895600"/>
+          </a:xfrm>
+          <a:prstGeom prst="rect">
+            <a:avLst/>
+          </a:prstGeom>
+          <a:noFill/>
+          <a:ln w="9525">
+            <a:noFill/>
+            <a:headEnd/>
+            <a:tailEnd/>
+          </a:ln>
+        </p:spPr>
+      </p:pic>
+      <p:sp>
+        <p:nvSpPr>
+          <p:cNvPr id="1" name="TextBox 3"/>
+          <p:cNvSpPr txBox="1"/>
+          <p:nvPr/>
+        </p:nvSpPr>
+        <p:spPr>
+          <a:xfrm>
+            <a:off x="4572000" y="4076700"/>
+            <a:ext cx="4114800" cy="508000"/>
+          </a:xfrm>
+          <a:prstGeom prst="rect">
+            <a:avLst/>
+          </a:prstGeom>
+          <a:noFill/>
+        </p:spPr>
+        <p:txBody>
+          <a:bodyPr/>
+          <a:lstStyle/>
+          <a:p>
+            <a:pPr lvl="0" indent="0" marL="0" algn="ctr">
+              <a:buNone/>
+            </a:pPr>
+            <a:r>
+              <a:rPr/>
+              <a:t>Пример брендинга</a:t>
+            </a:r>
+          </a:p>
+        </p:txBody>
+      </p:sp>
+    </p:spTree>
+  </p:cSld>
+</p:sld>
+</file>
+
+<file path=ppt/slides/slide17.xml><?xml version="1.0" encoding="utf-8"?>
+<p:sld xmlns:a="http://schemas.openxmlformats.org/drawingml/2006/main" xmlns:r="http://schemas.openxmlformats.org/officeDocument/2006/relationships" xmlns:p="http://schemas.openxmlformats.org/presentationml/2006/main">
+  <p:cSld>
+    <p:spTree>
+      <p:nvGrpSpPr>
+        <p:cNvPr id="1" name=""/>
+        <p:cNvGrpSpPr/>
+        <p:nvPr/>
+      </p:nvGrpSpPr>
+      <p:grpSpPr>
+        <a:xfrm>
+          <a:off x="0" y="0"/>
+          <a:ext cx="0" cy="0"/>
+          <a:chOff x="0" y="0"/>
+          <a:chExt cx="0" cy="0"/>
+        </a:xfrm>
+      </p:grpSpPr>
+      <p:sp>
+        <p:nvSpPr>
+          <p:cNvPr id="3" name="Content Placeholder 2"/>
+          <p:cNvSpPr>
+            <a:spLocks noGrp="1"/>
+          </p:cNvSpPr>
+          <p:nvPr>
+            <p:ph idx="1"/>
+          </p:nvPr>
+        </p:nvSpPr>
+        <p:spPr/>
+        <p:txBody>
+          <a:bodyPr/>
+          <a:lstStyle/>
+          <a:p>
+            <a:pPr lvl="0" indent="0" marL="0">
+              <a:buNone/>
+            </a:pPr>
+            <a:r>
+              <a:rPr/>
+              <a:t>](https://realworlddatascience.net/)</a:t>
+            </a:r>
+          </a:p>
+        </p:txBody>
+      </p:sp>
+    </p:spTree>
+  </p:cSld>
 </p:sld>
 </file>
 
@@ -6966,7 +8160,7 @@
             <a:spLocks noGrp="1"/>
           </p:cNvSpPr>
           <p:nvPr>
-            <p:ph idx="10" type="body"/>
+            <p:ph hasCustomPrompt="1" idx="10" type="body"/>
           </p:nvPr>
         </p:nvSpPr>
         <p:spPr/>
@@ -7279,9 +8473,9 @@
 <file path=ppt/theme/theme1.xml><?xml version="1.0" encoding="utf-8"?>
 <a:theme xmlns:a="http://schemas.openxmlformats.org/drawingml/2006/main" name="Office Theme">
   <a:themeElements>
-    <a:clrScheme name="Office">
+    <a:clrScheme name="Otus Dark">
       <a:dk1>
-        <a:sysClr val="windowText" lastClr="000000"/>
+        <a:srgbClr val="BFBFBF"/>
       </a:dk1>
       <a:lt1>
         <a:sysClr val="window" lastClr="FFFFFF"/>
@@ -7293,7 +8487,7 @@
         <a:srgbClr val="EEECE1"/>
       </a:lt2>
       <a:accent1>
-        <a:srgbClr val="4F81BD"/>
+        <a:srgbClr val="BFBFBF"/>
       </a:accent1>
       <a:accent2>
         <a:srgbClr val="C0504D"/>
@@ -7311,10 +8505,10 @@
         <a:srgbClr val="F79646"/>
       </a:accent6>
       <a:hlink>
-        <a:srgbClr val="0000FF"/>
+        <a:srgbClr val="F16033"/>
       </a:hlink>
       <a:folHlink>
-        <a:srgbClr val="800080"/>
+        <a:srgbClr val="F1334C"/>
       </a:folHlink>
     </a:clrScheme>
     <a:fontScheme name="Otus">

</xml_diff>

<commit_message>
A couple more slides
</commit_message>
<xml_diff>
--- a/01-Quarto/slides_draft.pptx
+++ b/01-Quarto/slides_draft.pptx
@@ -5,7 +5,7 @@
     <p:sldMasterId id="2147483648" r:id="rId1"/>
   </p:sldMasterIdLst>
   <p:notesMasterIdLst>
-    <p:notesMasterId r:id="rId28"/>
+    <p:notesMasterId r:id="rId34"/>
   </p:notesMasterIdLst>
   <p:sldIdLst>
     <p:sldId id="256" r:id="rId2"/>
@@ -34,6 +34,12 @@
     <p:sldId id="279" r:id="rId25"/>
     <p:sldId id="280" r:id="rId26"/>
     <p:sldId id="281" r:id="rId27"/>
+    <p:sldId id="282" r:id="rId28"/>
+    <p:sldId id="283" r:id="rId29"/>
+    <p:sldId id="284" r:id="rId30"/>
+    <p:sldId id="285" r:id="rId31"/>
+    <p:sldId id="286" r:id="rId32"/>
+    <p:sldId id="287" r:id="rId33"/>
   </p:sldIdLst>
   <p:sldSz cx="9144000" cy="5143500" type="screen16x9"/>
   <p:notesSz cx="6858000" cy="9144000"/>
@@ -7069,6 +7075,64 @@
               <a:t>Observable JS</a:t>
             </a:r>
           </a:p>
+          <a:p>
+            <a:pPr lvl="0" indent="0" marL="0">
+              <a:buNone/>
+            </a:pPr>
+            <a:r>
+              <a:rPr/>
+              <a:t>. . .</a:t>
+            </a:r>
+          </a:p>
+          <a:p>
+            <a:pPr lvl="0" indent="0" marL="0">
+              <a:buNone/>
+            </a:pPr>
+            <a:r>
+              <a:rPr/>
+              <a:t>Или использовать элементы </a:t>
+            </a:r>
+            <a:r>
+              <a:rPr>
+                <a:latin typeface="Courier"/>
+              </a:rPr>
+              <a:t>htmlwidgets</a:t>
+            </a:r>
+            <a:r>
+              <a:rPr/>
+              <a:t> (</a:t>
+            </a:r>
+            <a:r>
+              <a:rPr>
+                <a:latin typeface="Courier"/>
+              </a:rPr>
+              <a:t>plotly</a:t>
+            </a:r>
+            <a:r>
+              <a:rPr/>
+              <a:t>, </a:t>
+            </a:r>
+            <a:r>
+              <a:rPr>
+                <a:latin typeface="Courier"/>
+              </a:rPr>
+              <a:t>leaflet</a:t>
+            </a:r>
+            <a:r>
+              <a:rPr/>
+              <a:t>, </a:t>
+            </a:r>
+            <a:r>
+              <a:rPr>
+                <a:latin typeface="Courier"/>
+              </a:rPr>
+              <a:t>dygraph</a:t>
+            </a:r>
+            <a:r>
+              <a:rPr/>
+              <a:t> и другие).</a:t>
+            </a:r>
+          </a:p>
         </p:txBody>
       </p:sp>
     </p:spTree>
@@ -7571,12 +7635,18 @@
       </p:grpSpPr>
       <p:sp>
         <p:nvSpPr>
-          <p:cNvPr id="2" name="Title 1"/>
+          <p:cNvPr id="9" name="Заголовок 8">
+            <a:extLst>
+              <a:ext uri="{FF2B5EF4-FFF2-40B4-BE49-F238E27FC236}">
+                <a16:creationId xmlns:a16="http://schemas.microsoft.com/office/drawing/2014/main" id="{FB47BD9B-F2D0-6358-9482-569589771537}"/>
+              </a:ext>
+            </a:extLst>
+          </p:cNvPr>
           <p:cNvSpPr>
             <a:spLocks noGrp="1"/>
           </p:cNvSpPr>
           <p:nvPr>
-            <p:ph type="title"/>
+            <p:ph hasCustomPrompt="1" type="title"/>
           </p:nvPr>
         </p:nvSpPr>
         <p:spPr/>
@@ -7589,14 +7659,55 @@
             </a:pPr>
             <a:r>
               <a:rPr/>
-              <a:t>Типы проекта</a:t>
+              <a:t>Как работает Quarto</a:t>
+            </a:r>
+          </a:p>
+        </p:txBody>
+      </p:sp>
+      <p:sp>
+        <p:nvSpPr>
+          <p:cNvPr id="6" name="Text Placeholder 2">
+            <a:extLst>
+              <a:ext uri="{FF2B5EF4-FFF2-40B4-BE49-F238E27FC236}">
+                <a16:creationId xmlns:a16="http://schemas.microsoft.com/office/drawing/2014/main" id="{D4BCB0AA-6968-3B8A-7F32-11A39C0E23A3}"/>
+              </a:ext>
+            </a:extLst>
+          </p:cNvPr>
+          <p:cNvSpPr>
+            <a:spLocks noGrp="1"/>
+          </p:cNvSpPr>
+          <p:nvPr>
+            <p:ph hasCustomPrompt="1" idx="10" type="body"/>
+          </p:nvPr>
+        </p:nvSpPr>
+        <p:spPr/>
+        <p:txBody>
+          <a:bodyPr/>
+          <a:lstStyle/>
+          <a:p>
+            <a:pPr lvl="0" indent="0" marL="0">
+              <a:buNone/>
+            </a:pPr>
+            <a:r>
+              <a:rPr/>
+              <a:t>При работе с R система Quarto сначала создает markdown-документ, который затем конвертируется в нужный формат программой </a:t>
+            </a:r>
+            <a:r>
+              <a:rPr>
+                <a:latin typeface="Courier"/>
+              </a:rPr>
+              <a:t>pandoc</a:t>
+            </a:r>
+            <a:r>
+              <a:rPr/>
+              <a:t>.</a:t>
             </a:r>
           </a:p>
         </p:txBody>
       </p:sp>
       <p:pic>
         <p:nvPicPr>
-          <p:cNvPr descr="slides_draft_files\figure-pptx\mermaid-figure-2.png" id="0" name="Picture 1"/>
+          <p:cNvPr descr="how-it-works.png" id="0" name="Picture 1"/>
           <p:cNvPicPr>
             <a:picLocks noGrp="1" noChangeAspect="1"/>
           </p:cNvPicPr>
@@ -7610,8 +7721,8 @@
         </p:blipFill>
         <p:spPr bwMode="auto">
           <a:xfrm>
-            <a:off x="457200" y="2184400"/>
-            <a:ext cx="8229600" cy="1409700"/>
+            <a:off x="4572000" y="2489200"/>
+            <a:ext cx="4114800" cy="749300"/>
           </a:xfrm>
           <a:prstGeom prst="rect">
             <a:avLst/>
@@ -7666,7 +7777,84 @@
             </a:pPr>
             <a:r>
               <a:rPr/>
-              <a:t>YAML-заголовки (1 из 2)</a:t>
+              <a:t>Типы проекта (1 из 2)</a:t>
+            </a:r>
+          </a:p>
+        </p:txBody>
+      </p:sp>
+      <p:pic>
+        <p:nvPicPr>
+          <p:cNvPr descr="slides_draft_files\figure-pptx\mermaid-figure-2.png" id="0" name="Picture 1"/>
+          <p:cNvPicPr>
+            <a:picLocks noGrp="1" noChangeAspect="1"/>
+          </p:cNvPicPr>
+          <p:nvPr/>
+        </p:nvPicPr>
+        <p:blipFill>
+          <a:blip r:embed="rId2"/>
+          <a:stretch>
+            <a:fillRect/>
+          </a:stretch>
+        </p:blipFill>
+        <p:spPr bwMode="auto">
+          <a:xfrm>
+            <a:off x="457200" y="2184400"/>
+            <a:ext cx="8229600" cy="1409700"/>
+          </a:xfrm>
+          <a:prstGeom prst="rect">
+            <a:avLst/>
+          </a:prstGeom>
+          <a:noFill/>
+          <a:ln w="9525">
+            <a:noFill/>
+            <a:headEnd/>
+            <a:tailEnd/>
+          </a:ln>
+        </p:spPr>
+      </p:pic>
+    </p:spTree>
+  </p:cSld>
+</p:sld>
+</file>
+
+<file path=ppt/slides/slide22.xml><?xml version="1.0" encoding="utf-8"?>
+<p:sld xmlns:a="http://schemas.openxmlformats.org/drawingml/2006/main" xmlns:r="http://schemas.openxmlformats.org/officeDocument/2006/relationships" xmlns:p="http://schemas.openxmlformats.org/presentationml/2006/main">
+  <p:cSld>
+    <p:spTree>
+      <p:nvGrpSpPr>
+        <p:cNvPr id="1" name=""/>
+        <p:cNvGrpSpPr/>
+        <p:nvPr/>
+      </p:nvGrpSpPr>
+      <p:grpSpPr>
+        <a:xfrm>
+          <a:off x="0" y="0"/>
+          <a:ext cx="0" cy="0"/>
+          <a:chOff x="0" y="0"/>
+          <a:chExt cx="0" cy="0"/>
+        </a:xfrm>
+      </p:grpSpPr>
+      <p:sp>
+        <p:nvSpPr>
+          <p:cNvPr id="2" name="Title 1"/>
+          <p:cNvSpPr>
+            <a:spLocks noGrp="1"/>
+          </p:cNvSpPr>
+          <p:nvPr>
+            <p:ph type="title"/>
+          </p:nvPr>
+        </p:nvSpPr>
+        <p:spPr/>
+        <p:txBody>
+          <a:bodyPr/>
+          <a:lstStyle/>
+          <a:p>
+            <a:pPr lvl="0" indent="0" marL="0">
+              <a:buNone/>
+            </a:pPr>
+            <a:r>
+              <a:rPr/>
+              <a:t>Типы проекта (2 из 2)</a:t>
             </a:r>
           </a:p>
         </p:txBody>
@@ -7686,63 +7874,21 @@
           <a:bodyPr/>
           <a:lstStyle/>
           <a:p>
-            <a:pPr lvl="0" indent="0" marL="0">
+            <a:pPr lvl="0" indent="0" marL="1270000">
               <a:buNone/>
             </a:pPr>
             <a:r>
-              <a:rPr/>
-              <a:t>YAML («</a:t>
-            </a:r>
-            <a:r>
-              <a:rPr b="1"/>
-              <a:t>Y</a:t>
-            </a:r>
-            <a:r>
-              <a:rPr/>
-              <a:t>AML </a:t>
-            </a:r>
-            <a:r>
-              <a:rPr b="1"/>
-              <a:t>A</a:t>
-            </a:r>
-            <a:r>
-              <a:rPr/>
-              <a:t>in’t </a:t>
-            </a:r>
-            <a:r>
-              <a:rPr b="1"/>
-              <a:t>M</a:t>
-            </a:r>
-            <a:r>
-              <a:rPr/>
-              <a:t>arkup </a:t>
-            </a:r>
-            <a:r>
-              <a:rPr b="1"/>
-              <a:t>L</a:t>
-            </a:r>
-            <a:r>
-              <a:rPr/>
-              <a:t>anguage») – язык сериализации данных, как JSON и XML. Используется Quarto для записи конфигурации проекта (как в R и Julia). Формат записи – </a:t>
-            </a:r>
-            <a:r>
-              <a:rPr>
-                <a:latin typeface="Courier"/>
-              </a:rPr>
-              <a:t>опция: значение</a:t>
-            </a:r>
-            <a:r>
-              <a:rPr/>
-              <a:t>.</a:t>
-            </a:r>
-          </a:p>
-          <a:p>
-            <a:pPr lvl="0" indent="0" marL="0">
+              <a:rPr sz="2000" b="1"/>
+              <a:t>Note</a:t>
+            </a:r>
+          </a:p>
+          <a:p>
+            <a:pPr lvl="0" indent="0" marL="1270000">
               <a:buNone/>
             </a:pPr>
             <a:r>
-              <a:rPr/>
-              <a:t>Код конфигурации YAML отделяется тремя дефисами сверху и снизу:</a:t>
+              <a:rPr sz="2000"/>
+              <a:t>Из одного документа можно сверстать несколько документов в разных форматах. При этом отображение можно настроить отдельно для каждого формата.</a:t>
             </a:r>
           </a:p>
           <a:p>
@@ -7752,21 +7898,39 @@
             <a:r>
               <a:rPr>
                 <a:solidFill>
-                  <a:srgbClr val="AD0000"/>
-                </a:solidFill>
-                <a:latin typeface="Courier"/>
-              </a:rPr>
-              <a:t>---</a:t>
+                  <a:srgbClr val="4758AB"/>
+                </a:solidFill>
+                <a:latin typeface="Courier"/>
+              </a:rPr>
+              <a:t>format</a:t>
+            </a:r>
+            <a:r>
+              <a:rPr>
+                <a:solidFill>
+                  <a:srgbClr val="003B4F"/>
+                </a:solidFill>
+                <a:latin typeface="Courier"/>
+              </a:rPr>
+              <a:t>:</a:t>
             </a:r>
             <a:br/>
             <a:r>
               <a:rPr>
                 <a:solidFill>
+                  <a:srgbClr val="657422"/>
+                </a:solidFill>
+                <a:latin typeface="Courier"/>
+              </a:rPr>
+              <a:t>  </a:t>
+            </a:r>
+            <a:r>
+              <a:rPr>
+                <a:solidFill>
                   <a:srgbClr val="4758AB"/>
                 </a:solidFill>
                 <a:latin typeface="Courier"/>
               </a:rPr>
-              <a:t>title </a:t>
+              <a:t>html</a:t>
             </a:r>
             <a:r>
               <a:rPr>
@@ -7777,6 +7941,7 @@
               </a:rPr>
               <a:t>:</a:t>
             </a:r>
+            <a:br/>
             <a:r>
               <a:rPr>
                 <a:solidFill>
@@ -7784,26 +7949,53 @@
                 </a:solidFill>
                 <a:latin typeface="Courier"/>
               </a:rPr>
-              <a:t> </a:t>
-            </a:r>
-            <a:r>
-              <a:rPr>
-                <a:solidFill>
-                  <a:srgbClr val="20794D"/>
-                </a:solidFill>
-                <a:latin typeface="Courier"/>
-              </a:rPr>
-              <a:t>"Hello, Quarto"</a:t>
+              <a:t>    </a:t>
+            </a:r>
+            <a:r>
+              <a:rPr>
+                <a:solidFill>
+                  <a:srgbClr val="4758AB"/>
+                </a:solidFill>
+                <a:latin typeface="Courier"/>
+              </a:rPr>
+              <a:t>theme</a:t>
+            </a:r>
+            <a:r>
+              <a:rPr>
+                <a:solidFill>
+                  <a:srgbClr val="003B4F"/>
+                </a:solidFill>
+                <a:latin typeface="Courier"/>
+              </a:rPr>
+              <a:t>:</a:t>
+            </a:r>
+            <a:r>
+              <a:rPr>
+                <a:solidFill>
+                  <a:srgbClr val="657422"/>
+                </a:solidFill>
+                <a:latin typeface="Courier"/>
+              </a:rPr>
+              <a:t> pulse</a:t>
             </a:r>
             <a:br/>
             <a:r>
               <a:rPr>
                 <a:solidFill>
+                  <a:srgbClr val="657422"/>
+                </a:solidFill>
+                <a:latin typeface="Courier"/>
+              </a:rPr>
+              <a:t>  </a:t>
+            </a:r>
+            <a:r>
+              <a:rPr>
+                <a:solidFill>
                   <a:srgbClr val="4758AB"/>
                 </a:solidFill>
                 <a:latin typeface="Courier"/>
               </a:rPr>
-              <a:t>author</a:t>
+              <a:t>pdf</a:t>
             </a:r>
             <a:r>
               <a:rPr>
@@ -7814,6 +8006,7 @@
               </a:rPr>
               <a:t>:</a:t>
             </a:r>
+            <a:br/>
             <a:r>
               <a:rPr>
                 <a:solidFill>
@@ -7821,18 +8014,8 @@
                 </a:solidFill>
                 <a:latin typeface="Courier"/>
               </a:rPr>
-              <a:t> </a:t>
-            </a:r>
-            <a:r>
-              <a:rPr>
-                <a:solidFill>
-                  <a:srgbClr val="20794D"/>
-                </a:solidFill>
-                <a:latin typeface="Courier"/>
-              </a:rPr>
-              <a:t>"otus.ru"</a:t>
-            </a:r>
-            <a:br/>
+              <a:t>    </a:t>
+            </a:r>
             <a:r>
               <a:rPr>
                 <a:solidFill>
@@ -7840,7 +8023,7 @@
                 </a:solidFill>
                 <a:latin typeface="Courier"/>
               </a:rPr>
-              <a:t>date  </a:t>
+              <a:t>fig-format</a:t>
             </a:r>
             <a:r>
               <a:rPr>
@@ -7858,138 +8041,25 @@
                 </a:solidFill>
                 <a:latin typeface="Courier"/>
               </a:rPr>
-              <a:t> 2023-06-13</a:t>
-            </a:r>
-            <a:br/>
-            <a:r>
-              <a:rPr>
-                <a:solidFill>
-                  <a:srgbClr val="4758AB"/>
-                </a:solidFill>
-                <a:latin typeface="Courier"/>
-              </a:rPr>
-              <a:t>format</a:t>
-            </a:r>
-            <a:r>
-              <a:rPr>
-                <a:solidFill>
-                  <a:srgbClr val="003B4F"/>
-                </a:solidFill>
-                <a:latin typeface="Courier"/>
-              </a:rPr>
-              <a:t>:</a:t>
-            </a:r>
-            <a:br/>
-            <a:r>
-              <a:rPr>
-                <a:solidFill>
-                  <a:srgbClr val="657422"/>
-                </a:solidFill>
-                <a:latin typeface="Courier"/>
-              </a:rPr>
-              <a:t>  </a:t>
-            </a:r>
-            <a:r>
-              <a:rPr>
-                <a:solidFill>
-                  <a:srgbClr val="4758AB"/>
-                </a:solidFill>
-                <a:latin typeface="Courier"/>
-              </a:rPr>
-              <a:t>pptx</a:t>
-            </a:r>
-            <a:r>
-              <a:rPr>
-                <a:solidFill>
-                  <a:srgbClr val="003B4F"/>
-                </a:solidFill>
-                <a:latin typeface="Courier"/>
-              </a:rPr>
-              <a:t>:</a:t>
-            </a:r>
-            <a:br/>
-            <a:r>
-              <a:rPr>
-                <a:solidFill>
-                  <a:srgbClr val="657422"/>
-                </a:solidFill>
-                <a:latin typeface="Courier"/>
-              </a:rPr>
-              <a:t>    </a:t>
-            </a:r>
-            <a:r>
-              <a:rPr>
-                <a:solidFill>
-                  <a:srgbClr val="4758AB"/>
-                </a:solidFill>
-                <a:latin typeface="Courier"/>
-              </a:rPr>
-              <a:t>reference-doc</a:t>
-            </a:r>
-            <a:r>
-              <a:rPr>
-                <a:solidFill>
-                  <a:srgbClr val="003B4F"/>
-                </a:solidFill>
-                <a:latin typeface="Courier"/>
-              </a:rPr>
-              <a:t>:</a:t>
-            </a:r>
-            <a:r>
-              <a:rPr>
-                <a:solidFill>
-                  <a:srgbClr val="657422"/>
-                </a:solidFill>
-                <a:latin typeface="Courier"/>
-              </a:rPr>
-              <a:t> ../templates/template.pptx</a:t>
-            </a:r>
-            <a:br/>
-            <a:r>
-              <a:rPr>
-                <a:solidFill>
-                  <a:srgbClr val="657422"/>
-                </a:solidFill>
-                <a:latin typeface="Courier"/>
-              </a:rPr>
-              <a:t>    </a:t>
-            </a:r>
-            <a:r>
-              <a:rPr>
-                <a:solidFill>
-                  <a:srgbClr val="4758AB"/>
-                </a:solidFill>
-                <a:latin typeface="Courier"/>
-              </a:rPr>
-              <a:t>mermaid-format</a:t>
-            </a:r>
-            <a:r>
-              <a:rPr>
-                <a:solidFill>
-                  <a:srgbClr val="003B4F"/>
-                </a:solidFill>
-                <a:latin typeface="Courier"/>
-              </a:rPr>
-              <a:t>:</a:t>
-            </a:r>
-            <a:r>
-              <a:rPr>
-                <a:solidFill>
-                  <a:srgbClr val="657422"/>
-                </a:solidFill>
-                <a:latin typeface="Courier"/>
-              </a:rPr>
               <a:t> png</a:t>
             </a:r>
-            <a:br/>
-            <a:r>
-              <a:rPr>
-                <a:solidFill>
-                  <a:srgbClr val="AD0000"/>
-                </a:solidFill>
-                <a:latin typeface="Courier"/>
-              </a:rPr>
-              <a:t>---</a:t>
+          </a:p>
+          <a:p>
+            <a:pPr lvl="0" indent="0" marL="1270000">
+              <a:buNone/>
+            </a:pPr>
+            <a:r>
+              <a:rPr sz="2000" b="1"/>
+              <a:t>Note</a:t>
+            </a:r>
+          </a:p>
+          <a:p>
+            <a:pPr lvl="0" indent="0" marL="1270000">
+              <a:buNone/>
+            </a:pPr>
+            <a:r>
+              <a:rPr sz="2000"/>
+              <a:t>Только формат HTML позволяет создавать интерактивные документы.</a:t>
             </a:r>
           </a:p>
         </p:txBody>
@@ -7999,7 +8069,377 @@
 </p:sld>
 </file>
 
-<file path=ppt/slides/slide22.xml><?xml version="1.0" encoding="utf-8"?>
+<file path=ppt/slides/slide23.xml><?xml version="1.0" encoding="utf-8"?>
+<p:sld xmlns:a="http://schemas.openxmlformats.org/drawingml/2006/main" xmlns:r="http://schemas.openxmlformats.org/officeDocument/2006/relationships" xmlns:p="http://schemas.openxmlformats.org/presentationml/2006/main">
+  <p:cSld>
+    <p:spTree>
+      <p:nvGrpSpPr>
+        <p:cNvPr id="1" name=""/>
+        <p:cNvGrpSpPr/>
+        <p:nvPr/>
+      </p:nvGrpSpPr>
+      <p:grpSpPr>
+        <a:xfrm>
+          <a:off x="0" y="0"/>
+          <a:ext cx="0" cy="0"/>
+          <a:chOff x="0" y="0"/>
+          <a:chExt cx="0" cy="0"/>
+        </a:xfrm>
+      </p:grpSpPr>
+      <p:sp>
+        <p:nvSpPr>
+          <p:cNvPr id="2" name="Title 1"/>
+          <p:cNvSpPr>
+            <a:spLocks noGrp="1"/>
+          </p:cNvSpPr>
+          <p:nvPr>
+            <p:ph type="title"/>
+          </p:nvPr>
+        </p:nvSpPr>
+        <p:spPr/>
+        <p:txBody>
+          <a:bodyPr/>
+          <a:lstStyle/>
+          <a:p>
+            <a:pPr lvl="0" indent="0" marL="0">
+              <a:buNone/>
+            </a:pPr>
+            <a:r>
+              <a:rPr/>
+              <a:t>YAML-заголовки (1 из 2)</a:t>
+            </a:r>
+          </a:p>
+        </p:txBody>
+      </p:sp>
+      <p:sp>
+        <p:nvSpPr>
+          <p:cNvPr id="3" name="Content Placeholder 2"/>
+          <p:cNvSpPr>
+            <a:spLocks noGrp="1"/>
+          </p:cNvSpPr>
+          <p:nvPr>
+            <p:ph idx="1"/>
+          </p:nvPr>
+        </p:nvSpPr>
+        <p:spPr/>
+        <p:txBody>
+          <a:bodyPr/>
+          <a:lstStyle/>
+          <a:p>
+            <a:pPr lvl="0" indent="0" marL="0">
+              <a:buNone/>
+            </a:pPr>
+            <a:r>
+              <a:rPr/>
+              <a:t>YAML («</a:t>
+            </a:r>
+            <a:r>
+              <a:rPr b="1"/>
+              <a:t>Y</a:t>
+            </a:r>
+            <a:r>
+              <a:rPr/>
+              <a:t>AML </a:t>
+            </a:r>
+            <a:r>
+              <a:rPr b="1"/>
+              <a:t>A</a:t>
+            </a:r>
+            <a:r>
+              <a:rPr/>
+              <a:t>in’t </a:t>
+            </a:r>
+            <a:r>
+              <a:rPr b="1"/>
+              <a:t>M</a:t>
+            </a:r>
+            <a:r>
+              <a:rPr/>
+              <a:t>arkup </a:t>
+            </a:r>
+            <a:r>
+              <a:rPr b="1"/>
+              <a:t>L</a:t>
+            </a:r>
+            <a:r>
+              <a:rPr/>
+              <a:t>anguage») – язык сериализации данных, как JSON и XML. Используется Quarto для записи конфигурации проекта (как в R и Julia). Формат записи – </a:t>
+            </a:r>
+            <a:r>
+              <a:rPr>
+                <a:latin typeface="Courier"/>
+              </a:rPr>
+              <a:t>опция: значение</a:t>
+            </a:r>
+            <a:r>
+              <a:rPr/>
+              <a:t>.</a:t>
+            </a:r>
+          </a:p>
+          <a:p>
+            <a:pPr lvl="0" indent="0" marL="0">
+              <a:buNone/>
+            </a:pPr>
+            <a:r>
+              <a:rPr/>
+              <a:t>Код конфигурации YAML отделяется тремя дефисами сверху и снизу:</a:t>
+            </a:r>
+          </a:p>
+          <a:p>
+            <a:pPr lvl="0" indent="0">
+              <a:buNone/>
+            </a:pPr>
+            <a:r>
+              <a:rPr>
+                <a:solidFill>
+                  <a:srgbClr val="AD0000"/>
+                </a:solidFill>
+                <a:latin typeface="Courier"/>
+              </a:rPr>
+              <a:t>---</a:t>
+            </a:r>
+            <a:br/>
+            <a:r>
+              <a:rPr>
+                <a:solidFill>
+                  <a:srgbClr val="4758AB"/>
+                </a:solidFill>
+                <a:latin typeface="Courier"/>
+              </a:rPr>
+              <a:t>title </a:t>
+            </a:r>
+            <a:r>
+              <a:rPr>
+                <a:solidFill>
+                  <a:srgbClr val="003B4F"/>
+                </a:solidFill>
+                <a:latin typeface="Courier"/>
+              </a:rPr>
+              <a:t>:</a:t>
+            </a:r>
+            <a:r>
+              <a:rPr>
+                <a:solidFill>
+                  <a:srgbClr val="657422"/>
+                </a:solidFill>
+                <a:latin typeface="Courier"/>
+              </a:rPr>
+              <a:t> </a:t>
+            </a:r>
+            <a:r>
+              <a:rPr>
+                <a:solidFill>
+                  <a:srgbClr val="20794D"/>
+                </a:solidFill>
+                <a:latin typeface="Courier"/>
+              </a:rPr>
+              <a:t>"Hello, Quarto"</a:t>
+            </a:r>
+            <a:br/>
+            <a:r>
+              <a:rPr>
+                <a:solidFill>
+                  <a:srgbClr val="4758AB"/>
+                </a:solidFill>
+                <a:latin typeface="Courier"/>
+              </a:rPr>
+              <a:t>author</a:t>
+            </a:r>
+            <a:r>
+              <a:rPr>
+                <a:solidFill>
+                  <a:srgbClr val="003B4F"/>
+                </a:solidFill>
+                <a:latin typeface="Courier"/>
+              </a:rPr>
+              <a:t>:</a:t>
+            </a:r>
+            <a:r>
+              <a:rPr>
+                <a:solidFill>
+                  <a:srgbClr val="657422"/>
+                </a:solidFill>
+                <a:latin typeface="Courier"/>
+              </a:rPr>
+              <a:t> </a:t>
+            </a:r>
+            <a:r>
+              <a:rPr>
+                <a:solidFill>
+                  <a:srgbClr val="20794D"/>
+                </a:solidFill>
+                <a:latin typeface="Courier"/>
+              </a:rPr>
+              <a:t>"otus.ru"</a:t>
+            </a:r>
+            <a:br/>
+            <a:r>
+              <a:rPr>
+                <a:solidFill>
+                  <a:srgbClr val="4758AB"/>
+                </a:solidFill>
+                <a:latin typeface="Courier"/>
+              </a:rPr>
+              <a:t>date  </a:t>
+            </a:r>
+            <a:r>
+              <a:rPr>
+                <a:solidFill>
+                  <a:srgbClr val="003B4F"/>
+                </a:solidFill>
+                <a:latin typeface="Courier"/>
+              </a:rPr>
+              <a:t>:</a:t>
+            </a:r>
+            <a:r>
+              <a:rPr>
+                <a:solidFill>
+                  <a:srgbClr val="657422"/>
+                </a:solidFill>
+                <a:latin typeface="Courier"/>
+              </a:rPr>
+              <a:t> 2023-06-13</a:t>
+            </a:r>
+            <a:br/>
+            <a:r>
+              <a:rPr>
+                <a:solidFill>
+                  <a:srgbClr val="4758AB"/>
+                </a:solidFill>
+                <a:latin typeface="Courier"/>
+              </a:rPr>
+              <a:t>format</a:t>
+            </a:r>
+            <a:r>
+              <a:rPr>
+                <a:solidFill>
+                  <a:srgbClr val="003B4F"/>
+                </a:solidFill>
+                <a:latin typeface="Courier"/>
+              </a:rPr>
+              <a:t>:</a:t>
+            </a:r>
+            <a:br/>
+            <a:r>
+              <a:rPr>
+                <a:solidFill>
+                  <a:srgbClr val="657422"/>
+                </a:solidFill>
+                <a:latin typeface="Courier"/>
+              </a:rPr>
+              <a:t>  </a:t>
+            </a:r>
+            <a:r>
+              <a:rPr>
+                <a:solidFill>
+                  <a:srgbClr val="4758AB"/>
+                </a:solidFill>
+                <a:latin typeface="Courier"/>
+              </a:rPr>
+              <a:t>pptx</a:t>
+            </a:r>
+            <a:r>
+              <a:rPr>
+                <a:solidFill>
+                  <a:srgbClr val="003B4F"/>
+                </a:solidFill>
+                <a:latin typeface="Courier"/>
+              </a:rPr>
+              <a:t>:</a:t>
+            </a:r>
+            <a:br/>
+            <a:r>
+              <a:rPr>
+                <a:solidFill>
+                  <a:srgbClr val="657422"/>
+                </a:solidFill>
+                <a:latin typeface="Courier"/>
+              </a:rPr>
+              <a:t>    </a:t>
+            </a:r>
+            <a:r>
+              <a:rPr>
+                <a:solidFill>
+                  <a:srgbClr val="4758AB"/>
+                </a:solidFill>
+                <a:latin typeface="Courier"/>
+              </a:rPr>
+              <a:t>reference-doc</a:t>
+            </a:r>
+            <a:r>
+              <a:rPr>
+                <a:solidFill>
+                  <a:srgbClr val="003B4F"/>
+                </a:solidFill>
+                <a:latin typeface="Courier"/>
+              </a:rPr>
+              <a:t>:</a:t>
+            </a:r>
+            <a:r>
+              <a:rPr>
+                <a:solidFill>
+                  <a:srgbClr val="657422"/>
+                </a:solidFill>
+                <a:latin typeface="Courier"/>
+              </a:rPr>
+              <a:t> ../templates/template.pptx</a:t>
+            </a:r>
+            <a:br/>
+            <a:r>
+              <a:rPr>
+                <a:solidFill>
+                  <a:srgbClr val="657422"/>
+                </a:solidFill>
+                <a:latin typeface="Courier"/>
+              </a:rPr>
+              <a:t>    </a:t>
+            </a:r>
+            <a:r>
+              <a:rPr>
+                <a:solidFill>
+                  <a:srgbClr val="4758AB"/>
+                </a:solidFill>
+                <a:latin typeface="Courier"/>
+              </a:rPr>
+              <a:t>mermaid-format</a:t>
+            </a:r>
+            <a:r>
+              <a:rPr>
+                <a:solidFill>
+                  <a:srgbClr val="003B4F"/>
+                </a:solidFill>
+                <a:latin typeface="Courier"/>
+              </a:rPr>
+              <a:t>:</a:t>
+            </a:r>
+            <a:r>
+              <a:rPr>
+                <a:solidFill>
+                  <a:srgbClr val="657422"/>
+                </a:solidFill>
+                <a:latin typeface="Courier"/>
+              </a:rPr>
+              <a:t> png</a:t>
+            </a:r>
+            <a:br/>
+            <a:r>
+              <a:rPr>
+                <a:solidFill>
+                  <a:srgbClr val="AD0000"/>
+                </a:solidFill>
+                <a:latin typeface="Courier"/>
+              </a:rPr>
+              <a:t>---</a:t>
+            </a:r>
+          </a:p>
+        </p:txBody>
+      </p:sp>
+    </p:spTree>
+  </p:cSld>
+</p:sld>
+</file>
+
+<file path=ppt/slides/slide24.xml><?xml version="1.0" encoding="utf-8"?>
 <p:sld xmlns:a="http://schemas.openxmlformats.org/drawingml/2006/main" xmlns:r="http://schemas.openxmlformats.org/officeDocument/2006/relationships" xmlns:p="http://schemas.openxmlformats.org/presentationml/2006/main">
   <p:cSld>
     <p:spTree>
@@ -8245,232 +8685,6 @@
 </p:sld>
 </file>
 
-<file path=ppt/slides/slide23.xml><?xml version="1.0" encoding="utf-8"?>
-<p:sld xmlns:a="http://schemas.openxmlformats.org/drawingml/2006/main" xmlns:r="http://schemas.openxmlformats.org/officeDocument/2006/relationships" xmlns:p="http://schemas.openxmlformats.org/presentationml/2006/main">
-  <p:cSld>
-    <p:spTree>
-      <p:nvGrpSpPr>
-        <p:cNvPr id="1" name=""/>
-        <p:cNvGrpSpPr/>
-        <p:nvPr/>
-      </p:nvGrpSpPr>
-      <p:grpSpPr>
-        <a:xfrm>
-          <a:off x="0" y="0"/>
-          <a:ext cx="0" cy="0"/>
-          <a:chOff x="0" y="0"/>
-          <a:chExt cx="0" cy="0"/>
-        </a:xfrm>
-      </p:grpSpPr>
-      <p:sp>
-        <p:nvSpPr>
-          <p:cNvPr id="2" name="Title 1"/>
-          <p:cNvSpPr>
-            <a:spLocks noGrp="1"/>
-          </p:cNvSpPr>
-          <p:nvPr>
-            <p:ph type="title"/>
-          </p:nvPr>
-        </p:nvSpPr>
-        <p:spPr/>
-        <p:txBody>
-          <a:bodyPr/>
-          <a:lstStyle/>
-          <a:p>
-            <a:pPr lvl="0" indent="0" marL="0">
-              <a:buNone/>
-            </a:pPr>
-            <a:r>
-              <a:rPr/>
-              <a:t>Фрагменты кода</a:t>
-            </a:r>
-          </a:p>
-        </p:txBody>
-      </p:sp>
-      <p:sp>
-        <p:nvSpPr>
-          <p:cNvPr id="3" name="Content Placeholder 2"/>
-          <p:cNvSpPr>
-            <a:spLocks noGrp="1"/>
-          </p:cNvSpPr>
-          <p:nvPr>
-            <p:ph idx="1"/>
-          </p:nvPr>
-        </p:nvSpPr>
-        <p:spPr/>
-        <p:txBody>
-          <a:bodyPr/>
-          <a:lstStyle/>
-          <a:p>
-            <a:pPr lvl="0" indent="0" marL="0">
-              <a:buNone/>
-            </a:pPr>
-            <a:r>
-              <a:rPr/>
-              <a:t>Как и для Rmarkdown, возможность интерпретировать код и встраивать результаты его исполнения в документ является основной функциональной особенностью Quarto.</a:t>
-            </a:r>
-          </a:p>
-          <a:p>
-            <a:pPr lvl="0" indent="0" marL="0">
-              <a:buNone/>
-            </a:pPr>
-            <a:r>
-              <a:rPr/>
-              <a:t>В Quarto опции для отдельного фрагмента кода, если они нужны, записываются внутри блока в формате YAML и начинаются с </a:t>
-            </a:r>
-            <a:r>
-              <a:rPr>
-                <a:latin typeface="Courier"/>
-              </a:rPr>
-              <a:t>#|</a:t>
-            </a:r>
-            <a:r>
-              <a:rPr/>
-              <a:t>:</a:t>
-            </a:r>
-          </a:p>
-          <a:p>
-            <a:pPr lvl="0" indent="0">
-              <a:buNone/>
-            </a:pPr>
-            <a:r>
-              <a:rPr>
-                <a:solidFill>
-                  <a:srgbClr val="5E5E5E"/>
-                </a:solidFill>
-                <a:latin typeface="Courier"/>
-              </a:rPr>
-              <a:t>```{r}</a:t>
-            </a:r>
-            <a:br/>
-            <a:r>
-              <a:rPr>
-                <a:solidFill>
-                  <a:srgbClr val="5E5E5E"/>
-                </a:solidFill>
-                <a:latin typeface="Courier"/>
-              </a:rPr>
-              <a:t>#| label: load-packages</a:t>
-            </a:r>
-            <a:br/>
-            <a:r>
-              <a:rPr>
-                <a:solidFill>
-                  <a:srgbClr val="5E5E5E"/>
-                </a:solidFill>
-                <a:latin typeface="Courier"/>
-              </a:rPr>
-              <a:t>#| include: false</a:t>
-            </a:r>
-            <a:br/>
-            <a:br/>
-            <a:r>
-              <a:rPr>
-                <a:solidFill>
-                  <a:srgbClr val="4758AB"/>
-                </a:solidFill>
-                <a:latin typeface="Courier"/>
-              </a:rPr>
-              <a:t>library</a:t>
-            </a:r>
-            <a:r>
-              <a:rPr>
-                <a:solidFill>
-                  <a:srgbClr val="003B4F"/>
-                </a:solidFill>
-                <a:latin typeface="Courier"/>
-              </a:rPr>
-              <a:t>(tidyverse)</a:t>
-            </a:r>
-            <a:br/>
-            <a:r>
-              <a:rPr>
-                <a:solidFill>
-                  <a:srgbClr val="4758AB"/>
-                </a:solidFill>
-                <a:latin typeface="Courier"/>
-              </a:rPr>
-              <a:t>library</a:t>
-            </a:r>
-            <a:r>
-              <a:rPr>
-                <a:solidFill>
-                  <a:srgbClr val="003B4F"/>
-                </a:solidFill>
-                <a:latin typeface="Courier"/>
-              </a:rPr>
-              <a:t>(tidymodels)</a:t>
-            </a:r>
-            <a:br/>
-            <a:r>
-              <a:rPr>
-                <a:solidFill>
-                  <a:srgbClr val="5E5E5E"/>
-                </a:solidFill>
-                <a:latin typeface="Courier"/>
-              </a:rPr>
-              <a:t>```</a:t>
-            </a:r>
-          </a:p>
-        </p:txBody>
-      </p:sp>
-    </p:spTree>
-  </p:cSld>
-</p:sld>
-</file>
-
-<file path=ppt/slides/slide24.xml><?xml version="1.0" encoding="utf-8"?>
-<p:sld xmlns:a="http://schemas.openxmlformats.org/drawingml/2006/main" xmlns:r="http://schemas.openxmlformats.org/officeDocument/2006/relationships" xmlns:p="http://schemas.openxmlformats.org/presentationml/2006/main">
-  <p:cSld>
-    <p:spTree>
-      <p:nvGrpSpPr>
-        <p:cNvPr id="1" name=""/>
-        <p:cNvGrpSpPr/>
-        <p:nvPr/>
-      </p:nvGrpSpPr>
-      <p:grpSpPr>
-        <a:xfrm>
-          <a:off x="0" y="0"/>
-          <a:ext cx="0" cy="0"/>
-          <a:chOff x="0" y="0"/>
-          <a:chExt cx="0" cy="0"/>
-        </a:xfrm>
-      </p:grpSpPr>
-      <p:sp>
-        <p:nvSpPr>
-          <p:cNvPr id="2" name="Title 1"/>
-          <p:cNvSpPr>
-            <a:spLocks noGrp="1"/>
-          </p:cNvSpPr>
-          <p:nvPr>
-            <p:ph type="title"/>
-          </p:nvPr>
-        </p:nvSpPr>
-        <p:spPr>
-          <a:xfrm>
-            <a:off x="722313" y="3305176"/>
-            <a:ext cx="7772400" cy="1021556"/>
-          </a:xfrm>
-        </p:spPr>
-        <p:txBody>
-          <a:bodyPr/>
-          <a:lstStyle/>
-          <a:p>
-            <a:pPr lvl="0" indent="0" marL="0">
-              <a:buNone/>
-            </a:pPr>
-            <a:r>
-              <a:rPr/>
-              <a:t>Пример проекта: статья + интерактивное приложение</a:t>
-            </a:r>
-          </a:p>
-        </p:txBody>
-      </p:sp>
-    </p:spTree>
-  </p:cSld>
-</p:sld>
-</file>
-
 <file path=ppt/slides/slide25.xml><?xml version="1.0" encoding="utf-8"?>
 <p:sld xmlns:a="http://schemas.openxmlformats.org/drawingml/2006/main" xmlns:r="http://schemas.openxmlformats.org/officeDocument/2006/relationships" xmlns:p="http://schemas.openxmlformats.org/presentationml/2006/main">
   <p:cSld>
@@ -8508,7 +8722,7 @@
             </a:pPr>
             <a:r>
               <a:rPr/>
-              <a:t>Code</a:t>
+              <a:t>Фрагменты кода</a:t>
             </a:r>
           </a:p>
         </p:txBody>
@@ -8533,15 +8747,26 @@
             </a:pPr>
             <a:r>
               <a:rPr/>
-              <a:t>When you click the </a:t>
-            </a:r>
-            <a:r>
-              <a:rPr b="1"/>
-              <a:t>Render</a:t>
-            </a:r>
+              <a:t>Как и для Rmarkdown, возможность интерпретировать код и встраивать результаты его исполнения в документ является основной функциональной особенностью Quarto.</a:t>
+            </a:r>
+          </a:p>
+          <a:p>
+            <a:pPr lvl="0" indent="0" marL="0">
+              <a:buNone/>
+            </a:pPr>
             <a:r>
               <a:rPr/>
-              <a:t> button a presentation will be generated that includes both content and the output of embedded code. You can embed code like this:</a:t>
+              <a:t>В Quarto опции для отдельного фрагмента кода, если они нужны, записываются внутри блока в формате YAML и начинаются с </a:t>
+            </a:r>
+            <a:r>
+              <a:rPr>
+                <a:latin typeface="Courier"/>
+              </a:rPr>
+              <a:t>#|</a:t>
+            </a:r>
+            <a:r>
+              <a:rPr/>
+              <a:t>:</a:t>
             </a:r>
           </a:p>
           <a:p>
@@ -8550,9 +8775,81 @@
             </a:pPr>
             <a:r>
               <a:rPr>
-                <a:latin typeface="Courier"/>
-              </a:rPr>
-              <a:t>[1] 2</a:t>
+                <a:solidFill>
+                  <a:srgbClr val="5E5E5E"/>
+                </a:solidFill>
+                <a:latin typeface="Courier"/>
+              </a:rPr>
+              <a:t>```{r}</a:t>
+            </a:r>
+            <a:br/>
+            <a:r>
+              <a:rPr>
+                <a:solidFill>
+                  <a:srgbClr val="5E5E5E"/>
+                </a:solidFill>
+                <a:latin typeface="Courier"/>
+              </a:rPr>
+              <a:t>#| label: load-packages</a:t>
+            </a:r>
+            <a:br/>
+            <a:r>
+              <a:rPr>
+                <a:solidFill>
+                  <a:srgbClr val="5E5E5E"/>
+                </a:solidFill>
+                <a:latin typeface="Courier"/>
+              </a:rPr>
+              <a:t>#| include: false</a:t>
+            </a:r>
+            <a:br/>
+            <a:br/>
+            <a:r>
+              <a:rPr>
+                <a:solidFill>
+                  <a:srgbClr val="4758AB"/>
+                </a:solidFill>
+                <a:latin typeface="Courier"/>
+              </a:rPr>
+              <a:t>library</a:t>
+            </a:r>
+            <a:r>
+              <a:rPr>
+                <a:solidFill>
+                  <a:srgbClr val="003B4F"/>
+                </a:solidFill>
+                <a:latin typeface="Courier"/>
+              </a:rPr>
+              <a:t>(tidyverse)</a:t>
+            </a:r>
+            <a:br/>
+            <a:r>
+              <a:rPr>
+                <a:solidFill>
+                  <a:srgbClr val="4758AB"/>
+                </a:solidFill>
+                <a:latin typeface="Courier"/>
+              </a:rPr>
+              <a:t>library</a:t>
+            </a:r>
+            <a:r>
+              <a:rPr>
+                <a:solidFill>
+                  <a:srgbClr val="003B4F"/>
+                </a:solidFill>
+                <a:latin typeface="Courier"/>
+              </a:rPr>
+              <a:t>(tidymodels)</a:t>
+            </a:r>
+            <a:br/>
+            <a:r>
+              <a:rPr>
+                <a:solidFill>
+                  <a:srgbClr val="5E5E5E"/>
+                </a:solidFill>
+                <a:latin typeface="Courier"/>
+              </a:rPr>
+              <a:t>```</a:t>
             </a:r>
           </a:p>
         </p:txBody>
@@ -8579,6 +8876,990 @@
           <a:chExt cx="0" cy="0"/>
         </a:xfrm>
       </p:grpSpPr>
+      <p:sp>
+        <p:nvSpPr>
+          <p:cNvPr id="2" name="Title 1"/>
+          <p:cNvSpPr>
+            <a:spLocks noGrp="1"/>
+          </p:cNvSpPr>
+          <p:nvPr>
+            <p:ph type="title"/>
+          </p:nvPr>
+        </p:nvSpPr>
+        <p:spPr/>
+        <p:txBody>
+          <a:bodyPr/>
+          <a:lstStyle/>
+          <a:p>
+            <a:pPr lvl="0" indent="0" marL="0">
+              <a:buNone/>
+            </a:pPr>
+            <a:r>
+              <a:rPr/>
+              <a:t>Контейнеры pandoc</a:t>
+            </a:r>
+          </a:p>
+        </p:txBody>
+      </p:sp>
+      <p:sp>
+        <p:nvSpPr>
+          <p:cNvPr id="3" name="Content Placeholder 2"/>
+          <p:cNvSpPr>
+            <a:spLocks noGrp="1"/>
+          </p:cNvSpPr>
+          <p:nvPr>
+            <p:ph idx="1"/>
+          </p:nvPr>
+        </p:nvSpPr>
+        <p:spPr/>
+        <p:txBody>
+          <a:bodyPr/>
+          <a:lstStyle/>
+          <a:p>
+            <a:pPr lvl="0" indent="0" marL="0">
+              <a:buNone/>
+            </a:pPr>
+            <a:r>
+              <a:rPr/>
+              <a:t>При работе в Quarto рекомендуется использовать универсальный формат контейнеров </a:t>
+            </a:r>
+            <a:r>
+              <a:rPr>
+                <a:latin typeface="Courier"/>
+              </a:rPr>
+              <a:t>pandoc</a:t>
+            </a:r>
+          </a:p>
+          <a:p>
+            <a:pPr lvl="0" indent="-342900" marL="342900">
+              <a:buAutoNum type="arabicPeriod"/>
+            </a:pPr>
+            <a:r>
+              <a:rPr/>
+              <a:t>Блочный контейнер – аналог </a:t>
+            </a:r>
+            <a:r>
+              <a:rPr>
+                <a:latin typeface="Courier"/>
+              </a:rPr>
+              <a:t>&lt;div&gt;</a:t>
+            </a:r>
+            <a:r>
+              <a:rPr/>
+              <a:t> ограничивается двоеточиями (не менее 3) с опциональными атрибутами в фигурных скобках:</a:t>
+            </a:r>
+          </a:p>
+          <a:p>
+            <a:pPr lvl="0" indent="0">
+              <a:buNone/>
+            </a:pPr>
+            <a:r>
+              <a:rPr>
+                <a:solidFill>
+                  <a:srgbClr val="003B4F"/>
+                </a:solidFill>
+                <a:latin typeface="Courier"/>
+              </a:rPr>
+              <a:t>::: {.border}</a:t>
+            </a:r>
+            <a:br/>
+            <a:r>
+              <a:rPr>
+                <a:solidFill>
+                  <a:srgbClr val="003B4F"/>
+                </a:solidFill>
+                <a:latin typeface="Courier"/>
+              </a:rPr>
+              <a:t>Этот текст будет окружен прямоугольной рамкой</a:t>
+            </a:r>
+            <a:br/>
+            <a:r>
+              <a:rPr>
+                <a:solidFill>
+                  <a:srgbClr val="003B4F"/>
+                </a:solidFill>
+                <a:latin typeface="Courier"/>
+              </a:rPr>
+              <a:t>:::</a:t>
+            </a:r>
+            <a:br/>
+            <a:br/>
+            <a:r>
+              <a:rPr>
+                <a:solidFill>
+                  <a:srgbClr val="003B4F"/>
+                </a:solidFill>
+                <a:latin typeface="Courier"/>
+              </a:rPr>
+              <a:t>::: {.callout-note}</a:t>
+            </a:r>
+            <a:br/>
+            <a:r>
+              <a:rPr>
+                <a:solidFill>
+                  <a:srgbClr val="003B4F"/>
+                </a:solidFill>
+                <a:latin typeface="Courier"/>
+              </a:rPr>
+              <a:t>А это будет примечание</a:t>
+            </a:r>
+            <a:br/>
+            <a:r>
+              <a:rPr>
+                <a:solidFill>
+                  <a:srgbClr val="003B4F"/>
+                </a:solidFill>
+                <a:latin typeface="Courier"/>
+              </a:rPr>
+              <a:t>:::</a:t>
+            </a:r>
+          </a:p>
+          <a:p>
+            <a:pPr lvl="0" indent="-342900" marL="342900">
+              <a:buAutoNum startAt="2" type="arabicPeriod"/>
+            </a:pPr>
+            <a:r>
+              <a:rPr/>
+              <a:t>Строчный контейнер – аналог </a:t>
+            </a:r>
+            <a:r>
+              <a:rPr>
+                <a:latin typeface="Courier"/>
+              </a:rPr>
+              <a:t>&lt;span&gt;</a:t>
+            </a:r>
+            <a:r>
+              <a:rPr/>
+              <a:t> записывается в квадартных скобках, за которыми следуют атрибуты в фигурных скобках:</a:t>
+            </a:r>
+          </a:p>
+          <a:p>
+            <a:pPr lvl="0" indent="0">
+              <a:buNone/>
+            </a:pPr>
+            <a:r>
+              <a:rPr>
+                <a:solidFill>
+                  <a:srgbClr val="5E5E5E"/>
+                </a:solidFill>
+                <a:latin typeface="Courier"/>
+              </a:rPr>
+              <a:t>[</a:t>
+            </a:r>
+            <a:r>
+              <a:rPr>
+                <a:solidFill>
+                  <a:srgbClr val="003B4F"/>
+                </a:solidFill>
+                <a:latin typeface="Courier"/>
+              </a:rPr>
+              <a:t>Сначала id, потом класс, потом все остальное</a:t>
+            </a:r>
+            <a:r>
+              <a:rPr>
+                <a:solidFill>
+                  <a:srgbClr val="5E5E5E"/>
+                </a:solidFill>
+                <a:latin typeface="Courier"/>
+              </a:rPr>
+              <a:t>]</a:t>
+            </a:r>
+            <a:r>
+              <a:rPr>
+                <a:solidFill>
+                  <a:srgbClr val="003B4F"/>
+                </a:solidFill>
+                <a:latin typeface="Courier"/>
+              </a:rPr>
+              <a:t>{#id .class key1="val1" key2="val2"}</a:t>
+            </a:r>
+          </a:p>
+        </p:txBody>
+      </p:sp>
+    </p:spTree>
+  </p:cSld>
+  <p:timing>
+    <p:tnLst>
+      <p:par>
+        <p:cTn id="1" dur="indefinite" restart="never" nodeType="tmRoot">
+          <p:childTnLst>
+            <p:seq concurrent="1" nextAc="seek">
+              <p:cTn id="2" dur="indefinite" nodeType="mainSeq">
+                <p:childTnLst>
+                  <p:par>
+                    <p:cTn id="3" fill="hold">
+                      <p:stCondLst>
+                        <p:cond delay="indefinite"/>
+                      </p:stCondLst>
+                      <p:childTnLst>
+                        <p:par>
+                          <p:cTn id="4" fill="hold">
+                            <p:stCondLst>
+                              <p:cond delay="0"/>
+                            </p:stCondLst>
+                            <p:childTnLst>
+                              <p:par>
+                                <p:cTn id="5" presetID="1" presetClass="entr" presetSubtype="0" fill="hold" grpId="0" nodeType="clickEffect">
+                                  <p:stCondLst>
+                                    <p:cond delay="0"/>
+                                  </p:stCondLst>
+                                  <p:childTnLst>
+                                    <p:set>
+                                      <p:cBhvr>
+                                        <p:cTn id="6" dur="1" fill="hold">
+                                          <p:stCondLst>
+                                            <p:cond delay="0"/>
+                                          </p:stCondLst>
+                                        </p:cTn>
+                                        <p:tgtEl>
+                                          <p:spTgt spid="3">
+                                            <p:txEl>
+                                              <p:pRg st="1" end="1"/>
+                                            </p:txEl>
+                                          </p:spTgt>
+                                        </p:tgtEl>
+                                        <p:attrNameLst>
+                                          <p:attrName>style.visibility</p:attrName>
+                                        </p:attrNameLst>
+                                      </p:cBhvr>
+                                      <p:to>
+                                        <p:strVal val="visible"/>
+                                      </p:to>
+                                    </p:set>
+                                  </p:childTnLst>
+                                </p:cTn>
+                              </p:par>
+                            </p:childTnLst>
+                          </p:cTn>
+                        </p:par>
+                      </p:childTnLst>
+                    </p:cTn>
+                  </p:par>
+                  <p:par>
+                    <p:cTn id="7" fill="hold">
+                      <p:stCondLst>
+                        <p:cond delay="indefinite"/>
+                      </p:stCondLst>
+                      <p:childTnLst>
+                        <p:par>
+                          <p:cTn id="8" fill="hold">
+                            <p:stCondLst>
+                              <p:cond delay="0"/>
+                            </p:stCondLst>
+                            <p:childTnLst>
+                              <p:par>
+                                <p:cTn id="9" presetID="1" presetClass="entr" presetSubtype="0" fill="hold" grpId="0" nodeType="clickEffect">
+                                  <p:stCondLst>
+                                    <p:cond delay="0"/>
+                                  </p:stCondLst>
+                                  <p:childTnLst>
+                                    <p:set>
+                                      <p:cBhvr>
+                                        <p:cTn id="10" dur="1" fill="hold">
+                                          <p:stCondLst>
+                                            <p:cond delay="0"/>
+                                          </p:stCondLst>
+                                        </p:cTn>
+                                        <p:tgtEl>
+                                          <p:spTgt spid="3">
+                                            <p:txEl>
+                                              <p:pRg st="3" end="3"/>
+                                            </p:txEl>
+                                          </p:spTgt>
+                                        </p:tgtEl>
+                                        <p:attrNameLst>
+                                          <p:attrName>style.visibility</p:attrName>
+                                        </p:attrNameLst>
+                                      </p:cBhvr>
+                                      <p:to>
+                                        <p:strVal val="visible"/>
+                                      </p:to>
+                                    </p:set>
+                                  </p:childTnLst>
+                                </p:cTn>
+                              </p:par>
+                            </p:childTnLst>
+                          </p:cTn>
+                        </p:par>
+                      </p:childTnLst>
+                    </p:cTn>
+                  </p:par>
+                </p:childTnLst>
+              </p:cTn>
+              <p:prevCondLst>
+                <p:cond evt="onPrev" delay="0">
+                  <p:tgtEl>
+                    <p:sldTgt/>
+                  </p:tgtEl>
+                </p:cond>
+              </p:prevCondLst>
+              <p:nextCondLst>
+                <p:cond evt="onNext" delay="0">
+                  <p:tgtEl>
+                    <p:sldTgt/>
+                  </p:tgtEl>
+                </p:cond>
+              </p:nextCondLst>
+            </p:seq>
+          </p:childTnLst>
+        </p:cTn>
+      </p:par>
+    </p:tnLst>
+    <p:bldLst>
+      <p:bldP spid="3" grpId="0" uiExpand="1" build="p"/>
+    </p:bldLst>
+  </p:timing>
+</p:sld>
+</file>
+
+<file path=ppt/slides/slide27.xml><?xml version="1.0" encoding="utf-8"?>
+<p:sld xmlns:a="http://schemas.openxmlformats.org/drawingml/2006/main" xmlns:r="http://schemas.openxmlformats.org/officeDocument/2006/relationships" xmlns:p="http://schemas.openxmlformats.org/presentationml/2006/main">
+  <p:cSld>
+    <p:spTree>
+      <p:nvGrpSpPr>
+        <p:cNvPr id="1" name=""/>
+        <p:cNvGrpSpPr/>
+        <p:nvPr/>
+      </p:nvGrpSpPr>
+      <p:grpSpPr>
+        <a:xfrm>
+          <a:off x="0" y="0"/>
+          <a:ext cx="0" cy="0"/>
+          <a:chOff x="0" y="0"/>
+          <a:chExt cx="0" cy="0"/>
+        </a:xfrm>
+      </p:grpSpPr>
+      <p:sp>
+        <p:nvSpPr>
+          <p:cNvPr id="2" name="Title 1"/>
+          <p:cNvSpPr>
+            <a:spLocks noGrp="1"/>
+          </p:cNvSpPr>
+          <p:nvPr>
+            <p:ph type="title"/>
+          </p:nvPr>
+        </p:nvSpPr>
+        <p:spPr/>
+        <p:txBody>
+          <a:bodyPr/>
+          <a:lstStyle/>
+          <a:p>
+            <a:pPr lvl="0" indent="0" marL="0">
+              <a:buNone/>
+            </a:pPr>
+            <a:r>
+              <a:rPr/>
+              <a:t>Форматирование изображений (1 из 3)</a:t>
+            </a:r>
+          </a:p>
+        </p:txBody>
+      </p:sp>
+      <p:sp>
+        <p:nvSpPr>
+          <p:cNvPr id="3" name="Content Placeholder 2"/>
+          <p:cNvSpPr>
+            <a:spLocks noGrp="1"/>
+          </p:cNvSpPr>
+          <p:nvPr>
+            <p:ph idx="1"/>
+          </p:nvPr>
+        </p:nvSpPr>
+        <p:spPr/>
+        <p:txBody>
+          <a:bodyPr/>
+          <a:lstStyle/>
+          <a:p>
+            <a:pPr lvl="0" indent="0" marL="0">
+              <a:buNone/>
+            </a:pPr>
+            <a:r>
+              <a:rPr/>
+              <a:t>Синтаксис изображений похож на гиперссылки, но с восклицательным знаком в начале:</a:t>
+            </a:r>
+          </a:p>
+          <a:p>
+            <a:pPr lvl="0" indent="0">
+              <a:buNone/>
+            </a:pPr>
+            <a:r>
+              <a:rPr>
+                <a:solidFill>
+                  <a:srgbClr val="AD0000"/>
+                </a:solidFill>
+                <a:latin typeface="Courier"/>
+              </a:rPr>
+              <a:t>![Собачка](doge.png)</a:t>
+            </a:r>
+            <a:r>
+              <a:rPr>
+                <a:solidFill>
+                  <a:srgbClr val="003B4F"/>
+                </a:solidFill>
+                <a:latin typeface="Courier"/>
+              </a:rPr>
+              <a:t>{height=2cm}</a:t>
+            </a:r>
+          </a:p>
+          <a:p>
+            <a:pPr lvl="0" indent="0" marL="0">
+              <a:buNone/>
+            </a:pPr>
+            <a:r>
+              <a:rPr/>
+              <a:t>Можно добавлять атрибуты, например, выравнивание:</a:t>
+            </a:r>
+          </a:p>
+          <a:p>
+            <a:pPr lvl="0" indent="0">
+              <a:buNone/>
+            </a:pPr>
+            <a:r>
+              <a:rPr>
+                <a:solidFill>
+                  <a:srgbClr val="AD0000"/>
+                </a:solidFill>
+                <a:latin typeface="Courier"/>
+              </a:rPr>
+              <a:t>![Собачка](doge.png)</a:t>
+            </a:r>
+            <a:r>
+              <a:rPr>
+                <a:solidFill>
+                  <a:srgbClr val="003B4F"/>
+                </a:solidFill>
+                <a:latin typeface="Courier"/>
+              </a:rPr>
+              <a:t>{fig-align="left" fig-alt="Изображение собаки"}</a:t>
+            </a:r>
+          </a:p>
+          <a:p>
+            <a:pPr lvl="0" indent="0" marL="0">
+              <a:buNone/>
+            </a:pPr>
+            <a:r>
+              <a:rPr/>
+              <a:t>Надпись в квадратных скобках считается подписью к изображению. Ее можно оставить пустой.</a:t>
+            </a:r>
+          </a:p>
+        </p:txBody>
+      </p:sp>
+    </p:spTree>
+  </p:cSld>
+</p:sld>
+</file>
+
+<file path=ppt/slides/slide28.xml><?xml version="1.0" encoding="utf-8"?>
+<p:sld xmlns:a="http://schemas.openxmlformats.org/drawingml/2006/main" xmlns:r="http://schemas.openxmlformats.org/officeDocument/2006/relationships" xmlns:p="http://schemas.openxmlformats.org/presentationml/2006/main">
+  <p:cSld>
+    <p:spTree>
+      <p:nvGrpSpPr>
+        <p:cNvPr id="1" name=""/>
+        <p:cNvGrpSpPr/>
+        <p:nvPr/>
+      </p:nvGrpSpPr>
+      <p:grpSpPr>
+        <a:xfrm>
+          <a:off x="0" y="0"/>
+          <a:ext cx="0" cy="0"/>
+          <a:chOff x="0" y="0"/>
+          <a:chExt cx="0" cy="0"/>
+        </a:xfrm>
+      </p:grpSpPr>
+      <p:sp>
+        <p:nvSpPr>
+          <p:cNvPr id="2" name="Title 1"/>
+          <p:cNvSpPr>
+            <a:spLocks noGrp="1"/>
+          </p:cNvSpPr>
+          <p:nvPr>
+            <p:ph type="title"/>
+          </p:nvPr>
+        </p:nvSpPr>
+        <p:spPr/>
+        <p:txBody>
+          <a:bodyPr/>
+          <a:lstStyle/>
+          <a:p>
+            <a:pPr lvl="0" indent="0" marL="0">
+              <a:buNone/>
+            </a:pPr>
+            <a:r>
+              <a:rPr/>
+              <a:t>Форматирование изображений (2 из 3)</a:t>
+            </a:r>
+          </a:p>
+        </p:txBody>
+      </p:sp>
+      <p:sp>
+        <p:nvSpPr>
+          <p:cNvPr id="3" name="Content Placeholder 2"/>
+          <p:cNvSpPr>
+            <a:spLocks noGrp="1"/>
+          </p:cNvSpPr>
+          <p:nvPr>
+            <p:ph idx="1"/>
+          </p:nvPr>
+        </p:nvSpPr>
+        <p:spPr/>
+        <p:txBody>
+          <a:bodyPr/>
+          <a:lstStyle/>
+          <a:p>
+            <a:pPr lvl="0" indent="0" marL="0">
+              <a:buNone/>
+            </a:pPr>
+            <a:r>
+              <a:rPr/>
+              <a:t>Можно сгруппировать несколько изображений и расположить их определенным образом:</a:t>
+            </a:r>
+          </a:p>
+          <a:p>
+            <a:pPr lvl="0" indent="0">
+              <a:buNone/>
+            </a:pPr>
+            <a:r>
+              <a:rPr>
+                <a:solidFill>
+                  <a:srgbClr val="003B4F"/>
+                </a:solidFill>
+                <a:latin typeface="Courier"/>
+              </a:rPr>
+              <a:t>::: {#fig-two-triangles layout-ncol=2}</a:t>
+            </a:r>
+            <a:br/>
+            <a:br/>
+            <a:r>
+              <a:rPr>
+                <a:solidFill>
+                  <a:srgbClr val="AD0000"/>
+                </a:solidFill>
+                <a:latin typeface="Courier"/>
+              </a:rPr>
+              <a:t>![Первая картинка](tred.png)</a:t>
+            </a:r>
+            <a:r>
+              <a:rPr>
+                <a:solidFill>
+                  <a:srgbClr val="003B4F"/>
+                </a:solidFill>
+                <a:latin typeface="Courier"/>
+              </a:rPr>
+              <a:t>{#fig-triangle-red}</a:t>
+            </a:r>
+            <a:br/>
+            <a:br/>
+            <a:r>
+              <a:rPr>
+                <a:solidFill>
+                  <a:srgbClr val="AD0000"/>
+                </a:solidFill>
+                <a:latin typeface="Courier"/>
+              </a:rPr>
+              <a:t>![Вторая картинка](tblue.png)</a:t>
+            </a:r>
+            <a:r>
+              <a:rPr>
+                <a:solidFill>
+                  <a:srgbClr val="003B4F"/>
+                </a:solidFill>
+                <a:latin typeface="Courier"/>
+              </a:rPr>
+              <a:t>{#fig-triangle-blue}</a:t>
+            </a:r>
+            <a:br/>
+            <a:br/>
+            <a:r>
+              <a:rPr>
+                <a:solidFill>
+                  <a:srgbClr val="003B4F"/>
+                </a:solidFill>
+                <a:latin typeface="Courier"/>
+              </a:rPr>
+              <a:t>Две картинки</a:t>
+            </a:r>
+            <a:br/>
+            <a:r>
+              <a:rPr>
+                <a:solidFill>
+                  <a:srgbClr val="003B4F"/>
+                </a:solidFill>
+                <a:latin typeface="Courier"/>
+              </a:rPr>
+              <a:t>:::</a:t>
+            </a:r>
+          </a:p>
+          <a:p>
+            <a:pPr lvl="0" indent="0" marL="0">
+              <a:buNone/>
+            </a:pPr>
+            <a:r>
+              <a:rPr/>
+              <a:t>В качестве макета можно указать массив, каждый элемент которого – ряд в сетке. Отрицательные значения добавляют пространство между колонками:</a:t>
+            </a:r>
+          </a:p>
+          <a:p>
+            <a:pPr lvl="0" indent="0">
+              <a:buNone/>
+            </a:pPr>
+            <a:r>
+              <a:rPr>
+                <a:solidFill>
+                  <a:srgbClr val="003B4F"/>
+                </a:solidFill>
+                <a:latin typeface="Courier"/>
+              </a:rPr>
+              <a:t>::: {#fig-images layout="[</a:t>
+            </a:r>
+            <a:r>
+              <a:rPr>
+                <a:solidFill>
+                  <a:srgbClr val="5E5E5E"/>
+                </a:solidFill>
+                <a:latin typeface="Courier"/>
+              </a:rPr>
+              <a:t>[</a:t>
+            </a:r>
+            <a:r>
+              <a:rPr>
+                <a:solidFill>
+                  <a:srgbClr val="003B4F"/>
+                </a:solidFill>
+                <a:latin typeface="Courier"/>
+              </a:rPr>
+              <a:t>20,20</a:t>
+            </a:r>
+            <a:r>
+              <a:rPr>
+                <a:solidFill>
+                  <a:srgbClr val="5E5E5E"/>
+                </a:solidFill>
+                <a:latin typeface="Courier"/>
+              </a:rPr>
+              <a:t>]</a:t>
+            </a:r>
+            <a:r>
+              <a:rPr>
+                <a:solidFill>
+                  <a:srgbClr val="003B4F"/>
+                </a:solidFill>
+                <a:latin typeface="Courier"/>
+              </a:rPr>
+              <a:t>, </a:t>
+            </a:r>
+            <a:r>
+              <a:rPr>
+                <a:solidFill>
+                  <a:srgbClr val="5E5E5E"/>
+                </a:solidFill>
+                <a:latin typeface="Courier"/>
+              </a:rPr>
+              <a:t>[</a:t>
+            </a:r>
+            <a:r>
+              <a:rPr>
+                <a:solidFill>
+                  <a:srgbClr val="003B4F"/>
+                </a:solidFill>
+                <a:latin typeface="Courier"/>
+              </a:rPr>
+              <a:t>40</a:t>
+            </a:r>
+            <a:r>
+              <a:rPr>
+                <a:solidFill>
+                  <a:srgbClr val="5E5E5E"/>
+                </a:solidFill>
+                <a:latin typeface="Courier"/>
+              </a:rPr>
+              <a:t>]</a:t>
+            </a:r>
+            <a:r>
+              <a:rPr>
+                <a:solidFill>
+                  <a:srgbClr val="003B4F"/>
+                </a:solidFill>
+                <a:latin typeface="Courier"/>
+              </a:rPr>
+              <a:t>]"}</a:t>
+            </a:r>
+            <a:br/>
+            <a:br/>
+            <a:r>
+              <a:rPr>
+                <a:solidFill>
+                  <a:srgbClr val="AD0000"/>
+                </a:solidFill>
+                <a:latin typeface="Courier"/>
+              </a:rPr>
+              <a:t>![Первая картинка](image01.png)</a:t>
+            </a:r>
+            <a:r>
+              <a:rPr>
+                <a:solidFill>
+                  <a:srgbClr val="003B4F"/>
+                </a:solidFill>
+                <a:latin typeface="Courier"/>
+              </a:rPr>
+              <a:t>{#fig-01}</a:t>
+            </a:r>
+            <a:br/>
+            <a:br/>
+            <a:r>
+              <a:rPr>
+                <a:solidFill>
+                  <a:srgbClr val="AD0000"/>
+                </a:solidFill>
+                <a:latin typeface="Courier"/>
+              </a:rPr>
+              <a:t>![Вторая картинка](image02.png)</a:t>
+            </a:r>
+            <a:r>
+              <a:rPr>
+                <a:solidFill>
+                  <a:srgbClr val="003B4F"/>
+                </a:solidFill>
+                <a:latin typeface="Courier"/>
+              </a:rPr>
+              <a:t>{#fig-02}</a:t>
+            </a:r>
+            <a:br/>
+            <a:br/>
+            <a:r>
+              <a:rPr>
+                <a:solidFill>
+                  <a:srgbClr val="AD0000"/>
+                </a:solidFill>
+                <a:latin typeface="Courier"/>
+              </a:rPr>
+              <a:t>![Большая картинка](image03.png)</a:t>
+            </a:r>
+            <a:r>
+              <a:rPr>
+                <a:solidFill>
+                  <a:srgbClr val="003B4F"/>
+                </a:solidFill>
+                <a:latin typeface="Courier"/>
+              </a:rPr>
+              <a:t>{#fig-big}</a:t>
+            </a:r>
+            <a:br/>
+            <a:br/>
+            <a:r>
+              <a:rPr>
+                <a:solidFill>
+                  <a:srgbClr val="003B4F"/>
+                </a:solidFill>
+                <a:latin typeface="Courier"/>
+              </a:rPr>
+              <a:t>Три картинки: две маленькие и одна большая</a:t>
+            </a:r>
+            <a:br/>
+            <a:r>
+              <a:rPr>
+                <a:solidFill>
+                  <a:srgbClr val="003B4F"/>
+                </a:solidFill>
+                <a:latin typeface="Courier"/>
+              </a:rPr>
+              <a:t>:::</a:t>
+            </a:r>
+          </a:p>
+        </p:txBody>
+      </p:sp>
+    </p:spTree>
+  </p:cSld>
+</p:sld>
+</file>
+
+<file path=ppt/slides/slide29.xml><?xml version="1.0" encoding="utf-8"?>
+<p:sld xmlns:a="http://schemas.openxmlformats.org/drawingml/2006/main" xmlns:r="http://schemas.openxmlformats.org/officeDocument/2006/relationships" xmlns:p="http://schemas.openxmlformats.org/presentationml/2006/main">
+  <p:cSld>
+    <p:spTree>
+      <p:nvGrpSpPr>
+        <p:cNvPr id="1" name=""/>
+        <p:cNvGrpSpPr/>
+        <p:nvPr/>
+      </p:nvGrpSpPr>
+      <p:grpSpPr>
+        <a:xfrm>
+          <a:off x="0" y="0"/>
+          <a:ext cx="0" cy="0"/>
+          <a:chOff x="0" y="0"/>
+          <a:chExt cx="0" cy="0"/>
+        </a:xfrm>
+      </p:grpSpPr>
+      <p:sp>
+        <p:nvSpPr>
+          <p:cNvPr id="2" name="Title 1"/>
+          <p:cNvSpPr>
+            <a:spLocks noGrp="1"/>
+          </p:cNvSpPr>
+          <p:nvPr>
+            <p:ph type="title"/>
+          </p:nvPr>
+        </p:nvSpPr>
+        <p:spPr/>
+        <p:txBody>
+          <a:bodyPr/>
+          <a:lstStyle/>
+          <a:p>
+            <a:pPr lvl="0" indent="0" marL="0">
+              <a:buNone/>
+            </a:pPr>
+            <a:r>
+              <a:rPr/>
+              <a:t>Форматирование изображений (3 из 3)</a:t>
+            </a:r>
+          </a:p>
+        </p:txBody>
+      </p:sp>
+      <p:sp>
+        <p:nvSpPr>
+          <p:cNvPr id="3" name="Content Placeholder 2"/>
+          <p:cNvSpPr>
+            <a:spLocks noGrp="1"/>
+          </p:cNvSpPr>
+          <p:nvPr>
+            <p:ph idx="1"/>
+          </p:nvPr>
+        </p:nvSpPr>
+        <p:spPr/>
+        <p:txBody>
+          <a:bodyPr/>
+          <a:lstStyle/>
+          <a:p>
+            <a:pPr lvl="0" indent="0" marL="0">
+              <a:buNone/>
+            </a:pPr>
+            <a:r>
+              <a:rPr/>
+              <a:t>Для изображений, генерируемых кодом, параметры задают внутри блока:</a:t>
+            </a:r>
+          </a:p>
+          <a:p>
+            <a:pPr lvl="0" indent="0">
+              <a:buNone/>
+            </a:pPr>
+            <a:r>
+              <a:rPr>
+                <a:solidFill>
+                  <a:srgbClr val="5E5E5E"/>
+                </a:solidFill>
+                <a:latin typeface="Courier"/>
+              </a:rPr>
+              <a:t>```{r}</a:t>
+            </a:r>
+            <a:br/>
+            <a:r>
+              <a:rPr>
+                <a:solidFill>
+                  <a:srgbClr val="5E5E5E"/>
+                </a:solidFill>
+                <a:latin typeface="Courier"/>
+              </a:rPr>
+              <a:t>#| label: fig-two-plots</a:t>
+            </a:r>
+            <a:br/>
+            <a:r>
+              <a:rPr>
+                <a:solidFill>
+                  <a:srgbClr val="5E5E5E"/>
+                </a:solidFill>
+                <a:latin typeface="Courier"/>
+              </a:rPr>
+              <a:t>#| fig-cap: "Две диаграммы"</a:t>
+            </a:r>
+            <a:br/>
+            <a:r>
+              <a:rPr>
+                <a:solidFill>
+                  <a:srgbClr val="5E5E5E"/>
+                </a:solidFill>
+                <a:latin typeface="Courier"/>
+              </a:rPr>
+              <a:t>#| fig-subcap: </a:t>
+            </a:r>
+            <a:br/>
+            <a:r>
+              <a:rPr>
+                <a:solidFill>
+                  <a:srgbClr val="5E5E5E"/>
+                </a:solidFill>
+                <a:latin typeface="Courier"/>
+              </a:rPr>
+              <a:t>#|   - "Первая диаграмма"</a:t>
+            </a:r>
+            <a:br/>
+            <a:r>
+              <a:rPr>
+                <a:solidFill>
+                  <a:srgbClr val="5E5E5E"/>
+                </a:solidFill>
+                <a:latin typeface="Courier"/>
+              </a:rPr>
+              <a:t>#|   - "Вторая диаграмма"</a:t>
+            </a:r>
+            <a:br/>
+            <a:r>
+              <a:rPr>
+                <a:solidFill>
+                  <a:srgbClr val="5E5E5E"/>
+                </a:solidFill>
+                <a:latin typeface="Courier"/>
+              </a:rPr>
+              <a:t>#| layout: "[20 10]"</a:t>
+            </a:r>
+            <a:br/>
+            <a:br/>
+            <a:r>
+              <a:rPr>
+                <a:solidFill>
+                  <a:srgbClr val="4758AB"/>
+                </a:solidFill>
+                <a:latin typeface="Courier"/>
+              </a:rPr>
+              <a:t>hist</a:t>
+            </a:r>
+            <a:r>
+              <a:rPr>
+                <a:solidFill>
+                  <a:srgbClr val="003B4F"/>
+                </a:solidFill>
+                <a:latin typeface="Courier"/>
+              </a:rPr>
+              <a:t>(mtcars</a:t>
+            </a:r>
+            <a:r>
+              <a:rPr>
+                <a:solidFill>
+                  <a:srgbClr val="5E5E5E"/>
+                </a:solidFill>
+                <a:latin typeface="Courier"/>
+              </a:rPr>
+              <a:t>$</a:t>
+            </a:r>
+            <a:r>
+              <a:rPr>
+                <a:solidFill>
+                  <a:srgbClr val="003B4F"/>
+                </a:solidFill>
+                <a:latin typeface="Courier"/>
+              </a:rPr>
+              <a:t>)</a:t>
+            </a:r>
+            <a:br/>
+            <a:r>
+              <a:rPr>
+                <a:solidFill>
+                  <a:srgbClr val="5E5E5E"/>
+                </a:solidFill>
+                <a:latin typeface="Courier"/>
+              </a:rPr>
+              <a:t>```</a:t>
+            </a:r>
+          </a:p>
+        </p:txBody>
+      </p:sp>
     </p:spTree>
   </p:cSld>
 </p:sld>
@@ -8651,6 +9932,171 @@
           </a:p>
         </p:txBody>
       </p:sp>
+    </p:spTree>
+  </p:cSld>
+</p:sld>
+</file>
+
+<file path=ppt/slides/slide30.xml><?xml version="1.0" encoding="utf-8"?>
+<p:sld xmlns:a="http://schemas.openxmlformats.org/drawingml/2006/main" xmlns:r="http://schemas.openxmlformats.org/officeDocument/2006/relationships" xmlns:p="http://schemas.openxmlformats.org/presentationml/2006/main">
+  <p:cSld>
+    <p:spTree>
+      <p:nvGrpSpPr>
+        <p:cNvPr id="1" name=""/>
+        <p:cNvGrpSpPr/>
+        <p:nvPr/>
+      </p:nvGrpSpPr>
+      <p:grpSpPr>
+        <a:xfrm>
+          <a:off x="0" y="0"/>
+          <a:ext cx="0" cy="0"/>
+          <a:chOff x="0" y="0"/>
+          <a:chExt cx="0" cy="0"/>
+        </a:xfrm>
+      </p:grpSpPr>
+      <p:sp>
+        <p:nvSpPr>
+          <p:cNvPr id="2" name="Title 1"/>
+          <p:cNvSpPr>
+            <a:spLocks noGrp="1"/>
+          </p:cNvSpPr>
+          <p:nvPr>
+            <p:ph type="title"/>
+          </p:nvPr>
+        </p:nvSpPr>
+        <p:spPr>
+          <a:xfrm>
+            <a:off x="722313" y="3305176"/>
+            <a:ext cx="7772400" cy="1021556"/>
+          </a:xfrm>
+        </p:spPr>
+        <p:txBody>
+          <a:bodyPr/>
+          <a:lstStyle/>
+          <a:p>
+            <a:pPr lvl="0" indent="0" marL="0">
+              <a:buNone/>
+            </a:pPr>
+            <a:r>
+              <a:rPr/>
+              <a:t>Пример проекта: статья + интерактивное приложение</a:t>
+            </a:r>
+          </a:p>
+        </p:txBody>
+      </p:sp>
+    </p:spTree>
+  </p:cSld>
+</p:sld>
+</file>
+
+<file path=ppt/slides/slide31.xml><?xml version="1.0" encoding="utf-8"?>
+<p:sld xmlns:a="http://schemas.openxmlformats.org/drawingml/2006/main" xmlns:r="http://schemas.openxmlformats.org/officeDocument/2006/relationships" xmlns:p="http://schemas.openxmlformats.org/presentationml/2006/main">
+  <p:cSld>
+    <p:spTree>
+      <p:nvGrpSpPr>
+        <p:cNvPr id="1" name=""/>
+        <p:cNvGrpSpPr/>
+        <p:nvPr/>
+      </p:nvGrpSpPr>
+      <p:grpSpPr>
+        <a:xfrm>
+          <a:off x="0" y="0"/>
+          <a:ext cx="0" cy="0"/>
+          <a:chOff x="0" y="0"/>
+          <a:chExt cx="0" cy="0"/>
+        </a:xfrm>
+      </p:grpSpPr>
+      <p:sp>
+        <p:nvSpPr>
+          <p:cNvPr id="2" name="Title 1"/>
+          <p:cNvSpPr>
+            <a:spLocks noGrp="1"/>
+          </p:cNvSpPr>
+          <p:nvPr>
+            <p:ph type="title"/>
+          </p:nvPr>
+        </p:nvSpPr>
+        <p:spPr/>
+        <p:txBody>
+          <a:bodyPr/>
+          <a:lstStyle/>
+          <a:p>
+            <a:pPr lvl="0" indent="0" marL="0">
+              <a:buNone/>
+            </a:pPr>
+            <a:r>
+              <a:rPr/>
+              <a:t>Code</a:t>
+            </a:r>
+          </a:p>
+        </p:txBody>
+      </p:sp>
+      <p:sp>
+        <p:nvSpPr>
+          <p:cNvPr id="3" name="Content Placeholder 2"/>
+          <p:cNvSpPr>
+            <a:spLocks noGrp="1"/>
+          </p:cNvSpPr>
+          <p:nvPr>
+            <p:ph idx="1"/>
+          </p:nvPr>
+        </p:nvSpPr>
+        <p:spPr/>
+        <p:txBody>
+          <a:bodyPr/>
+          <a:lstStyle/>
+          <a:p>
+            <a:pPr lvl="0" indent="0" marL="0">
+              <a:buNone/>
+            </a:pPr>
+            <a:r>
+              <a:rPr/>
+              <a:t>When you click the </a:t>
+            </a:r>
+            <a:r>
+              <a:rPr b="1"/>
+              <a:t>Render</a:t>
+            </a:r>
+            <a:r>
+              <a:rPr/>
+              <a:t> button a presentation will be generated that includes both content and the output of embedded code. You can embed code like this:</a:t>
+            </a:r>
+          </a:p>
+          <a:p>
+            <a:pPr lvl="0" indent="0">
+              <a:buNone/>
+            </a:pPr>
+            <a:r>
+              <a:rPr>
+                <a:latin typeface="Courier"/>
+              </a:rPr>
+              <a:t>[1] 2</a:t>
+            </a:r>
+          </a:p>
+        </p:txBody>
+      </p:sp>
+    </p:spTree>
+  </p:cSld>
+</p:sld>
+</file>
+
+<file path=ppt/slides/slide32.xml><?xml version="1.0" encoding="utf-8"?>
+<p:sld xmlns:a="http://schemas.openxmlformats.org/drawingml/2006/main" xmlns:r="http://schemas.openxmlformats.org/officeDocument/2006/relationships" xmlns:p="http://schemas.openxmlformats.org/presentationml/2006/main">
+  <p:cSld>
+    <p:spTree>
+      <p:nvGrpSpPr>
+        <p:cNvPr id="1" name=""/>
+        <p:cNvGrpSpPr/>
+        <p:nvPr/>
+      </p:nvGrpSpPr>
+      <p:grpSpPr>
+        <a:xfrm>
+          <a:off x="0" y="0"/>
+          <a:ext cx="0" cy="0"/>
+          <a:chOff x="0" y="0"/>
+          <a:chExt cx="0" cy="0"/>
+        </a:xfrm>
+      </p:grpSpPr>
     </p:spTree>
   </p:cSld>
 </p:sld>

</xml_diff>